<commit_message>
add report and edit slide for checkpoint 2
</commit_message>
<xml_diff>
--- a/Slide/ship.pptx
+++ b/Slide/ship.pptx
@@ -10905,7 +10905,7 @@
         <p:spPr>
           <a:xfrm>
             <a:off x="0" y="4320000"/>
-            <a:ext cx="1978920" cy="1348920"/>
+            <a:ext cx="1978560" cy="1348560"/>
           </a:xfrm>
           <a:custGeom>
             <a:avLst/>
@@ -10953,7 +10953,7 @@
         <p:spPr>
           <a:xfrm>
             <a:off x="0" y="0"/>
-            <a:ext cx="1078920" cy="3418920"/>
+            <a:ext cx="1078560" cy="3418560"/>
           </a:xfrm>
           <a:custGeom>
             <a:avLst/>
@@ -11001,7 +11001,7 @@
         <p:spPr>
           <a:xfrm>
             <a:off x="7740000" y="0"/>
-            <a:ext cx="2338920" cy="1618920"/>
+            <a:ext cx="2338560" cy="1618560"/>
           </a:xfrm>
           <a:custGeom>
             <a:avLst/>
@@ -11049,7 +11049,7 @@
         <p:spPr>
           <a:xfrm>
             <a:off x="9000000" y="2520000"/>
-            <a:ext cx="1078920" cy="3148920"/>
+            <a:ext cx="1078560" cy="3148560"/>
           </a:xfrm>
           <a:custGeom>
             <a:avLst/>
@@ -11350,7 +11350,7 @@
         <p:spPr>
           <a:xfrm>
             <a:off x="0" y="4320000"/>
-            <a:ext cx="1978920" cy="1348920"/>
+            <a:ext cx="1978560" cy="1348560"/>
           </a:xfrm>
           <a:custGeom>
             <a:avLst/>
@@ -11398,7 +11398,7 @@
         <p:spPr>
           <a:xfrm>
             <a:off x="0" y="0"/>
-            <a:ext cx="1078920" cy="3418920"/>
+            <a:ext cx="1078560" cy="3418560"/>
           </a:xfrm>
           <a:custGeom>
             <a:avLst/>
@@ -11446,7 +11446,7 @@
         <p:spPr>
           <a:xfrm>
             <a:off x="7740000" y="0"/>
-            <a:ext cx="2338920" cy="1618920"/>
+            <a:ext cx="2338560" cy="1618560"/>
           </a:xfrm>
           <a:custGeom>
             <a:avLst/>
@@ -11494,7 +11494,7 @@
         <p:spPr>
           <a:xfrm>
             <a:off x="9000000" y="2520000"/>
-            <a:ext cx="1078920" cy="3148920"/>
+            <a:ext cx="1078560" cy="3148560"/>
           </a:xfrm>
           <a:custGeom>
             <a:avLst/>
@@ -11973,7 +11973,7 @@
         <p:spPr>
           <a:xfrm>
             <a:off x="0" y="4320000"/>
-            <a:ext cx="1978920" cy="1348920"/>
+            <a:ext cx="1978560" cy="1348560"/>
           </a:xfrm>
           <a:custGeom>
             <a:avLst/>
@@ -12021,7 +12021,7 @@
         <p:spPr>
           <a:xfrm>
             <a:off x="0" y="0"/>
-            <a:ext cx="1078920" cy="3418920"/>
+            <a:ext cx="1078560" cy="3418560"/>
           </a:xfrm>
           <a:custGeom>
             <a:avLst/>
@@ -12069,7 +12069,7 @@
         <p:spPr>
           <a:xfrm>
             <a:off x="7740000" y="0"/>
-            <a:ext cx="2338920" cy="1618920"/>
+            <a:ext cx="2338560" cy="1618560"/>
           </a:xfrm>
           <a:custGeom>
             <a:avLst/>
@@ -12117,7 +12117,7 @@
         <p:spPr>
           <a:xfrm>
             <a:off x="9000000" y="2520000"/>
-            <a:ext cx="1078920" cy="3148920"/>
+            <a:ext cx="1078560" cy="3148560"/>
           </a:xfrm>
           <a:custGeom>
             <a:avLst/>
@@ -12596,7 +12596,7 @@
         <p:spPr>
           <a:xfrm>
             <a:off x="0" y="4320000"/>
-            <a:ext cx="1978920" cy="1348920"/>
+            <a:ext cx="1978560" cy="1348560"/>
           </a:xfrm>
           <a:custGeom>
             <a:avLst/>
@@ -12644,7 +12644,7 @@
         <p:spPr>
           <a:xfrm>
             <a:off x="0" y="0"/>
-            <a:ext cx="1078920" cy="3418920"/>
+            <a:ext cx="1078560" cy="3418560"/>
           </a:xfrm>
           <a:custGeom>
             <a:avLst/>
@@ -12692,7 +12692,7 @@
         <p:spPr>
           <a:xfrm>
             <a:off x="7740000" y="0"/>
-            <a:ext cx="2338920" cy="1618920"/>
+            <a:ext cx="2338560" cy="1618560"/>
           </a:xfrm>
           <a:custGeom>
             <a:avLst/>
@@ -12740,7 +12740,7 @@
         <p:spPr>
           <a:xfrm>
             <a:off x="9000000" y="2520000"/>
-            <a:ext cx="1078920" cy="3148920"/>
+            <a:ext cx="1078560" cy="3148560"/>
           </a:xfrm>
           <a:custGeom>
             <a:avLst/>
@@ -13041,7 +13041,7 @@
         <p:spPr>
           <a:xfrm>
             <a:off x="0" y="4320000"/>
-            <a:ext cx="1978920" cy="1348920"/>
+            <a:ext cx="1978560" cy="1348560"/>
           </a:xfrm>
           <a:custGeom>
             <a:avLst/>
@@ -13089,7 +13089,7 @@
         <p:spPr>
           <a:xfrm>
             <a:off x="0" y="0"/>
-            <a:ext cx="1078920" cy="3418920"/>
+            <a:ext cx="1078560" cy="3418560"/>
           </a:xfrm>
           <a:custGeom>
             <a:avLst/>
@@ -13137,7 +13137,7 @@
         <p:spPr>
           <a:xfrm>
             <a:off x="7740000" y="0"/>
-            <a:ext cx="2338920" cy="1618920"/>
+            <a:ext cx="2338560" cy="1618560"/>
           </a:xfrm>
           <a:custGeom>
             <a:avLst/>
@@ -13185,7 +13185,7 @@
         <p:spPr>
           <a:xfrm>
             <a:off x="9000000" y="2520000"/>
-            <a:ext cx="1078920" cy="3148920"/>
+            <a:ext cx="1078560" cy="3148560"/>
           </a:xfrm>
           <a:custGeom>
             <a:avLst/>
@@ -13237,7 +13237,7 @@
         <p:spPr>
           <a:xfrm>
             <a:off x="504000" y="226080"/>
-            <a:ext cx="9071640" cy="946080"/>
+            <a:ext cx="9072000" cy="946440"/>
           </a:xfrm>
           <a:prstGeom prst="rect">
             <a:avLst/>
@@ -13248,13 +13248,14 @@
             <a:noAutofit/>
           </a:bodyPr>
           <a:p>
-            <a:r>
-              <a:rPr b="0" lang="en-US" sz="1800" spc="-1" strike="noStrike">
+            <a:pPr algn="ctr"/>
+            <a:r>
+              <a:rPr b="0" lang="en-US" sz="4400" spc="-1" strike="noStrike">
                 <a:latin typeface="Arial"/>
               </a:rPr>
               <a:t>Click to edit the title text format</a:t>
             </a:r>
-            <a:endParaRPr b="0" lang="en-US" sz="1800" spc="-1" strike="noStrike">
+            <a:endParaRPr b="0" lang="en-US" sz="4400" spc="-1" strike="noStrike">
               <a:latin typeface="Arial"/>
             </a:endParaRPr>
           </a:p>
@@ -13273,7 +13274,7 @@
         <p:spPr>
           <a:xfrm>
             <a:off x="504000" y="1326600"/>
-            <a:ext cx="9071640" cy="3288240"/>
+            <a:ext cx="9072000" cy="3288600"/>
           </a:xfrm>
           <a:prstGeom prst="rect">
             <a:avLst/>
@@ -13296,12 +13297,12 @@
               <a:buChar char=""/>
             </a:pPr>
             <a:r>
-              <a:rPr b="0" lang="en-US" sz="1800" spc="-1" strike="noStrike">
+              <a:rPr b="0" lang="en-US" sz="3200" spc="-1" strike="noStrike">
                 <a:latin typeface="Arial"/>
               </a:rPr>
               <a:t>Click to edit the outline text format</a:t>
             </a:r>
-            <a:endParaRPr b="0" lang="en-US" sz="1800" spc="-1" strike="noStrike">
+            <a:endParaRPr b="0" lang="en-US" sz="3200" spc="-1" strike="noStrike">
               <a:latin typeface="Arial"/>
             </a:endParaRPr>
           </a:p>
@@ -13318,12 +13319,12 @@
               <a:buChar char=""/>
             </a:pPr>
             <a:r>
-              <a:rPr b="0" lang="en-US" sz="1800" spc="-1" strike="noStrike">
+              <a:rPr b="0" lang="en-US" sz="2800" spc="-1" strike="noStrike">
                 <a:latin typeface="Arial"/>
               </a:rPr>
               <a:t>Second Outline Level</a:t>
             </a:r>
-            <a:endParaRPr b="0" lang="en-US" sz="1800" spc="-1" strike="noStrike">
+            <a:endParaRPr b="0" lang="en-US" sz="2800" spc="-1" strike="noStrike">
               <a:latin typeface="Arial"/>
             </a:endParaRPr>
           </a:p>
@@ -13340,12 +13341,12 @@
               <a:buChar char=""/>
             </a:pPr>
             <a:r>
-              <a:rPr b="0" lang="en-US" sz="1800" spc="-1" strike="noStrike">
+              <a:rPr b="0" lang="en-US" sz="2400" spc="-1" strike="noStrike">
                 <a:latin typeface="Arial"/>
               </a:rPr>
               <a:t>Third Outline Level</a:t>
             </a:r>
-            <a:endParaRPr b="0" lang="en-US" sz="1800" spc="-1" strike="noStrike">
+            <a:endParaRPr b="0" lang="en-US" sz="2400" spc="-1" strike="noStrike">
               <a:latin typeface="Arial"/>
             </a:endParaRPr>
           </a:p>
@@ -13362,12 +13363,12 @@
               <a:buChar char=""/>
             </a:pPr>
             <a:r>
-              <a:rPr b="0" lang="en-US" sz="1800" spc="-1" strike="noStrike">
+              <a:rPr b="0" lang="en-US" sz="2000" spc="-1" strike="noStrike">
                 <a:latin typeface="Arial"/>
               </a:rPr>
               <a:t>Fourth Outline Level</a:t>
             </a:r>
-            <a:endParaRPr b="0" lang="en-US" sz="1800" spc="-1" strike="noStrike">
+            <a:endParaRPr b="0" lang="en-US" sz="2000" spc="-1" strike="noStrike">
               <a:latin typeface="Arial"/>
             </a:endParaRPr>
           </a:p>
@@ -13384,12 +13385,12 @@
               <a:buChar char=""/>
             </a:pPr>
             <a:r>
-              <a:rPr b="0" lang="en-US" sz="1800" spc="-1" strike="noStrike">
+              <a:rPr b="0" lang="en-US" sz="2000" spc="-1" strike="noStrike">
                 <a:latin typeface="Arial"/>
               </a:rPr>
               <a:t>Fifth Outline Level</a:t>
             </a:r>
-            <a:endParaRPr b="0" lang="en-US" sz="1800" spc="-1" strike="noStrike">
+            <a:endParaRPr b="0" lang="en-US" sz="2000" spc="-1" strike="noStrike">
               <a:latin typeface="Arial"/>
             </a:endParaRPr>
           </a:p>
@@ -13406,12 +13407,12 @@
               <a:buChar char=""/>
             </a:pPr>
             <a:r>
-              <a:rPr b="0" lang="en-US" sz="1800" spc="-1" strike="noStrike">
+              <a:rPr b="0" lang="en-US" sz="2000" spc="-1" strike="noStrike">
                 <a:latin typeface="Arial"/>
               </a:rPr>
               <a:t>Sixth Outline Level</a:t>
             </a:r>
-            <a:endParaRPr b="0" lang="en-US" sz="1800" spc="-1" strike="noStrike">
+            <a:endParaRPr b="0" lang="en-US" sz="2000" spc="-1" strike="noStrike">
               <a:latin typeface="Arial"/>
             </a:endParaRPr>
           </a:p>
@@ -13428,12 +13429,12 @@
               <a:buChar char=""/>
             </a:pPr>
             <a:r>
-              <a:rPr b="0" lang="en-US" sz="1800" spc="-1" strike="noStrike">
+              <a:rPr b="0" lang="en-US" sz="2000" spc="-1" strike="noStrike">
                 <a:latin typeface="Arial"/>
               </a:rPr>
               <a:t>Seventh Outline Level</a:t>
             </a:r>
-            <a:endParaRPr b="0" lang="en-US" sz="1800" spc="-1" strike="noStrike">
+            <a:endParaRPr b="0" lang="en-US" sz="2000" spc="-1" strike="noStrike">
               <a:latin typeface="Arial"/>
             </a:endParaRPr>
           </a:p>
@@ -13485,7 +13486,7 @@
         <p:spPr>
           <a:xfrm>
             <a:off x="0" y="4320000"/>
-            <a:ext cx="1978920" cy="1348920"/>
+            <a:ext cx="1978560" cy="1348560"/>
           </a:xfrm>
           <a:custGeom>
             <a:avLst/>
@@ -13533,7 +13534,7 @@
         <p:spPr>
           <a:xfrm>
             <a:off x="0" y="0"/>
-            <a:ext cx="1078920" cy="3418920"/>
+            <a:ext cx="1078560" cy="3418560"/>
           </a:xfrm>
           <a:custGeom>
             <a:avLst/>
@@ -13581,7 +13582,7 @@
         <p:spPr>
           <a:xfrm>
             <a:off x="7740000" y="0"/>
-            <a:ext cx="2338920" cy="1618920"/>
+            <a:ext cx="2338560" cy="1618560"/>
           </a:xfrm>
           <a:custGeom>
             <a:avLst/>
@@ -13629,7 +13630,7 @@
         <p:spPr>
           <a:xfrm>
             <a:off x="9000000" y="2520000"/>
-            <a:ext cx="1078920" cy="3148920"/>
+            <a:ext cx="1078560" cy="3148560"/>
           </a:xfrm>
           <a:custGeom>
             <a:avLst/>
@@ -13681,7 +13682,7 @@
         <p:spPr>
           <a:xfrm>
             <a:off x="504000" y="226080"/>
-            <a:ext cx="9071640" cy="946080"/>
+            <a:ext cx="9072000" cy="946440"/>
           </a:xfrm>
           <a:prstGeom prst="rect">
             <a:avLst/>
@@ -13692,13 +13693,14 @@
             <a:noAutofit/>
           </a:bodyPr>
           <a:p>
-            <a:r>
-              <a:rPr b="0" lang="en-US" sz="1800" spc="-1" strike="noStrike">
+            <a:pPr algn="ctr"/>
+            <a:r>
+              <a:rPr b="0" lang="en-US" sz="4400" spc="-1" strike="noStrike">
                 <a:latin typeface="Arial"/>
               </a:rPr>
               <a:t>Click to edit the title text format</a:t>
             </a:r>
-            <a:endParaRPr b="0" lang="en-US" sz="1800" spc="-1" strike="noStrike">
+            <a:endParaRPr b="0" lang="en-US" sz="4400" spc="-1" strike="noStrike">
               <a:latin typeface="Arial"/>
             </a:endParaRPr>
           </a:p>
@@ -13717,7 +13719,7 @@
         <p:spPr>
           <a:xfrm>
             <a:off x="504000" y="1326600"/>
-            <a:ext cx="9071640" cy="3288240"/>
+            <a:ext cx="9072000" cy="3288600"/>
           </a:xfrm>
           <a:prstGeom prst="rect">
             <a:avLst/>
@@ -13740,12 +13742,12 @@
               <a:buChar char=""/>
             </a:pPr>
             <a:r>
-              <a:rPr b="0" lang="en-US" sz="1800" spc="-1" strike="noStrike">
+              <a:rPr b="0" lang="en-US" sz="3200" spc="-1" strike="noStrike">
                 <a:latin typeface="Arial"/>
               </a:rPr>
               <a:t>Click to edit the outline text format</a:t>
             </a:r>
-            <a:endParaRPr b="0" lang="en-US" sz="1800" spc="-1" strike="noStrike">
+            <a:endParaRPr b="0" lang="en-US" sz="3200" spc="-1" strike="noStrike">
               <a:latin typeface="Arial"/>
             </a:endParaRPr>
           </a:p>
@@ -13762,12 +13764,12 @@
               <a:buChar char=""/>
             </a:pPr>
             <a:r>
-              <a:rPr b="0" lang="en-US" sz="1800" spc="-1" strike="noStrike">
+              <a:rPr b="0" lang="en-US" sz="2800" spc="-1" strike="noStrike">
                 <a:latin typeface="Arial"/>
               </a:rPr>
               <a:t>Second Outline Level</a:t>
             </a:r>
-            <a:endParaRPr b="0" lang="en-US" sz="1800" spc="-1" strike="noStrike">
+            <a:endParaRPr b="0" lang="en-US" sz="2800" spc="-1" strike="noStrike">
               <a:latin typeface="Arial"/>
             </a:endParaRPr>
           </a:p>
@@ -13784,12 +13786,12 @@
               <a:buChar char=""/>
             </a:pPr>
             <a:r>
-              <a:rPr b="0" lang="en-US" sz="1800" spc="-1" strike="noStrike">
+              <a:rPr b="0" lang="en-US" sz="2400" spc="-1" strike="noStrike">
                 <a:latin typeface="Arial"/>
               </a:rPr>
               <a:t>Third Outline Level</a:t>
             </a:r>
-            <a:endParaRPr b="0" lang="en-US" sz="1800" spc="-1" strike="noStrike">
+            <a:endParaRPr b="0" lang="en-US" sz="2400" spc="-1" strike="noStrike">
               <a:latin typeface="Arial"/>
             </a:endParaRPr>
           </a:p>
@@ -13806,12 +13808,12 @@
               <a:buChar char=""/>
             </a:pPr>
             <a:r>
-              <a:rPr b="0" lang="en-US" sz="1800" spc="-1" strike="noStrike">
+              <a:rPr b="0" lang="en-US" sz="2000" spc="-1" strike="noStrike">
                 <a:latin typeface="Arial"/>
               </a:rPr>
               <a:t>Fourth Outline Level</a:t>
             </a:r>
-            <a:endParaRPr b="0" lang="en-US" sz="1800" spc="-1" strike="noStrike">
+            <a:endParaRPr b="0" lang="en-US" sz="2000" spc="-1" strike="noStrike">
               <a:latin typeface="Arial"/>
             </a:endParaRPr>
           </a:p>
@@ -13828,12 +13830,12 @@
               <a:buChar char=""/>
             </a:pPr>
             <a:r>
-              <a:rPr b="0" lang="en-US" sz="1800" spc="-1" strike="noStrike">
+              <a:rPr b="0" lang="en-US" sz="2000" spc="-1" strike="noStrike">
                 <a:latin typeface="Arial"/>
               </a:rPr>
               <a:t>Fifth Outline Level</a:t>
             </a:r>
-            <a:endParaRPr b="0" lang="en-US" sz="1800" spc="-1" strike="noStrike">
+            <a:endParaRPr b="0" lang="en-US" sz="2000" spc="-1" strike="noStrike">
               <a:latin typeface="Arial"/>
             </a:endParaRPr>
           </a:p>
@@ -13850,12 +13852,12 @@
               <a:buChar char=""/>
             </a:pPr>
             <a:r>
-              <a:rPr b="0" lang="en-US" sz="1800" spc="-1" strike="noStrike">
+              <a:rPr b="0" lang="en-US" sz="2000" spc="-1" strike="noStrike">
                 <a:latin typeface="Arial"/>
               </a:rPr>
               <a:t>Sixth Outline Level</a:t>
             </a:r>
-            <a:endParaRPr b="0" lang="en-US" sz="1800" spc="-1" strike="noStrike">
+            <a:endParaRPr b="0" lang="en-US" sz="2000" spc="-1" strike="noStrike">
               <a:latin typeface="Arial"/>
             </a:endParaRPr>
           </a:p>
@@ -13872,12 +13874,12 @@
               <a:buChar char=""/>
             </a:pPr>
             <a:r>
-              <a:rPr b="0" lang="en-US" sz="1800" spc="-1" strike="noStrike">
+              <a:rPr b="0" lang="en-US" sz="2000" spc="-1" strike="noStrike">
                 <a:latin typeface="Arial"/>
               </a:rPr>
               <a:t>Seventh Outline Level</a:t>
             </a:r>
-            <a:endParaRPr b="0" lang="en-US" sz="1800" spc="-1" strike="noStrike">
+            <a:endParaRPr b="0" lang="en-US" sz="2000" spc="-1" strike="noStrike">
               <a:latin typeface="Arial"/>
             </a:endParaRPr>
           </a:p>
@@ -13929,7 +13931,7 @@
         <p:spPr>
           <a:xfrm>
             <a:off x="0" y="4320000"/>
-            <a:ext cx="1978920" cy="1348920"/>
+            <a:ext cx="1978560" cy="1348560"/>
           </a:xfrm>
           <a:custGeom>
             <a:avLst/>
@@ -13977,7 +13979,7 @@
         <p:spPr>
           <a:xfrm>
             <a:off x="0" y="0"/>
-            <a:ext cx="1078920" cy="3418920"/>
+            <a:ext cx="1078560" cy="3418560"/>
           </a:xfrm>
           <a:custGeom>
             <a:avLst/>
@@ -14025,7 +14027,7 @@
         <p:spPr>
           <a:xfrm>
             <a:off x="7740000" y="0"/>
-            <a:ext cx="2338920" cy="1618920"/>
+            <a:ext cx="2338560" cy="1618560"/>
           </a:xfrm>
           <a:custGeom>
             <a:avLst/>
@@ -14073,7 +14075,7 @@
         <p:spPr>
           <a:xfrm>
             <a:off x="9000000" y="2520000"/>
-            <a:ext cx="1078920" cy="3148920"/>
+            <a:ext cx="1078560" cy="3148560"/>
           </a:xfrm>
           <a:custGeom>
             <a:avLst/>
@@ -14374,7 +14376,7 @@
         <p:spPr>
           <a:xfrm>
             <a:off x="0" y="4320000"/>
-            <a:ext cx="1978920" cy="1348920"/>
+            <a:ext cx="1978560" cy="1348560"/>
           </a:xfrm>
           <a:custGeom>
             <a:avLst/>
@@ -14422,7 +14424,7 @@
         <p:spPr>
           <a:xfrm>
             <a:off x="0" y="0"/>
-            <a:ext cx="1078920" cy="3418920"/>
+            <a:ext cx="1078560" cy="3418560"/>
           </a:xfrm>
           <a:custGeom>
             <a:avLst/>
@@ -14470,7 +14472,7 @@
         <p:spPr>
           <a:xfrm>
             <a:off x="7740000" y="0"/>
-            <a:ext cx="2338920" cy="1618920"/>
+            <a:ext cx="2338560" cy="1618560"/>
           </a:xfrm>
           <a:custGeom>
             <a:avLst/>
@@ -14518,7 +14520,7 @@
         <p:spPr>
           <a:xfrm>
             <a:off x="9000000" y="2520000"/>
-            <a:ext cx="1078920" cy="3148920"/>
+            <a:ext cx="1078560" cy="3148560"/>
           </a:xfrm>
           <a:custGeom>
             <a:avLst/>
@@ -14570,7 +14572,7 @@
         <p:spPr>
           <a:xfrm>
             <a:off x="504000" y="226080"/>
-            <a:ext cx="9071640" cy="946080"/>
+            <a:ext cx="9072000" cy="946440"/>
           </a:xfrm>
           <a:prstGeom prst="rect">
             <a:avLst/>
@@ -14581,13 +14583,14 @@
             <a:noAutofit/>
           </a:bodyPr>
           <a:p>
-            <a:r>
-              <a:rPr b="0" lang="en-US" sz="1800" spc="-1" strike="noStrike">
+            <a:pPr algn="ctr"/>
+            <a:r>
+              <a:rPr b="0" lang="en-US" sz="4400" spc="-1" strike="noStrike">
                 <a:latin typeface="Arial"/>
               </a:rPr>
               <a:t>Click to edit the title text format</a:t>
             </a:r>
-            <a:endParaRPr b="0" lang="en-US" sz="1800" spc="-1" strike="noStrike">
+            <a:endParaRPr b="0" lang="en-US" sz="4400" spc="-1" strike="noStrike">
               <a:latin typeface="Arial"/>
             </a:endParaRPr>
           </a:p>
@@ -14606,7 +14609,7 @@
         <p:spPr>
           <a:xfrm>
             <a:off x="504000" y="1326600"/>
-            <a:ext cx="9071640" cy="3288240"/>
+            <a:ext cx="9072000" cy="3288600"/>
           </a:xfrm>
           <a:prstGeom prst="rect">
             <a:avLst/>
@@ -14629,12 +14632,12 @@
               <a:buChar char=""/>
             </a:pPr>
             <a:r>
-              <a:rPr b="0" lang="en-US" sz="1800" spc="-1" strike="noStrike">
+              <a:rPr b="0" lang="en-US" sz="3200" spc="-1" strike="noStrike">
                 <a:latin typeface="Arial"/>
               </a:rPr>
               <a:t>Click to edit the outline text format</a:t>
             </a:r>
-            <a:endParaRPr b="0" lang="en-US" sz="1800" spc="-1" strike="noStrike">
+            <a:endParaRPr b="0" lang="en-US" sz="3200" spc="-1" strike="noStrike">
               <a:latin typeface="Arial"/>
             </a:endParaRPr>
           </a:p>
@@ -14651,12 +14654,12 @@
               <a:buChar char=""/>
             </a:pPr>
             <a:r>
-              <a:rPr b="0" lang="en-US" sz="1800" spc="-1" strike="noStrike">
+              <a:rPr b="0" lang="en-US" sz="2800" spc="-1" strike="noStrike">
                 <a:latin typeface="Arial"/>
               </a:rPr>
               <a:t>Second Outline Level</a:t>
             </a:r>
-            <a:endParaRPr b="0" lang="en-US" sz="1800" spc="-1" strike="noStrike">
+            <a:endParaRPr b="0" lang="en-US" sz="2800" spc="-1" strike="noStrike">
               <a:latin typeface="Arial"/>
             </a:endParaRPr>
           </a:p>
@@ -14673,12 +14676,12 @@
               <a:buChar char=""/>
             </a:pPr>
             <a:r>
-              <a:rPr b="0" lang="en-US" sz="1800" spc="-1" strike="noStrike">
+              <a:rPr b="0" lang="en-US" sz="2400" spc="-1" strike="noStrike">
                 <a:latin typeface="Arial"/>
               </a:rPr>
               <a:t>Third Outline Level</a:t>
             </a:r>
-            <a:endParaRPr b="0" lang="en-US" sz="1800" spc="-1" strike="noStrike">
+            <a:endParaRPr b="0" lang="en-US" sz="2400" spc="-1" strike="noStrike">
               <a:latin typeface="Arial"/>
             </a:endParaRPr>
           </a:p>
@@ -14695,12 +14698,12 @@
               <a:buChar char=""/>
             </a:pPr>
             <a:r>
-              <a:rPr b="0" lang="en-US" sz="1800" spc="-1" strike="noStrike">
+              <a:rPr b="0" lang="en-US" sz="2000" spc="-1" strike="noStrike">
                 <a:latin typeface="Arial"/>
               </a:rPr>
               <a:t>Fourth Outline Level</a:t>
             </a:r>
-            <a:endParaRPr b="0" lang="en-US" sz="1800" spc="-1" strike="noStrike">
+            <a:endParaRPr b="0" lang="en-US" sz="2000" spc="-1" strike="noStrike">
               <a:latin typeface="Arial"/>
             </a:endParaRPr>
           </a:p>
@@ -14717,12 +14720,12 @@
               <a:buChar char=""/>
             </a:pPr>
             <a:r>
-              <a:rPr b="0" lang="en-US" sz="1800" spc="-1" strike="noStrike">
+              <a:rPr b="0" lang="en-US" sz="2000" spc="-1" strike="noStrike">
                 <a:latin typeface="Arial"/>
               </a:rPr>
               <a:t>Fifth Outline Level</a:t>
             </a:r>
-            <a:endParaRPr b="0" lang="en-US" sz="1800" spc="-1" strike="noStrike">
+            <a:endParaRPr b="0" lang="en-US" sz="2000" spc="-1" strike="noStrike">
               <a:latin typeface="Arial"/>
             </a:endParaRPr>
           </a:p>
@@ -14739,12 +14742,12 @@
               <a:buChar char=""/>
             </a:pPr>
             <a:r>
-              <a:rPr b="0" lang="en-US" sz="1800" spc="-1" strike="noStrike">
+              <a:rPr b="0" lang="en-US" sz="2000" spc="-1" strike="noStrike">
                 <a:latin typeface="Arial"/>
               </a:rPr>
               <a:t>Sixth Outline Level</a:t>
             </a:r>
-            <a:endParaRPr b="0" lang="en-US" sz="1800" spc="-1" strike="noStrike">
+            <a:endParaRPr b="0" lang="en-US" sz="2000" spc="-1" strike="noStrike">
               <a:latin typeface="Arial"/>
             </a:endParaRPr>
           </a:p>
@@ -14761,12 +14764,12 @@
               <a:buChar char=""/>
             </a:pPr>
             <a:r>
-              <a:rPr b="0" lang="en-US" sz="1800" spc="-1" strike="noStrike">
+              <a:rPr b="0" lang="en-US" sz="2000" spc="-1" strike="noStrike">
                 <a:latin typeface="Arial"/>
               </a:rPr>
               <a:t>Seventh Outline Level</a:t>
             </a:r>
-            <a:endParaRPr b="0" lang="en-US" sz="1800" spc="-1" strike="noStrike">
+            <a:endParaRPr b="0" lang="en-US" sz="2000" spc="-1" strike="noStrike">
               <a:latin typeface="Arial"/>
             </a:endParaRPr>
           </a:p>
@@ -14818,7 +14821,7 @@
         <p:spPr>
           <a:xfrm>
             <a:off x="720000" y="360000"/>
-            <a:ext cx="8638560" cy="4896360"/>
+            <a:ext cx="8638200" cy="4896000"/>
           </a:xfrm>
           <a:prstGeom prst="rect">
             <a:avLst/>
@@ -15022,14 +15025,14 @@
       </p:grpSpPr>
       <p:sp>
         <p:nvSpPr>
-          <p:cNvPr id="372" name=""/>
+          <p:cNvPr id="374" name=""/>
           <p:cNvSpPr/>
           <p:nvPr/>
         </p:nvSpPr>
         <p:spPr>
           <a:xfrm>
             <a:off x="720000" y="360000"/>
-            <a:ext cx="8638560" cy="898560"/>
+            <a:ext cx="8638200" cy="898200"/>
           </a:xfrm>
           <a:prstGeom prst="rect">
             <a:avLst/>
@@ -15057,7 +15060,11 @@
             </a:pPr>
             <a:r>
               <a:rPr b="0" lang="en-US" sz="3200" spc="-1" strike="noStrike">
-                <a:latin typeface="Arial"/>
+                <a:solidFill>
+                  <a:srgbClr val="000000"/>
+                </a:solidFill>
+                <a:latin typeface="Arial"/>
+                <a:ea typeface="DejaVu Sans"/>
               </a:rPr>
               <a:t>Message Protocol</a:t>
             </a:r>
@@ -15069,14 +15076,14 @@
       </p:sp>
       <p:sp>
         <p:nvSpPr>
-          <p:cNvPr id="373" name=""/>
+          <p:cNvPr id="375" name=""/>
           <p:cNvSpPr/>
           <p:nvPr/>
         </p:nvSpPr>
         <p:spPr>
           <a:xfrm>
             <a:off x="720000" y="1440000"/>
-            <a:ext cx="8423640" cy="3598560"/>
+            <a:ext cx="8423280" cy="3598200"/>
           </a:xfrm>
           <a:prstGeom prst="rect">
             <a:avLst/>
@@ -15097,7 +15104,7 @@
             <a:normAutofit/>
           </a:bodyPr>
           <a:p>
-            <a:pPr marL="432000" indent="-323640">
+            <a:pPr marL="432000" indent="-323280">
               <a:lnSpc>
                 <a:spcPct val="100000"/>
               </a:lnSpc>
@@ -15113,19 +15120,31 @@
             </a:pPr>
             <a:r>
               <a:rPr b="0" lang="en-US" sz="1800" spc="-1" strike="noStrike">
-                <a:latin typeface="Arial"/>
+                <a:solidFill>
+                  <a:srgbClr val="000000"/>
+                </a:solidFill>
+                <a:latin typeface="Arial"/>
+                <a:ea typeface="DejaVu Sans"/>
               </a:rPr>
               <a:t>When a challenge is accepted, Server sends a message to both clients to start a match:</a:t>
             </a:r>
             <a:r>
               <a:rPr b="0" lang="en-US" sz="1800" spc="-1" strike="noStrike">
-                <a:latin typeface="Arial"/>
+                <a:solidFill>
+                  <a:srgbClr val="000000"/>
+                </a:solidFill>
+                <a:latin typeface="Arial"/>
+                <a:ea typeface="DejaVu Sans"/>
               </a:rPr>
               <a:t>	</a:t>
             </a:r>
             <a:r>
               <a:rPr b="0" lang="en-US" sz="1800" spc="-1" strike="noStrike">
-                <a:latin typeface="Arial"/>
+                <a:solidFill>
+                  <a:srgbClr val="000000"/>
+                </a:solidFill>
+                <a:latin typeface="Arial"/>
+                <a:ea typeface="DejaVu Sans"/>
               </a:rPr>
               <a:t>	</a:t>
             </a:r>
@@ -15135,6 +15154,7 @@
                   <a:srgbClr val="ff0000"/>
                 </a:solidFill>
                 <a:latin typeface="Arial"/>
+                <a:ea typeface="DejaVu Sans"/>
               </a:rPr>
               <a:t>S:</a:t>
             </a:r>
@@ -15144,6 +15164,7 @@
                   <a:srgbClr val="ff0000"/>
                 </a:solidFill>
                 <a:latin typeface="Arial"/>
+                <a:ea typeface="DejaVu Sans"/>
               </a:rPr>
               <a:t>	</a:t>
             </a:r>
@@ -15153,6 +15174,7 @@
                   <a:srgbClr val="00a933"/>
                 </a:solidFill>
                 <a:latin typeface="Arial"/>
+                <a:ea typeface="DejaVu Sans"/>
               </a:rPr>
               <a:t>matchstart</a:t>
             </a:r>
@@ -15161,7 +15183,7 @@
             </a:endParaRPr>
           </a:p>
           <a:p>
-            <a:pPr marL="432000" indent="-323640">
+            <a:pPr marL="432000" indent="-323280">
               <a:lnSpc>
                 <a:spcPct val="100000"/>
               </a:lnSpc>
@@ -15181,6 +15203,7 @@
                   <a:srgbClr val="000000"/>
                 </a:solidFill>
                 <a:latin typeface="Arial"/>
+                <a:ea typeface="DejaVu Sans"/>
               </a:rPr>
               <a:t>2 players set up ship formation and send to server, server then decide who go first and start the game:</a:t>
             </a:r>
@@ -15189,7 +15212,7 @@
             </a:endParaRPr>
           </a:p>
           <a:p>
-            <a:pPr marL="432000" indent="-323640">
+            <a:pPr marL="432000" indent="-323280">
               <a:lnSpc>
                 <a:spcPct val="100000"/>
               </a:lnSpc>
@@ -15209,6 +15232,7 @@
                   <a:srgbClr val="ff0000"/>
                 </a:solidFill>
                 <a:latin typeface="Arial"/>
+                <a:ea typeface="DejaVu Sans"/>
               </a:rPr>
               <a:t>2 Clients → Server:</a:t>
             </a:r>
@@ -15218,6 +15242,7 @@
                   <a:srgbClr val="000000"/>
                 </a:solidFill>
                 <a:latin typeface="Arial"/>
+                <a:ea typeface="DejaVu Sans"/>
               </a:rPr>
               <a:t> </a:t>
             </a:r>
@@ -15227,6 +15252,7 @@
                   <a:srgbClr val="000000"/>
                 </a:solidFill>
                 <a:latin typeface="Arial"/>
+                <a:ea typeface="DejaVu Sans"/>
               </a:rPr>
               <a:t>	</a:t>
             </a:r>
@@ -15236,6 +15262,7 @@
                   <a:srgbClr val="00a933"/>
                 </a:solidFill>
                 <a:latin typeface="Arial"/>
+                <a:ea typeface="DejaVu Sans"/>
               </a:rPr>
               <a:t>setup : V-4-3-10 , H-3-5-2 ,</a:t>
             </a:r>
@@ -15245,6 +15272,7 @@
                   <a:srgbClr val="000000"/>
                 </a:solidFill>
                 <a:latin typeface="Arial"/>
+                <a:ea typeface="DejaVu Sans"/>
               </a:rPr>
               <a:t> … </a:t>
             </a:r>
@@ -15254,6 +15282,7 @@
                   <a:srgbClr val="00a933"/>
                 </a:solidFill>
                 <a:latin typeface="Arial"/>
+                <a:ea typeface="DejaVu Sans"/>
               </a:rPr>
               <a:t>, H-1-8-8 .</a:t>
             </a:r>
@@ -15262,19 +15291,13 @@
             </a:endParaRPr>
           </a:p>
           <a:p>
-            <a:pPr marL="432000" indent="-323640">
+            <a:pPr>
               <a:lnSpc>
                 <a:spcPct val="100000"/>
               </a:lnSpc>
               <a:spcBef>
                 <a:spcPts val="1417"/>
               </a:spcBef>
-              <a:buClr>
-                <a:srgbClr val="000000"/>
-              </a:buClr>
-              <a:buSzPct val="45000"/>
-              <a:buFont typeface="Wingdings" charset="2"/>
-              <a:buChar char=""/>
             </a:pPr>
             <a:endParaRPr b="0" lang="en-US" sz="1800" spc="-1" strike="noStrike">
               <a:latin typeface="Arial"/>
@@ -15292,6 +15315,7 @@
                   <a:srgbClr val="000000"/>
                 </a:solidFill>
                 <a:latin typeface="Arial"/>
+                <a:ea typeface="DejaVu Sans"/>
               </a:rPr>
               <a:t>Ship info</a:t>
             </a:r>
@@ -15301,6 +15325,7 @@
                   <a:srgbClr val="00a933"/>
                 </a:solidFill>
                 <a:latin typeface="Arial"/>
+                <a:ea typeface="DejaVu Sans"/>
               </a:rPr>
               <a:t> </a:t>
             </a:r>
@@ -15310,6 +15335,7 @@
                   <a:srgbClr val="000000"/>
                 </a:solidFill>
                 <a:latin typeface="Arial"/>
+                <a:ea typeface="DejaVu Sans"/>
               </a:rPr>
               <a:t>(</a:t>
             </a:r>
@@ -15319,6 +15345,7 @@
                   <a:srgbClr val="00a933"/>
                 </a:solidFill>
                 <a:latin typeface="Arial"/>
+                <a:ea typeface="DejaVu Sans"/>
               </a:rPr>
               <a:t> [Horizontal/Vertical]–[Ship length]–[Coordinate X]–[Coordinate Y] </a:t>
             </a:r>
@@ -15328,6 +15355,7 @@
                   <a:srgbClr val="000000"/>
                 </a:solidFill>
                 <a:latin typeface="Arial"/>
+                <a:ea typeface="DejaVu Sans"/>
               </a:rPr>
               <a:t>)</a:t>
             </a:r>
@@ -15357,6 +15385,7 @@
                   <a:srgbClr val="000000"/>
                 </a:solidFill>
                 <a:latin typeface="Arial"/>
+                <a:ea typeface="DejaVu Sans"/>
               </a:rPr>
               <a:t>	</a:t>
             </a:r>
@@ -15366,6 +15395,7 @@
                   <a:srgbClr val="ff0000"/>
                 </a:solidFill>
                 <a:latin typeface="Arial"/>
+                <a:ea typeface="DejaVu Sans"/>
               </a:rPr>
               <a:t>S:</a:t>
             </a:r>
@@ -15375,6 +15405,7 @@
                   <a:srgbClr val="000000"/>
                 </a:solidFill>
                 <a:latin typeface="Arial"/>
+                <a:ea typeface="DejaVu Sans"/>
               </a:rPr>
               <a:t>	</a:t>
             </a:r>
@@ -15384,6 +15415,7 @@
                   <a:srgbClr val="00a933"/>
                 </a:solidFill>
                 <a:latin typeface="Arial"/>
+                <a:ea typeface="DejaVu Sans"/>
               </a:rPr>
               <a:t>gamestart : 1</a:t>
             </a:r>
@@ -15393,6 +15425,7 @@
                   <a:srgbClr val="00a933"/>
                 </a:solidFill>
                 <a:latin typeface="Arial"/>
+                <a:ea typeface="DejaVu Sans"/>
               </a:rPr>
               <a:t>	</a:t>
             </a:r>
@@ -15402,6 +15435,7 @@
                   <a:srgbClr val="00a933"/>
                 </a:solidFill>
                 <a:latin typeface="Arial"/>
+                <a:ea typeface="DejaVu Sans"/>
               </a:rPr>
               <a:t>	</a:t>
             </a:r>
@@ -15411,6 +15445,7 @@
                   <a:srgbClr val="00a933"/>
                 </a:solidFill>
                 <a:latin typeface="Arial"/>
+                <a:ea typeface="DejaVu Sans"/>
               </a:rPr>
               <a:t>	</a:t>
             </a:r>
@@ -15420,6 +15455,7 @@
                   <a:srgbClr val="00a933"/>
                 </a:solidFill>
                 <a:latin typeface="Arial"/>
+                <a:ea typeface="DejaVu Sans"/>
               </a:rPr>
               <a:t>	</a:t>
             </a:r>
@@ -15429,6 +15465,7 @@
                   <a:srgbClr val="000000"/>
                 </a:solidFill>
                 <a:latin typeface="Arial"/>
+                <a:ea typeface="DejaVu Sans"/>
               </a:rPr>
               <a:t>( 1: go first, 2: go second )</a:t>
             </a:r>
@@ -15438,6 +15475,7 @@
                   <a:srgbClr val="000000"/>
                 </a:solidFill>
                 <a:latin typeface="Arial"/>
+                <a:ea typeface="DejaVu Sans"/>
               </a:rPr>
               <a:t>	</a:t>
             </a:r>
@@ -15447,6 +15485,7 @@
                   <a:srgbClr val="00a933"/>
                 </a:solidFill>
                 <a:latin typeface="Arial"/>
+                <a:ea typeface="DejaVu Sans"/>
               </a:rPr>
               <a:t>	</a:t>
             </a:r>
@@ -15455,19 +15494,13 @@
             </a:endParaRPr>
           </a:p>
           <a:p>
-            <a:pPr marL="432000" indent="-323640">
+            <a:pPr>
               <a:lnSpc>
                 <a:spcPct val="100000"/>
               </a:lnSpc>
               <a:spcBef>
                 <a:spcPts val="1417"/>
               </a:spcBef>
-              <a:buClr>
-                <a:srgbClr val="000000"/>
-              </a:buClr>
-              <a:buSzPct val="45000"/>
-              <a:buFont typeface="Wingdings" charset="2"/>
-              <a:buChar char=""/>
             </a:pPr>
             <a:endParaRPr b="0" lang="en-US" sz="1800" spc="-1" strike="noStrike">
               <a:latin typeface="Arial"/>
@@ -15520,14 +15553,14 @@
       </p:grpSpPr>
       <p:sp>
         <p:nvSpPr>
-          <p:cNvPr id="374" name=""/>
+          <p:cNvPr id="376" name=""/>
           <p:cNvSpPr/>
           <p:nvPr/>
         </p:nvSpPr>
         <p:spPr>
           <a:xfrm>
             <a:off x="720000" y="360000"/>
-            <a:ext cx="8638560" cy="898560"/>
+            <a:ext cx="8638200" cy="898200"/>
           </a:xfrm>
           <a:prstGeom prst="rect">
             <a:avLst/>
@@ -15555,7 +15588,11 @@
             </a:pPr>
             <a:r>
               <a:rPr b="0" lang="en-US" sz="3200" spc="-1" strike="noStrike">
-                <a:latin typeface="Arial"/>
+                <a:solidFill>
+                  <a:srgbClr val="000000"/>
+                </a:solidFill>
+                <a:latin typeface="Arial"/>
+                <a:ea typeface="DejaVu Sans"/>
               </a:rPr>
               <a:t>Message Protocol</a:t>
             </a:r>
@@ -15567,14 +15604,14 @@
       </p:sp>
       <p:sp>
         <p:nvSpPr>
-          <p:cNvPr id="375" name=""/>
+          <p:cNvPr id="377" name=""/>
           <p:cNvSpPr/>
           <p:nvPr/>
         </p:nvSpPr>
         <p:spPr>
           <a:xfrm>
             <a:off x="720000" y="1440000"/>
-            <a:ext cx="8423640" cy="3598560"/>
+            <a:ext cx="8423280" cy="3598200"/>
           </a:xfrm>
           <a:prstGeom prst="rect">
             <a:avLst/>
@@ -15595,7 +15632,7 @@
             <a:normAutofit/>
           </a:bodyPr>
           <a:p>
-            <a:pPr marL="432000" indent="-323640">
+            <a:pPr marL="432000" indent="-323280">
               <a:lnSpc>
                 <a:spcPct val="100000"/>
               </a:lnSpc>
@@ -15611,7 +15648,11 @@
             </a:pPr>
             <a:r>
               <a:rPr b="0" lang="en-US" sz="1800" spc="-1" strike="noStrike">
-                <a:latin typeface="Arial"/>
+                <a:solidFill>
+                  <a:srgbClr val="000000"/>
+                </a:solidFill>
+                <a:latin typeface="Arial"/>
+                <a:ea typeface="DejaVu Sans"/>
               </a:rPr>
               <a:t>In-game: Players in their turn send coordinate information to shoot each other’s board to Server, Server process and send result to both players.</a:t>
             </a:r>
@@ -15620,7 +15661,20 @@
             </a:endParaRPr>
           </a:p>
           <a:p>
-            <a:pPr marL="432000" indent="-323640">
+            <a:pPr>
+              <a:lnSpc>
+                <a:spcPct val="100000"/>
+              </a:lnSpc>
+              <a:spcBef>
+                <a:spcPts val="1417"/>
+              </a:spcBef>
+            </a:pPr>
+            <a:endParaRPr b="0" lang="en-US" sz="1800" spc="-1" strike="noStrike">
+              <a:latin typeface="Arial"/>
+            </a:endParaRPr>
+          </a:p>
+          <a:p>
+            <a:pPr marL="432000" indent="-323280">
               <a:lnSpc>
                 <a:spcPct val="100000"/>
               </a:lnSpc>
@@ -15634,12 +15688,142 @@
               <a:buFont typeface="Wingdings" charset="2"/>
               <a:buChar char=""/>
             </a:pPr>
+            <a:r>
+              <a:rPr b="0" lang="en-US" sz="1800" spc="-1" strike="noStrike">
+                <a:solidFill>
+                  <a:srgbClr val="ff0000"/>
+                </a:solidFill>
+                <a:latin typeface="Arial"/>
+                <a:ea typeface="DejaVu Sans"/>
+              </a:rPr>
+              <a:t>Client 1:</a:t>
+            </a:r>
+            <a:r>
+              <a:rPr b="0" lang="en-US" sz="1800" spc="-1" strike="noStrike">
+                <a:solidFill>
+                  <a:srgbClr val="000000"/>
+                </a:solidFill>
+                <a:latin typeface="Arial"/>
+                <a:ea typeface="DejaVu Sans"/>
+              </a:rPr>
+              <a:t> </a:t>
+            </a:r>
+            <a:r>
+              <a:rPr b="0" lang="en-US" sz="1800" spc="-1" strike="noStrike">
+                <a:solidFill>
+                  <a:srgbClr val="000000"/>
+                </a:solidFill>
+                <a:latin typeface="Arial"/>
+                <a:ea typeface="DejaVu Sans"/>
+              </a:rPr>
+              <a:t>	</a:t>
+            </a:r>
+            <a:r>
+              <a:rPr b="0" lang="en-US" sz="1800" spc="-1" strike="noStrike">
+                <a:solidFill>
+                  <a:srgbClr val="000000"/>
+                </a:solidFill>
+                <a:latin typeface="Arial"/>
+                <a:ea typeface="DejaVu Sans"/>
+              </a:rPr>
+              <a:t>	</a:t>
+            </a:r>
+            <a:r>
+              <a:rPr b="0" lang="en-US" sz="1800" spc="-1" strike="noStrike">
+                <a:solidFill>
+                  <a:srgbClr val="000000"/>
+                </a:solidFill>
+                <a:latin typeface="Arial"/>
+                <a:ea typeface="DejaVu Sans"/>
+              </a:rPr>
+              <a:t>	</a:t>
+            </a:r>
+            <a:r>
+              <a:rPr b="0" lang="en-US" sz="1800" spc="-1" strike="noStrike">
+                <a:solidFill>
+                  <a:srgbClr val="000000"/>
+                </a:solidFill>
+                <a:latin typeface="Arial"/>
+                <a:ea typeface="DejaVu Sans"/>
+              </a:rPr>
+              <a:t>	</a:t>
+            </a:r>
+            <a:r>
+              <a:rPr b="0" lang="en-US" sz="1800" spc="-1" strike="noStrike">
+                <a:solidFill>
+                  <a:srgbClr val="00a933"/>
+                </a:solidFill>
+                <a:latin typeface="Arial"/>
+                <a:ea typeface="DejaVu Sans"/>
+              </a:rPr>
+              <a:t>fire : 4-4</a:t>
+            </a:r>
+            <a:r>
+              <a:rPr b="0" lang="en-US" sz="1800" spc="-1" strike="noStrike">
+                <a:solidFill>
+                  <a:srgbClr val="00a933"/>
+                </a:solidFill>
+                <a:latin typeface="Arial"/>
+                <a:ea typeface="DejaVu Sans"/>
+              </a:rPr>
+              <a:t>	</a:t>
+            </a:r>
+            <a:r>
+              <a:rPr b="0" lang="en-US" sz="1800" spc="-1" strike="noStrike">
+                <a:solidFill>
+                  <a:srgbClr val="00a933"/>
+                </a:solidFill>
+                <a:latin typeface="Arial"/>
+                <a:ea typeface="DejaVu Sans"/>
+              </a:rPr>
+              <a:t>	</a:t>
+            </a:r>
+            <a:r>
+              <a:rPr b="0" lang="en-US" sz="1800" spc="-1" strike="noStrike">
+                <a:solidFill>
+                  <a:srgbClr val="00a933"/>
+                </a:solidFill>
+                <a:latin typeface="Arial"/>
+                <a:ea typeface="DejaVu Sans"/>
+              </a:rPr>
+              <a:t>	</a:t>
+            </a:r>
+            <a:r>
+              <a:rPr b="0" lang="en-US" sz="1800" spc="-1" strike="noStrike">
+                <a:solidFill>
+                  <a:srgbClr val="000000"/>
+                </a:solidFill>
+                <a:latin typeface="Arial"/>
+                <a:ea typeface="DejaVu Sans"/>
+              </a:rPr>
+              <a:t>(</a:t>
+            </a:r>
+            <a:r>
+              <a:rPr b="0" lang="en-US" sz="1800" spc="-1" strike="noStrike">
+                <a:solidFill>
+                  <a:srgbClr val="00a933"/>
+                </a:solidFill>
+                <a:latin typeface="Arial"/>
+                <a:ea typeface="DejaVu Sans"/>
+              </a:rPr>
+              <a:t> fire : [Coordinate X]-[Coordinate Y] </a:t>
+            </a:r>
+            <a:r>
+              <a:rPr b="0" lang="en-US" sz="1800" spc="-1" strike="noStrike">
+                <a:solidFill>
+                  <a:srgbClr val="000000"/>
+                </a:solidFill>
+                <a:latin typeface="Arial"/>
+                <a:ea typeface="DejaVu Sans"/>
+              </a:rPr>
+              <a:t>)</a:t>
+            </a:r>
             <a:endParaRPr b="0" lang="en-US" sz="1800" spc="-1" strike="noStrike">
               <a:latin typeface="Arial"/>
             </a:endParaRPr>
           </a:p>
           <a:p>
-            <a:pPr marL="432000" indent="-323640">
+            <a:pPr marL="432000" indent="-323280">
               <a:lnSpc>
                 <a:spcPct val="100000"/>
               </a:lnSpc>
@@ -15659,36 +15843,27 @@
                   <a:srgbClr val="ff0000"/>
                 </a:solidFill>
                 <a:latin typeface="Arial"/>
-              </a:rPr>
-              <a:t>Client 1:</a:t>
+                <a:ea typeface="DejaVu Sans"/>
+              </a:rPr>
+              <a:t>Server → Client 1:</a:t>
             </a:r>
             <a:r>
               <a:rPr b="0" lang="en-US" sz="1800" spc="-1" strike="noStrike">
-                <a:latin typeface="Arial"/>
+                <a:solidFill>
+                  <a:srgbClr val="000000"/>
+                </a:solidFill>
+                <a:latin typeface="Arial"/>
+                <a:ea typeface="DejaVu Sans"/>
               </a:rPr>
               <a:t> </a:t>
             </a:r>
             <a:r>
               <a:rPr b="0" lang="en-US" sz="1800" spc="-1" strike="noStrike">
-                <a:latin typeface="Arial"/>
-              </a:rPr>
-              <a:t>	</a:t>
-            </a:r>
-            <a:r>
-              <a:rPr b="0" lang="en-US" sz="1800" spc="-1" strike="noStrike">
-                <a:latin typeface="Arial"/>
-              </a:rPr>
-              <a:t>	</a:t>
-            </a:r>
-            <a:r>
-              <a:rPr b="0" lang="en-US" sz="1800" spc="-1" strike="noStrike">
-                <a:latin typeface="Arial"/>
-              </a:rPr>
-              <a:t>	</a:t>
-            </a:r>
-            <a:r>
-              <a:rPr b="0" lang="en-US" sz="1800" spc="-1" strike="noStrike">
-                <a:latin typeface="Arial"/>
+                <a:solidFill>
+                  <a:srgbClr val="000000"/>
+                </a:solidFill>
+                <a:latin typeface="Arial"/>
+                <a:ea typeface="DejaVu Sans"/>
               </a:rPr>
               <a:t>	</a:t>
             </a:r>
@@ -15698,69 +15873,16 @@
                   <a:srgbClr val="00a933"/>
                 </a:solidFill>
                 <a:latin typeface="Arial"/>
-              </a:rPr>
-              <a:t>fire : 4-4</a:t>
-            </a:r>
-            <a:r>
-              <a:rPr b="0" lang="en-US" sz="1800" spc="-1" strike="noStrike">
-                <a:solidFill>
-                  <a:srgbClr val="00a933"/>
-                </a:solidFill>
-                <a:latin typeface="Arial"/>
-              </a:rPr>
-              <a:t>	</a:t>
-            </a:r>
-            <a:r>
-              <a:rPr b="0" lang="en-US" sz="1800" spc="-1" strike="noStrike">
-                <a:solidFill>
-                  <a:srgbClr val="00a933"/>
-                </a:solidFill>
-                <a:latin typeface="Arial"/>
-              </a:rPr>
-              <a:t>	</a:t>
-            </a:r>
-            <a:r>
-              <a:rPr b="0" lang="en-US" sz="1800" spc="-1" strike="noStrike">
-                <a:solidFill>
-                  <a:srgbClr val="00a933"/>
-                </a:solidFill>
-                <a:latin typeface="Arial"/>
-              </a:rPr>
-              <a:t>	</a:t>
-            </a:r>
-            <a:r>
-              <a:rPr b="0" lang="en-US" sz="1800" spc="-1" strike="noStrike">
-                <a:solidFill>
-                  <a:srgbClr val="000000"/>
-                </a:solidFill>
-                <a:latin typeface="Arial"/>
-              </a:rPr>
-              <a:t>(</a:t>
-            </a:r>
-            <a:r>
-              <a:rPr b="0" lang="en-US" sz="1800" spc="-1" strike="noStrike">
-                <a:solidFill>
-                  <a:srgbClr val="00a933"/>
-                </a:solidFill>
-                <a:latin typeface="Arial"/>
-              </a:rPr>
-              <a:t> fire : [Coordinate X]-[Coordinate Y] </a:t>
-            </a:r>
-            <a:r>
-              <a:rPr b="0" lang="en-US" sz="1800" spc="-1" strike="noStrike">
-                <a:solidFill>
-                  <a:srgbClr val="000000"/>
-                </a:solidFill>
-                <a:latin typeface="Arial"/>
-              </a:rPr>
-              <a:t>)</a:t>
+                <a:ea typeface="DejaVu Sans"/>
+              </a:rPr>
+              <a:t>miss</a:t>
             </a:r>
             <a:endParaRPr b="0" lang="en-US" sz="1800" spc="-1" strike="noStrike">
               <a:latin typeface="Arial"/>
             </a:endParaRPr>
           </a:p>
           <a:p>
-            <a:pPr marL="432000" indent="-323640">
+            <a:pPr marL="432000" indent="-323280">
               <a:lnSpc>
                 <a:spcPct val="100000"/>
               </a:lnSpc>
@@ -15780,18 +15902,27 @@
                   <a:srgbClr val="ff0000"/>
                 </a:solidFill>
                 <a:latin typeface="Arial"/>
-              </a:rPr>
-              <a:t>Server → Client 1:</a:t>
+                <a:ea typeface="DejaVu Sans"/>
+              </a:rPr>
+              <a:t>Server → Client 2:</a:t>
             </a:r>
             <a:r>
               <a:rPr b="0" lang="en-US" sz="1800" spc="-1" strike="noStrike">
-                <a:latin typeface="Arial"/>
+                <a:solidFill>
+                  <a:srgbClr val="000000"/>
+                </a:solidFill>
+                <a:latin typeface="Arial"/>
+                <a:ea typeface="DejaVu Sans"/>
               </a:rPr>
               <a:t> </a:t>
             </a:r>
             <a:r>
               <a:rPr b="0" lang="en-US" sz="1800" spc="-1" strike="noStrike">
-                <a:latin typeface="Arial"/>
+                <a:solidFill>
+                  <a:srgbClr val="000000"/>
+                </a:solidFill>
+                <a:latin typeface="Arial"/>
+                <a:ea typeface="DejaVu Sans"/>
               </a:rPr>
               <a:t>	</a:t>
             </a:r>
@@ -15801,55 +15932,7 @@
                   <a:srgbClr val="00a933"/>
                 </a:solidFill>
                 <a:latin typeface="Arial"/>
-              </a:rPr>
-              <a:t>miss</a:t>
-            </a:r>
-            <a:endParaRPr b="0" lang="en-US" sz="1800" spc="-1" strike="noStrike">
-              <a:latin typeface="Arial"/>
-            </a:endParaRPr>
-          </a:p>
-          <a:p>
-            <a:pPr marL="432000" indent="-323640">
-              <a:lnSpc>
-                <a:spcPct val="100000"/>
-              </a:lnSpc>
-              <a:spcBef>
-                <a:spcPts val="1417"/>
-              </a:spcBef>
-              <a:buClr>
-                <a:srgbClr val="000000"/>
-              </a:buClr>
-              <a:buSzPct val="45000"/>
-              <a:buFont typeface="Wingdings" charset="2"/>
-              <a:buChar char=""/>
-            </a:pPr>
-            <a:r>
-              <a:rPr b="0" lang="en-US" sz="1800" spc="-1" strike="noStrike">
-                <a:solidFill>
-                  <a:srgbClr val="ff0000"/>
-                </a:solidFill>
-                <a:latin typeface="Arial"/>
-              </a:rPr>
-              <a:t>Server → Client 2:</a:t>
-            </a:r>
-            <a:r>
-              <a:rPr b="0" lang="en-US" sz="1800" spc="-1" strike="noStrike">
-                <a:latin typeface="Arial"/>
-              </a:rPr>
-              <a:t> </a:t>
-            </a:r>
-            <a:r>
-              <a:rPr b="0" lang="en-US" sz="1800" spc="-1" strike="noStrike">
-                <a:latin typeface="Arial"/>
-              </a:rPr>
-              <a:t>	</a:t>
-            </a:r>
-            <a:r>
-              <a:rPr b="0" lang="en-US" sz="1800" spc="-1" strike="noStrike">
-                <a:solidFill>
-                  <a:srgbClr val="00a933"/>
-                </a:solidFill>
-                <a:latin typeface="Arial"/>
+                <a:ea typeface="DejaVu Sans"/>
               </a:rPr>
               <a:t>fire : 4-4-miss</a:t>
             </a:r>
@@ -15861,7 +15944,7 @@
       </p:sp>
       <p:pic>
         <p:nvPicPr>
-          <p:cNvPr id="376" name="" descr=""/>
+          <p:cNvPr id="378" name="" descr=""/>
           <p:cNvPicPr/>
           <p:nvPr/>
         </p:nvPicPr>
@@ -15872,7 +15955,7 @@
         <p:spPr>
           <a:xfrm>
             <a:off x="5715000" y="2971800"/>
-            <a:ext cx="2573640" cy="2573640"/>
+            <a:ext cx="2573280" cy="2573280"/>
           </a:xfrm>
           <a:prstGeom prst="rect">
             <a:avLst/>
@@ -15914,14 +15997,14 @@
       </p:grpSpPr>
       <p:sp>
         <p:nvSpPr>
-          <p:cNvPr id="377" name=""/>
+          <p:cNvPr id="379" name=""/>
           <p:cNvSpPr/>
           <p:nvPr/>
         </p:nvSpPr>
         <p:spPr>
           <a:xfrm>
             <a:off x="720000" y="360000"/>
-            <a:ext cx="8638560" cy="898560"/>
+            <a:ext cx="8638200" cy="898200"/>
           </a:xfrm>
           <a:prstGeom prst="rect">
             <a:avLst/>
@@ -15949,7 +16032,11 @@
             </a:pPr>
             <a:r>
               <a:rPr b="0" lang="en-US" sz="3200" spc="-1" strike="noStrike">
-                <a:latin typeface="Arial"/>
+                <a:solidFill>
+                  <a:srgbClr val="000000"/>
+                </a:solidFill>
+                <a:latin typeface="Arial"/>
+                <a:ea typeface="DejaVu Sans"/>
               </a:rPr>
               <a:t>Message Protocol</a:t>
             </a:r>
@@ -15961,14 +16048,14 @@
       </p:sp>
       <p:sp>
         <p:nvSpPr>
-          <p:cNvPr id="378" name=""/>
+          <p:cNvPr id="380" name=""/>
           <p:cNvSpPr/>
           <p:nvPr/>
         </p:nvSpPr>
         <p:spPr>
           <a:xfrm>
             <a:off x="720000" y="1440000"/>
-            <a:ext cx="8423640" cy="3598560"/>
+            <a:ext cx="8423280" cy="3598200"/>
           </a:xfrm>
           <a:prstGeom prst="rect">
             <a:avLst/>
@@ -15989,7 +16076,7 @@
             <a:normAutofit/>
           </a:bodyPr>
           <a:p>
-            <a:pPr marL="432000" indent="-323640">
+            <a:pPr marL="432000" indent="-323280">
               <a:lnSpc>
                 <a:spcPct val="100000"/>
               </a:lnSpc>
@@ -16005,7 +16092,11 @@
             </a:pPr>
             <a:r>
               <a:rPr b="0" lang="en-US" sz="1800" spc="-1" strike="noStrike">
-                <a:latin typeface="Arial"/>
+                <a:solidFill>
+                  <a:srgbClr val="000000"/>
+                </a:solidFill>
+                <a:latin typeface="Arial"/>
+                <a:ea typeface="DejaVu Sans"/>
               </a:rPr>
               <a:t>When all the ships of a player sunk, Server sends result message to 2 players.  Then both players return to lobby.</a:t>
             </a:r>
@@ -16014,7 +16105,20 @@
             </a:endParaRPr>
           </a:p>
           <a:p>
-            <a:pPr marL="432000" indent="-323640">
+            <a:pPr>
+              <a:lnSpc>
+                <a:spcPct val="100000"/>
+              </a:lnSpc>
+              <a:spcBef>
+                <a:spcPts val="1417"/>
+              </a:spcBef>
+            </a:pPr>
+            <a:endParaRPr b="0" lang="en-US" sz="1800" spc="-1" strike="noStrike">
+              <a:latin typeface="Arial"/>
+            </a:endParaRPr>
+          </a:p>
+          <a:p>
+            <a:pPr marL="432000" indent="-323280">
               <a:lnSpc>
                 <a:spcPct val="100000"/>
               </a:lnSpc>
@@ -16028,12 +16132,52 @@
               <a:buFont typeface="Wingdings" charset="2"/>
               <a:buChar char=""/>
             </a:pPr>
+            <a:r>
+              <a:rPr b="0" lang="en-US" sz="1800" spc="-1" strike="noStrike">
+                <a:solidFill>
+                  <a:srgbClr val="ff0000"/>
+                </a:solidFill>
+                <a:latin typeface="Arial"/>
+                <a:ea typeface="DejaVu Sans"/>
+              </a:rPr>
+              <a:t>Server → Client 1:</a:t>
+            </a:r>
+            <a:r>
+              <a:rPr b="0" lang="en-US" sz="1800" spc="-1" strike="noStrike">
+                <a:solidFill>
+                  <a:srgbClr val="000000"/>
+                </a:solidFill>
+                <a:latin typeface="Arial"/>
+                <a:ea typeface="DejaVu Sans"/>
+              </a:rPr>
+              <a:t> </a:t>
+            </a:r>
+            <a:r>
+              <a:rPr b="0" lang="en-US" sz="1800" spc="-1" strike="noStrike">
+                <a:solidFill>
+                  <a:srgbClr val="000000"/>
+                </a:solidFill>
+                <a:latin typeface="Arial"/>
+                <a:ea typeface="DejaVu Sans"/>
+              </a:rPr>
+              <a:t>	</a:t>
+            </a:r>
+            <a:r>
+              <a:rPr b="0" lang="en-US" sz="1800" spc="-1" strike="noStrike">
+                <a:solidFill>
+                  <a:srgbClr val="00a933"/>
+                </a:solidFill>
+                <a:latin typeface="Arial"/>
+                <a:ea typeface="DejaVu Sans"/>
+              </a:rPr>
+              <a:t>matchend : win</a:t>
+            </a:r>
             <a:endParaRPr b="0" lang="en-US" sz="1800" spc="-1" strike="noStrike">
               <a:latin typeface="Arial"/>
             </a:endParaRPr>
           </a:p>
           <a:p>
-            <a:pPr marL="432000" indent="-323640">
+            <a:pPr marL="432000" indent="-323280">
               <a:lnSpc>
                 <a:spcPct val="100000"/>
               </a:lnSpc>
@@ -16053,18 +16197,27 @@
                   <a:srgbClr val="ff0000"/>
                 </a:solidFill>
                 <a:latin typeface="Arial"/>
-              </a:rPr>
-              <a:t>Server → Client 1:</a:t>
+                <a:ea typeface="DejaVu Sans"/>
+              </a:rPr>
+              <a:t>Server → Client 2:</a:t>
             </a:r>
             <a:r>
               <a:rPr b="0" lang="en-US" sz="1800" spc="-1" strike="noStrike">
-                <a:latin typeface="Arial"/>
+                <a:solidFill>
+                  <a:srgbClr val="000000"/>
+                </a:solidFill>
+                <a:latin typeface="Arial"/>
+                <a:ea typeface="DejaVu Sans"/>
               </a:rPr>
               <a:t> </a:t>
             </a:r>
             <a:r>
               <a:rPr b="0" lang="en-US" sz="1800" spc="-1" strike="noStrike">
-                <a:latin typeface="Arial"/>
+                <a:solidFill>
+                  <a:srgbClr val="000000"/>
+                </a:solidFill>
+                <a:latin typeface="Arial"/>
+                <a:ea typeface="DejaVu Sans"/>
               </a:rPr>
               <a:t>	</a:t>
             </a:r>
@@ -16074,55 +16227,7 @@
                   <a:srgbClr val="00a933"/>
                 </a:solidFill>
                 <a:latin typeface="Arial"/>
-              </a:rPr>
-              <a:t>matchend : win</a:t>
-            </a:r>
-            <a:endParaRPr b="0" lang="en-US" sz="1800" spc="-1" strike="noStrike">
-              <a:latin typeface="Arial"/>
-            </a:endParaRPr>
-          </a:p>
-          <a:p>
-            <a:pPr marL="432000" indent="-323640">
-              <a:lnSpc>
-                <a:spcPct val="100000"/>
-              </a:lnSpc>
-              <a:spcBef>
-                <a:spcPts val="1417"/>
-              </a:spcBef>
-              <a:buClr>
-                <a:srgbClr val="000000"/>
-              </a:buClr>
-              <a:buSzPct val="45000"/>
-              <a:buFont typeface="Wingdings" charset="2"/>
-              <a:buChar char=""/>
-            </a:pPr>
-            <a:r>
-              <a:rPr b="0" lang="en-US" sz="1800" spc="-1" strike="noStrike">
-                <a:solidFill>
-                  <a:srgbClr val="ff0000"/>
-                </a:solidFill>
-                <a:latin typeface="Arial"/>
-              </a:rPr>
-              <a:t>Server → Client 2:</a:t>
-            </a:r>
-            <a:r>
-              <a:rPr b="0" lang="en-US" sz="1800" spc="-1" strike="noStrike">
-                <a:latin typeface="Arial"/>
-              </a:rPr>
-              <a:t> </a:t>
-            </a:r>
-            <a:r>
-              <a:rPr b="0" lang="en-US" sz="1800" spc="-1" strike="noStrike">
-                <a:latin typeface="Arial"/>
-              </a:rPr>
-              <a:t>	</a:t>
-            </a:r>
-            <a:r>
-              <a:rPr b="0" lang="en-US" sz="1800" spc="-1" strike="noStrike">
-                <a:solidFill>
-                  <a:srgbClr val="00a933"/>
-                </a:solidFill>
-                <a:latin typeface="Arial"/>
+                <a:ea typeface="DejaVu Sans"/>
               </a:rPr>
               <a:t>matchend : lose</a:t>
             </a:r>
@@ -16164,14 +16269,14 @@
       </p:grpSpPr>
       <p:sp>
         <p:nvSpPr>
-          <p:cNvPr id="379" name=""/>
+          <p:cNvPr id="381" name=""/>
           <p:cNvSpPr/>
           <p:nvPr/>
         </p:nvSpPr>
         <p:spPr>
           <a:xfrm>
             <a:off x="733320" y="685800"/>
-            <a:ext cx="8638560" cy="4169160"/>
+            <a:ext cx="8638200" cy="4168800"/>
           </a:xfrm>
           <a:prstGeom prst="rect">
             <a:avLst/>
@@ -16252,7 +16357,7 @@
         <p:spPr>
           <a:xfrm>
             <a:off x="720000" y="360000"/>
-            <a:ext cx="8638560" cy="898560"/>
+            <a:ext cx="8638200" cy="898200"/>
           </a:xfrm>
           <a:prstGeom prst="rect">
             <a:avLst/>
@@ -16303,7 +16408,7 @@
         <p:spPr>
           <a:xfrm>
             <a:off x="720000" y="1440000"/>
-            <a:ext cx="4214520" cy="3598560"/>
+            <a:ext cx="4214160" cy="3598200"/>
           </a:xfrm>
           <a:prstGeom prst="rect">
             <a:avLst/>
@@ -16333,7 +16438,7 @@
         <p:spPr>
           <a:xfrm>
             <a:off x="5146920" y="1751040"/>
-            <a:ext cx="4214520" cy="2976480"/>
+            <a:ext cx="4214160" cy="2976120"/>
           </a:xfrm>
           <a:prstGeom prst="rect">
             <a:avLst/>
@@ -16352,7 +16457,7 @@
         <p:spPr>
           <a:xfrm>
             <a:off x="720000" y="1600200"/>
-            <a:ext cx="4079520" cy="2904840"/>
+            <a:ext cx="4079160" cy="2904480"/>
           </a:xfrm>
           <a:prstGeom prst="rect">
             <a:avLst/>
@@ -16519,6 +16624,42 @@
               <a:t>+ The two players are connected through the game’s network and get in a battleship match.</a:t>
             </a:r>
             <a:endParaRPr b="0" lang="en-US" sz="1800" spc="-1" strike="noStrike">
+              <a:latin typeface="Arial"/>
+            </a:endParaRPr>
+          </a:p>
+        </p:txBody>
+      </p:sp>
+      <p:sp>
+        <p:nvSpPr>
+          <p:cNvPr id="343" name=""/>
+          <p:cNvSpPr txBox="1"/>
+          <p:nvPr/>
+        </p:nvSpPr>
+        <p:spPr>
+          <a:xfrm>
+            <a:off x="5257800" y="5029200"/>
+            <a:ext cx="3657600" cy="431640"/>
+          </a:xfrm>
+          <a:prstGeom prst="rect">
+            <a:avLst/>
+          </a:prstGeom>
+          <a:noFill/>
+          <a:ln w="0">
+            <a:noFill/>
+          </a:ln>
+        </p:spPr>
+        <p:txBody>
+          <a:bodyPr lIns="90000" rIns="90000" tIns="45000" bIns="45000">
+            <a:noAutofit/>
+          </a:bodyPr>
+          <a:p>
+            <a:r>
+              <a:rPr b="0" lang="en-US" sz="1200" spc="-1" strike="noStrike">
+                <a:latin typeface="Arial"/>
+              </a:rPr>
+              <a:t>(The image is for illustration, not presented for the final product)</a:t>
+            </a:r>
+            <a:endParaRPr b="0" lang="en-US" sz="1200" spc="-1" strike="noStrike">
               <a:latin typeface="Arial"/>
             </a:endParaRPr>
           </a:p>
@@ -16556,14 +16697,14 @@
       </p:grpSpPr>
       <p:sp>
         <p:nvSpPr>
-          <p:cNvPr id="343" name=""/>
+          <p:cNvPr id="344" name=""/>
           <p:cNvSpPr/>
           <p:nvPr/>
         </p:nvSpPr>
         <p:spPr>
           <a:xfrm>
             <a:off x="720000" y="360000"/>
-            <a:ext cx="8638560" cy="898560"/>
+            <a:ext cx="8638200" cy="898200"/>
           </a:xfrm>
           <a:prstGeom prst="rect">
             <a:avLst/>
@@ -16607,14 +16748,14 @@
       </p:sp>
       <p:sp>
         <p:nvSpPr>
-          <p:cNvPr id="344" name=""/>
+          <p:cNvPr id="345" name=""/>
           <p:cNvSpPr/>
           <p:nvPr/>
         </p:nvSpPr>
         <p:spPr>
           <a:xfrm>
             <a:off x="720000" y="1440000"/>
-            <a:ext cx="4214520" cy="3598560"/>
+            <a:ext cx="4214160" cy="3598200"/>
           </a:xfrm>
           <a:prstGeom prst="rect">
             <a:avLst/>
@@ -16633,7 +16774,7 @@
       </p:sp>
       <p:pic>
         <p:nvPicPr>
-          <p:cNvPr id="345" name="" descr=""/>
+          <p:cNvPr id="346" name="" descr=""/>
           <p:cNvPicPr/>
           <p:nvPr/>
         </p:nvPicPr>
@@ -16644,7 +16785,7 @@
         <p:spPr>
           <a:xfrm>
             <a:off x="5146920" y="1751040"/>
-            <a:ext cx="4214520" cy="2976480"/>
+            <a:ext cx="4214160" cy="2976120"/>
           </a:xfrm>
           <a:prstGeom prst="rect">
             <a:avLst/>
@@ -16656,14 +16797,14 @@
       </p:pic>
       <p:sp>
         <p:nvSpPr>
-          <p:cNvPr id="346" name=""/>
+          <p:cNvPr id="347" name=""/>
           <p:cNvSpPr/>
           <p:nvPr/>
         </p:nvSpPr>
         <p:spPr>
           <a:xfrm>
             <a:off x="720000" y="1600200"/>
-            <a:ext cx="4079520" cy="2904840"/>
+            <a:ext cx="4079160" cy="2904480"/>
           </a:xfrm>
           <a:prstGeom prst="rect">
             <a:avLst/>
@@ -16800,6 +16941,42 @@
               <a:t> cell by cell to each other’s board until all of one player’s ships are sunk.</a:t>
             </a:r>
             <a:endParaRPr b="0" lang="en-US" sz="1800" spc="-1" strike="noStrike">
+              <a:latin typeface="Arial"/>
+            </a:endParaRPr>
+          </a:p>
+        </p:txBody>
+      </p:sp>
+      <p:sp>
+        <p:nvSpPr>
+          <p:cNvPr id="348" name=""/>
+          <p:cNvSpPr txBox="1"/>
+          <p:nvPr/>
+        </p:nvSpPr>
+        <p:spPr>
+          <a:xfrm>
+            <a:off x="5257800" y="5029560"/>
+            <a:ext cx="3657600" cy="431640"/>
+          </a:xfrm>
+          <a:prstGeom prst="rect">
+            <a:avLst/>
+          </a:prstGeom>
+          <a:noFill/>
+          <a:ln w="0">
+            <a:noFill/>
+          </a:ln>
+        </p:spPr>
+        <p:txBody>
+          <a:bodyPr lIns="90000" rIns="90000" tIns="45000" bIns="45000">
+            <a:noAutofit/>
+          </a:bodyPr>
+          <a:p>
+            <a:r>
+              <a:rPr b="0" lang="en-US" sz="1200" spc="-1" strike="noStrike">
+                <a:latin typeface="Arial"/>
+              </a:rPr>
+              <a:t>(The image is for illustration, not presented for the final product)</a:t>
+            </a:r>
+            <a:endParaRPr b="0" lang="en-US" sz="1200" spc="-1" strike="noStrike">
               <a:latin typeface="Arial"/>
             </a:endParaRPr>
           </a:p>
@@ -16837,14 +17014,14 @@
       </p:grpSpPr>
       <p:sp>
         <p:nvSpPr>
-          <p:cNvPr id="347" name=""/>
+          <p:cNvPr id="349" name=""/>
           <p:cNvSpPr/>
           <p:nvPr/>
         </p:nvSpPr>
         <p:spPr>
           <a:xfrm>
             <a:off x="720000" y="360000"/>
-            <a:ext cx="8638560" cy="898560"/>
+            <a:ext cx="8638200" cy="898200"/>
           </a:xfrm>
           <a:prstGeom prst="rect">
             <a:avLst/>
@@ -16888,14 +17065,14 @@
       </p:sp>
       <p:sp>
         <p:nvSpPr>
-          <p:cNvPr id="348" name=""/>
+          <p:cNvPr id="350" name=""/>
           <p:cNvSpPr/>
           <p:nvPr/>
         </p:nvSpPr>
         <p:spPr>
           <a:xfrm>
             <a:off x="720000" y="1440000"/>
-            <a:ext cx="8651880" cy="3598560"/>
+            <a:ext cx="8651520" cy="3598200"/>
           </a:xfrm>
           <a:prstGeom prst="rect">
             <a:avLst/>
@@ -16916,7 +17093,7 @@
             <a:normAutofit fontScale="14000"/>
           </a:bodyPr>
           <a:p>
-            <a:pPr marL="432000" indent="-323280">
+            <a:pPr marL="432000" indent="-322920">
               <a:lnSpc>
                 <a:spcPct val="100000"/>
               </a:lnSpc>
@@ -16945,7 +17122,7 @@
             </a:endParaRPr>
           </a:p>
           <a:p>
-            <a:pPr marL="432000" indent="-323280">
+            <a:pPr marL="432000" indent="-322920">
               <a:lnSpc>
                 <a:spcPct val="100000"/>
               </a:lnSpc>
@@ -16974,7 +17151,7 @@
             </a:endParaRPr>
           </a:p>
           <a:p>
-            <a:pPr marL="432000" indent="-323280">
+            <a:pPr marL="432000" indent="-322920">
               <a:lnSpc>
                 <a:spcPct val="100000"/>
               </a:lnSpc>
@@ -17003,7 +17180,7 @@
             </a:endParaRPr>
           </a:p>
           <a:p>
-            <a:pPr marL="432000" indent="-323280">
+            <a:pPr marL="432000" indent="-322920">
               <a:lnSpc>
                 <a:spcPct val="100000"/>
               </a:lnSpc>
@@ -17032,7 +17209,7 @@
             </a:endParaRPr>
           </a:p>
           <a:p>
-            <a:pPr marL="432000" indent="-323280">
+            <a:pPr marL="432000" indent="-322920">
               <a:lnSpc>
                 <a:spcPct val="100000"/>
               </a:lnSpc>
@@ -17061,7 +17238,7 @@
             </a:endParaRPr>
           </a:p>
           <a:p>
-            <a:pPr marL="432000" indent="-323280">
+            <a:pPr marL="432000" indent="-322920">
               <a:lnSpc>
                 <a:spcPct val="100000"/>
               </a:lnSpc>
@@ -17123,14 +17300,14 @@
       </p:grpSpPr>
       <p:sp>
         <p:nvSpPr>
-          <p:cNvPr id="349" name=""/>
+          <p:cNvPr id="351" name=""/>
           <p:cNvSpPr/>
           <p:nvPr/>
         </p:nvSpPr>
         <p:spPr>
           <a:xfrm>
             <a:off x="720000" y="360000"/>
-            <a:ext cx="8638560" cy="898560"/>
+            <a:ext cx="8638200" cy="898200"/>
           </a:xfrm>
           <a:prstGeom prst="rect">
             <a:avLst/>
@@ -17158,7 +17335,11 @@
             </a:pPr>
             <a:r>
               <a:rPr b="0" lang="en-US" sz="4400" spc="-1" strike="noStrike">
-                <a:latin typeface="Arial"/>
+                <a:solidFill>
+                  <a:srgbClr val="000000"/>
+                </a:solidFill>
+                <a:latin typeface="Arial"/>
+                <a:ea typeface="DejaVu Sans"/>
               </a:rPr>
               <a:t>Application protocol</a:t>
             </a:r>
@@ -17170,14 +17351,14 @@
       </p:sp>
       <p:sp>
         <p:nvSpPr>
-          <p:cNvPr id="350" name=""/>
+          <p:cNvPr id="352" name=""/>
           <p:cNvSpPr/>
           <p:nvPr/>
         </p:nvSpPr>
         <p:spPr>
           <a:xfrm>
             <a:off x="720000" y="1440000"/>
-            <a:ext cx="8195040" cy="3598560"/>
+            <a:ext cx="8194680" cy="3598200"/>
           </a:xfrm>
           <a:prstGeom prst="rect">
             <a:avLst/>
@@ -17198,7 +17379,7 @@
             <a:normAutofit/>
           </a:bodyPr>
           <a:p>
-            <a:pPr marL="432000" indent="-323640">
+            <a:pPr marL="432000" indent="-323280">
               <a:lnSpc>
                 <a:spcPct val="100000"/>
               </a:lnSpc>
@@ -17214,7 +17395,11 @@
             </a:pPr>
             <a:r>
               <a:rPr b="0" lang="en-US" sz="3200" spc="-1" strike="noStrike">
-                <a:latin typeface="Arial"/>
+                <a:solidFill>
+                  <a:srgbClr val="000000"/>
+                </a:solidFill>
+                <a:latin typeface="Arial"/>
+                <a:ea typeface="DejaVu Sans"/>
               </a:rPr>
               <a:t>Architecture: Client / Server</a:t>
             </a:r>
@@ -17223,7 +17408,7 @@
             </a:endParaRPr>
           </a:p>
           <a:p>
-            <a:pPr marL="432000" indent="-323640">
+            <a:pPr marL="432000" indent="-323280">
               <a:lnSpc>
                 <a:spcPct val="100000"/>
               </a:lnSpc>
@@ -17239,7 +17424,11 @@
             </a:pPr>
             <a:r>
               <a:rPr b="0" lang="en-US" sz="3200" spc="-1" strike="noStrike">
-                <a:latin typeface="Arial"/>
+                <a:solidFill>
+                  <a:srgbClr val="000000"/>
+                </a:solidFill>
+                <a:latin typeface="Arial"/>
+                <a:ea typeface="DejaVu Sans"/>
               </a:rPr>
               <a:t>Message type: string</a:t>
             </a:r>
@@ -17248,7 +17437,7 @@
             </a:endParaRPr>
           </a:p>
           <a:p>
-            <a:pPr lvl="2" marL="1296000" indent="-287640">
+            <a:pPr lvl="2" marL="1296000" indent="-287280">
               <a:lnSpc>
                 <a:spcPct val="100000"/>
               </a:lnSpc>
@@ -17268,6 +17457,7 @@
                   <a:srgbClr val="c9211e"/>
                 </a:solidFill>
                 <a:latin typeface="Arial"/>
+                <a:ea typeface="DejaVu Sans"/>
               </a:rPr>
               <a:t>fire : </a:t>
             </a:r>
@@ -17277,6 +17467,7 @@
                   <a:srgbClr val="2a6099"/>
                 </a:solidFill>
                 <a:latin typeface="Arial"/>
+                <a:ea typeface="DejaVu Sans"/>
               </a:rPr>
               <a:t>5-5-miss</a:t>
             </a:r>
@@ -17298,7 +17489,7 @@
             </a:endParaRPr>
           </a:p>
           <a:p>
-            <a:pPr lvl="2" marL="1296000" indent="-287640">
+            <a:pPr lvl="2" marL="1296000" indent="-287280">
               <a:lnSpc>
                 <a:spcPct val="100000"/>
               </a:lnSpc>
@@ -17318,6 +17509,7 @@
                   <a:srgbClr val="ff0000"/>
                 </a:solidFill>
                 <a:latin typeface="Arial"/>
+                <a:ea typeface="DejaVu Sans"/>
               </a:rPr>
               <a:t>(header)</a:t>
             </a:r>
@@ -17327,6 +17519,7 @@
                   <a:srgbClr val="2a6099"/>
                 </a:solidFill>
                 <a:latin typeface="Arial"/>
+                <a:ea typeface="DejaVu Sans"/>
               </a:rPr>
               <a:t>        </a:t>
             </a:r>
@@ -17336,6 +17529,7 @@
                   <a:srgbClr val="2a6099"/>
                 </a:solidFill>
                 <a:latin typeface="Arial"/>
+                <a:ea typeface="DejaVu Sans"/>
               </a:rPr>
               <a:t>	</a:t>
             </a:r>
@@ -17345,6 +17539,7 @@
                   <a:srgbClr val="2a6099"/>
                 </a:solidFill>
                 <a:latin typeface="Arial"/>
+                <a:ea typeface="DejaVu Sans"/>
               </a:rPr>
               <a:t>	</a:t>
             </a:r>
@@ -17354,6 +17549,7 @@
                   <a:srgbClr val="2a6099"/>
                 </a:solidFill>
                 <a:latin typeface="Arial"/>
+                <a:ea typeface="DejaVu Sans"/>
               </a:rPr>
               <a:t>(data)</a:t>
             </a:r>
@@ -17365,7 +17561,7 @@
       </p:sp>
       <p:sp>
         <p:nvSpPr>
-          <p:cNvPr id="351" name=""/>
+          <p:cNvPr id="353" name=""/>
           <p:cNvSpPr/>
           <p:nvPr/>
         </p:nvSpPr>
@@ -17393,7 +17589,7 @@
       </p:sp>
       <p:sp>
         <p:nvSpPr>
-          <p:cNvPr id="352" name=""/>
+          <p:cNvPr id="354" name=""/>
           <p:cNvSpPr/>
           <p:nvPr/>
         </p:nvSpPr>
@@ -17421,7 +17617,7 @@
       </p:sp>
       <p:pic>
         <p:nvPicPr>
-          <p:cNvPr id="353" name="" descr=""/>
+          <p:cNvPr id="355" name="" descr=""/>
           <p:cNvPicPr/>
           <p:nvPr/>
         </p:nvPicPr>
@@ -17432,53 +17628,7 @@
         <p:spPr>
           <a:xfrm>
             <a:off x="7101000" y="1440000"/>
-            <a:ext cx="818640" cy="846000"/>
-          </a:xfrm>
-          <a:prstGeom prst="rect">
-            <a:avLst/>
-          </a:prstGeom>
-          <a:ln w="0">
-            <a:noFill/>
-          </a:ln>
-        </p:spPr>
-      </p:pic>
-      <p:pic>
-        <p:nvPicPr>
-          <p:cNvPr id="354" name="" descr=""/>
-          <p:cNvPicPr/>
-          <p:nvPr/>
-        </p:nvPicPr>
-        <p:blipFill>
-          <a:blip r:embed="rId2"/>
-          <a:stretch/>
-        </p:blipFill>
-        <p:spPr>
-          <a:xfrm>
-            <a:off x="6039360" y="2811600"/>
-            <a:ext cx="818640" cy="846000"/>
-          </a:xfrm>
-          <a:prstGeom prst="rect">
-            <a:avLst/>
-          </a:prstGeom>
-          <a:ln w="0">
-            <a:noFill/>
-          </a:ln>
-        </p:spPr>
-      </p:pic>
-      <p:pic>
-        <p:nvPicPr>
-          <p:cNvPr id="355" name="" descr=""/>
-          <p:cNvPicPr/>
-          <p:nvPr/>
-        </p:nvPicPr>
-        <p:blipFill>
-          <a:blip r:embed="rId3"/>
-          <a:stretch/>
-        </p:blipFill>
-        <p:spPr>
-          <a:xfrm>
-            <a:off x="7182360" y="2811600"/>
-            <a:ext cx="818640" cy="846000"/>
+            <a:ext cx="818280" cy="845640"/>
           </a:xfrm>
           <a:prstGeom prst="rect">
             <a:avLst/>
@@ -17495,13 +17645,59 @@
           <p:nvPr/>
         </p:nvPicPr>
         <p:blipFill>
+          <a:blip r:embed="rId2"/>
+          <a:stretch/>
+        </p:blipFill>
+        <p:spPr>
+          <a:xfrm>
+            <a:off x="6039360" y="2811600"/>
+            <a:ext cx="818280" cy="845640"/>
+          </a:xfrm>
+          <a:prstGeom prst="rect">
+            <a:avLst/>
+          </a:prstGeom>
+          <a:ln w="0">
+            <a:noFill/>
+          </a:ln>
+        </p:spPr>
+      </p:pic>
+      <p:pic>
+        <p:nvPicPr>
+          <p:cNvPr id="357" name="" descr=""/>
+          <p:cNvPicPr/>
+          <p:nvPr/>
+        </p:nvPicPr>
+        <p:blipFill>
+          <a:blip r:embed="rId3"/>
+          <a:stretch/>
+        </p:blipFill>
+        <p:spPr>
+          <a:xfrm>
+            <a:off x="7182360" y="2811600"/>
+            <a:ext cx="818280" cy="845640"/>
+          </a:xfrm>
+          <a:prstGeom prst="rect">
+            <a:avLst/>
+          </a:prstGeom>
+          <a:ln w="0">
+            <a:noFill/>
+          </a:ln>
+        </p:spPr>
+      </p:pic>
+      <p:pic>
+        <p:nvPicPr>
+          <p:cNvPr id="358" name="" descr=""/>
+          <p:cNvPicPr/>
+          <p:nvPr/>
+        </p:nvPicPr>
+        <p:blipFill>
           <a:blip r:embed="rId4"/>
           <a:stretch/>
         </p:blipFill>
         <p:spPr>
           <a:xfrm>
             <a:off x="8325360" y="2811600"/>
-            <a:ext cx="818640" cy="846000"/>
+            <a:ext cx="818280" cy="845640"/>
           </a:xfrm>
           <a:prstGeom prst="rect">
             <a:avLst/>
@@ -17513,7 +17709,7 @@
       </p:pic>
       <p:sp>
         <p:nvSpPr>
-          <p:cNvPr id="357" name=""/>
+          <p:cNvPr id="359" name=""/>
           <p:cNvSpPr/>
           <p:nvPr/>
         </p:nvSpPr>
@@ -17542,7 +17738,7 @@
       </p:sp>
       <p:sp>
         <p:nvSpPr>
-          <p:cNvPr id="358" name=""/>
+          <p:cNvPr id="360" name=""/>
           <p:cNvSpPr/>
           <p:nvPr/>
         </p:nvSpPr>
@@ -17571,7 +17767,7 @@
       </p:sp>
       <p:sp>
         <p:nvSpPr>
-          <p:cNvPr id="359" name=""/>
+          <p:cNvPr id="361" name=""/>
           <p:cNvSpPr/>
           <p:nvPr/>
         </p:nvSpPr>
@@ -17600,14 +17796,14 @@
       </p:sp>
       <p:sp>
         <p:nvSpPr>
-          <p:cNvPr id="360" name=""/>
-          <p:cNvSpPr txBox="1"/>
+          <p:cNvPr id="362" name=""/>
+          <p:cNvSpPr/>
           <p:nvPr/>
         </p:nvSpPr>
         <p:spPr>
           <a:xfrm>
             <a:off x="8001000" y="1687320"/>
-            <a:ext cx="1600200" cy="370080"/>
+            <a:ext cx="1599840" cy="369720"/>
           </a:xfrm>
           <a:prstGeom prst="rect">
             <a:avLst/>
@@ -17617,11 +17813,22 @@
             <a:noFill/>
           </a:ln>
         </p:spPr>
+        <p:style>
+          <a:lnRef idx="0"/>
+          <a:fillRef idx="0"/>
+          <a:effectRef idx="0"/>
+          <a:fontRef idx="minor"/>
+        </p:style>
         <p:txBody>
           <a:bodyPr lIns="90000" rIns="90000" tIns="45000" bIns="45000">
             <a:noAutofit/>
           </a:bodyPr>
           <a:p>
+            <a:pPr>
+              <a:lnSpc>
+                <a:spcPct val="100000"/>
+              </a:lnSpc>
+            </a:pPr>
             <a:r>
               <a:rPr b="0" lang="en-US" sz="1800" spc="-1" strike="noStrike">
                 <a:latin typeface="Arial"/>
@@ -17636,14 +17843,14 @@
       </p:sp>
       <p:sp>
         <p:nvSpPr>
-          <p:cNvPr id="361" name=""/>
-          <p:cNvSpPr txBox="1"/>
+          <p:cNvPr id="363" name=""/>
+          <p:cNvSpPr/>
           <p:nvPr/>
         </p:nvSpPr>
         <p:spPr>
           <a:xfrm>
             <a:off x="5715000" y="3744720"/>
-            <a:ext cx="914400" cy="370080"/>
+            <a:ext cx="914040" cy="369720"/>
           </a:xfrm>
           <a:prstGeom prst="rect">
             <a:avLst/>
@@ -17653,11 +17860,22 @@
             <a:noFill/>
           </a:ln>
         </p:spPr>
+        <p:style>
+          <a:lnRef idx="0"/>
+          <a:fillRef idx="0"/>
+          <a:effectRef idx="0"/>
+          <a:fontRef idx="minor"/>
+        </p:style>
         <p:txBody>
           <a:bodyPr lIns="90000" rIns="90000" tIns="45000" bIns="45000">
             <a:noAutofit/>
           </a:bodyPr>
           <a:p>
+            <a:pPr>
+              <a:lnSpc>
+                <a:spcPct val="100000"/>
+              </a:lnSpc>
+            </a:pPr>
             <a:r>
               <a:rPr b="0" lang="en-US" sz="1800" spc="-1" strike="noStrike">
                 <a:latin typeface="Arial"/>
@@ -17672,14 +17890,14 @@
       </p:sp>
       <p:sp>
         <p:nvSpPr>
-          <p:cNvPr id="362" name=""/>
-          <p:cNvSpPr txBox="1"/>
+          <p:cNvPr id="364" name=""/>
+          <p:cNvSpPr/>
           <p:nvPr/>
         </p:nvSpPr>
         <p:spPr>
           <a:xfrm>
             <a:off x="7086600" y="3744720"/>
-            <a:ext cx="914400" cy="370080"/>
+            <a:ext cx="914040" cy="369720"/>
           </a:xfrm>
           <a:prstGeom prst="rect">
             <a:avLst/>
@@ -17689,11 +17907,22 @@
             <a:noFill/>
           </a:ln>
         </p:spPr>
+        <p:style>
+          <a:lnRef idx="0"/>
+          <a:fillRef idx="0"/>
+          <a:effectRef idx="0"/>
+          <a:fontRef idx="minor"/>
+        </p:style>
         <p:txBody>
           <a:bodyPr lIns="90000" rIns="90000" tIns="45000" bIns="45000">
             <a:noAutofit/>
           </a:bodyPr>
           <a:p>
+            <a:pPr>
+              <a:lnSpc>
+                <a:spcPct val="100000"/>
+              </a:lnSpc>
+            </a:pPr>
             <a:r>
               <a:rPr b="0" lang="en-US" sz="1800" spc="-1" strike="noStrike">
                 <a:latin typeface="Arial"/>
@@ -17708,14 +17937,14 @@
       </p:sp>
       <p:sp>
         <p:nvSpPr>
-          <p:cNvPr id="363" name=""/>
-          <p:cNvSpPr txBox="1"/>
+          <p:cNvPr id="365" name=""/>
+          <p:cNvSpPr/>
           <p:nvPr/>
         </p:nvSpPr>
         <p:spPr>
           <a:xfrm>
             <a:off x="8458200" y="3744720"/>
-            <a:ext cx="914400" cy="370080"/>
+            <a:ext cx="914040" cy="369720"/>
           </a:xfrm>
           <a:prstGeom prst="rect">
             <a:avLst/>
@@ -17725,11 +17954,22 @@
             <a:noFill/>
           </a:ln>
         </p:spPr>
+        <p:style>
+          <a:lnRef idx="0"/>
+          <a:fillRef idx="0"/>
+          <a:effectRef idx="0"/>
+          <a:fontRef idx="minor"/>
+        </p:style>
         <p:txBody>
           <a:bodyPr lIns="90000" rIns="90000" tIns="45000" bIns="45000">
             <a:noAutofit/>
           </a:bodyPr>
           <a:p>
+            <a:pPr>
+              <a:lnSpc>
+                <a:spcPct val="100000"/>
+              </a:lnSpc>
+            </a:pPr>
             <a:r>
               <a:rPr b="0" lang="en-US" sz="1800" spc="-1" strike="noStrike">
                 <a:latin typeface="Arial"/>
@@ -17774,14 +18014,14 @@
       </p:grpSpPr>
       <p:sp>
         <p:nvSpPr>
-          <p:cNvPr id="364" name=""/>
+          <p:cNvPr id="366" name=""/>
           <p:cNvSpPr/>
           <p:nvPr/>
         </p:nvSpPr>
         <p:spPr>
           <a:xfrm>
             <a:off x="720000" y="15840"/>
-            <a:ext cx="8638560" cy="898560"/>
+            <a:ext cx="8638200" cy="898200"/>
           </a:xfrm>
           <a:prstGeom prst="rect">
             <a:avLst/>
@@ -17809,7 +18049,11 @@
             </a:pPr>
             <a:r>
               <a:rPr b="0" lang="en-US" sz="3200" spc="-1" strike="noStrike">
-                <a:latin typeface="Arial"/>
+                <a:solidFill>
+                  <a:srgbClr val="000000"/>
+                </a:solidFill>
+                <a:latin typeface="Arial"/>
+                <a:ea typeface="DejaVu Sans"/>
               </a:rPr>
               <a:t>State Diagram</a:t>
             </a:r>
@@ -17821,7 +18065,7 @@
       </p:sp>
       <p:pic>
         <p:nvPicPr>
-          <p:cNvPr id="365" name="" descr=""/>
+          <p:cNvPr id="367" name="" descr=""/>
           <p:cNvPicPr/>
           <p:nvPr/>
         </p:nvPicPr>
@@ -17831,8 +18075,8 @@
         </p:blipFill>
         <p:spPr>
           <a:xfrm>
-            <a:off x="1828800" y="914400"/>
-            <a:ext cx="7086240" cy="4555800"/>
+            <a:off x="1600200" y="914040"/>
+            <a:ext cx="7086600" cy="4484520"/>
           </a:xfrm>
           <a:prstGeom prst="rect">
             <a:avLst/>
@@ -17874,14 +18118,14 @@
       </p:grpSpPr>
       <p:sp>
         <p:nvSpPr>
-          <p:cNvPr id="366" name=""/>
+          <p:cNvPr id="368" name=""/>
           <p:cNvSpPr/>
           <p:nvPr/>
         </p:nvSpPr>
         <p:spPr>
           <a:xfrm>
             <a:off x="720000" y="360000"/>
-            <a:ext cx="8638560" cy="898560"/>
+            <a:ext cx="8638200" cy="898200"/>
           </a:xfrm>
           <a:prstGeom prst="rect">
             <a:avLst/>
@@ -17909,7 +18153,11 @@
             </a:pPr>
             <a:r>
               <a:rPr b="0" lang="en-US" sz="3200" spc="-1" strike="noStrike">
-                <a:latin typeface="Arial"/>
+                <a:solidFill>
+                  <a:srgbClr val="000000"/>
+                </a:solidFill>
+                <a:latin typeface="Arial"/>
+                <a:ea typeface="DejaVu Sans"/>
               </a:rPr>
               <a:t>Message Protocol</a:t>
             </a:r>
@@ -17921,14 +18169,14 @@
       </p:sp>
       <p:sp>
         <p:nvSpPr>
-          <p:cNvPr id="367" name=""/>
+          <p:cNvPr id="369" name=""/>
           <p:cNvSpPr/>
           <p:nvPr/>
         </p:nvSpPr>
         <p:spPr>
           <a:xfrm>
             <a:off x="720000" y="1430280"/>
-            <a:ext cx="8423640" cy="3598560"/>
+            <a:ext cx="8423280" cy="3598200"/>
           </a:xfrm>
           <a:prstGeom prst="rect">
             <a:avLst/>
@@ -17949,7 +18197,7 @@
             <a:normAutofit/>
           </a:bodyPr>
           <a:p>
-            <a:pPr marL="432000" indent="-323640">
+            <a:pPr marL="432000" indent="-323280">
               <a:lnSpc>
                 <a:spcPct val="100000"/>
               </a:lnSpc>
@@ -17965,7 +18213,11 @@
             </a:pPr>
             <a:r>
               <a:rPr b="0" lang="en-US" sz="1800" spc="-1" strike="noStrike">
-                <a:latin typeface="Arial"/>
+                <a:solidFill>
+                  <a:srgbClr val="000000"/>
+                </a:solidFill>
+                <a:latin typeface="Arial"/>
+                <a:ea typeface="DejaVu Sans"/>
               </a:rPr>
               <a:t>Client connects to Server and input an username and sends to Server</a:t>
             </a:r>
@@ -17974,7 +18226,7 @@
             </a:endParaRPr>
           </a:p>
           <a:p>
-            <a:pPr marL="432000" indent="-323640">
+            <a:pPr marL="432000" indent="-323280">
               <a:lnSpc>
                 <a:spcPct val="100000"/>
               </a:lnSpc>
@@ -17994,6 +18246,7 @@
                   <a:srgbClr val="ff0000"/>
                 </a:solidFill>
                 <a:latin typeface="Arial"/>
+                <a:ea typeface="DejaVu Sans"/>
               </a:rPr>
               <a:t>C: </a:t>
             </a:r>
@@ -18003,6 +18256,7 @@
                   <a:srgbClr val="ff0000"/>
                 </a:solidFill>
                 <a:latin typeface="Arial"/>
+                <a:ea typeface="DejaVu Sans"/>
               </a:rPr>
               <a:t>	</a:t>
             </a:r>
@@ -18012,6 +18266,7 @@
                   <a:srgbClr val="00a933"/>
                 </a:solidFill>
                 <a:latin typeface="Arial"/>
+                <a:ea typeface="DejaVu Sans"/>
               </a:rPr>
               <a:t>login : [username]</a:t>
             </a:r>
@@ -18020,7 +18275,7 @@
             </a:endParaRPr>
           </a:p>
           <a:p>
-            <a:pPr marL="432000" indent="-323640">
+            <a:pPr marL="432000" indent="-323280">
               <a:lnSpc>
                 <a:spcPct val="100000"/>
               </a:lnSpc>
@@ -18040,6 +18295,7 @@
                   <a:srgbClr val="000000"/>
                 </a:solidFill>
                 <a:latin typeface="Arial"/>
+                <a:ea typeface="DejaVu Sans"/>
               </a:rPr>
               <a:t>Server receives and check [username] (which only included alphabet characters and digits)</a:t>
             </a:r>
@@ -18048,7 +18304,7 @@
             </a:endParaRPr>
           </a:p>
           <a:p>
-            <a:pPr marL="432000" indent="-323640">
+            <a:pPr marL="432000" indent="-323280">
               <a:lnSpc>
                 <a:spcPct val="100000"/>
               </a:lnSpc>
@@ -18068,6 +18324,7 @@
                   <a:srgbClr val="000000"/>
                 </a:solidFill>
                 <a:latin typeface="Arial"/>
+                <a:ea typeface="DejaVu Sans"/>
               </a:rPr>
               <a:t>(valid username)    →</a:t>
             </a:r>
@@ -18077,6 +18334,7 @@
                   <a:srgbClr val="00a933"/>
                 </a:solidFill>
                 <a:latin typeface="Arial"/>
+                <a:ea typeface="DejaVu Sans"/>
               </a:rPr>
               <a:t> </a:t>
             </a:r>
@@ -18086,6 +18344,7 @@
                   <a:srgbClr val="ff0000"/>
                 </a:solidFill>
                 <a:latin typeface="Arial"/>
+                <a:ea typeface="DejaVu Sans"/>
               </a:rPr>
               <a:t>S: </a:t>
             </a:r>
@@ -18095,6 +18354,7 @@
                   <a:srgbClr val="ff0000"/>
                 </a:solidFill>
                 <a:latin typeface="Arial"/>
+                <a:ea typeface="DejaVu Sans"/>
               </a:rPr>
               <a:t>	</a:t>
             </a:r>
@@ -18104,6 +18364,7 @@
                   <a:srgbClr val="00a933"/>
                 </a:solidFill>
                 <a:latin typeface="Arial"/>
+                <a:ea typeface="DejaVu Sans"/>
               </a:rPr>
               <a:t>login : 1</a:t>
             </a:r>
@@ -18112,7 +18373,7 @@
             </a:endParaRPr>
           </a:p>
           <a:p>
-            <a:pPr marL="432000" indent="-323640">
+            <a:pPr marL="432000" indent="-323280">
               <a:lnSpc>
                 <a:spcPct val="100000"/>
               </a:lnSpc>
@@ -18132,6 +18393,7 @@
                   <a:srgbClr val="000000"/>
                 </a:solidFill>
                 <a:latin typeface="Arial"/>
+                <a:ea typeface="DejaVu Sans"/>
               </a:rPr>
               <a:t>(invalid username) →</a:t>
             </a:r>
@@ -18141,6 +18403,7 @@
                   <a:srgbClr val="00a933"/>
                 </a:solidFill>
                 <a:latin typeface="Arial"/>
+                <a:ea typeface="DejaVu Sans"/>
               </a:rPr>
               <a:t> </a:t>
             </a:r>
@@ -18150,6 +18413,7 @@
                   <a:srgbClr val="ff0000"/>
                 </a:solidFill>
                 <a:latin typeface="Arial"/>
+                <a:ea typeface="DejaVu Sans"/>
               </a:rPr>
               <a:t>S:</a:t>
             </a:r>
@@ -18159,6 +18423,7 @@
                   <a:srgbClr val="ff0000"/>
                 </a:solidFill>
                 <a:latin typeface="Arial"/>
+                <a:ea typeface="DejaVu Sans"/>
               </a:rPr>
               <a:t>	</a:t>
             </a:r>
@@ -18168,6 +18433,7 @@
                   <a:srgbClr val="00a933"/>
                 </a:solidFill>
                 <a:latin typeface="Arial"/>
+                <a:ea typeface="DejaVu Sans"/>
               </a:rPr>
               <a:t>login : 0</a:t>
             </a:r>
@@ -18209,14 +18475,14 @@
       </p:grpSpPr>
       <p:sp>
         <p:nvSpPr>
-          <p:cNvPr id="368" name=""/>
+          <p:cNvPr id="370" name=""/>
           <p:cNvSpPr/>
           <p:nvPr/>
         </p:nvSpPr>
         <p:spPr>
           <a:xfrm>
             <a:off x="720000" y="360000"/>
-            <a:ext cx="8638560" cy="898560"/>
+            <a:ext cx="8638200" cy="898200"/>
           </a:xfrm>
           <a:prstGeom prst="rect">
             <a:avLst/>
@@ -18244,7 +18510,11 @@
             </a:pPr>
             <a:r>
               <a:rPr b="0" lang="en-US" sz="3200" spc="-1" strike="noStrike">
-                <a:latin typeface="Arial"/>
+                <a:solidFill>
+                  <a:srgbClr val="000000"/>
+                </a:solidFill>
+                <a:latin typeface="Arial"/>
+                <a:ea typeface="DejaVu Sans"/>
               </a:rPr>
               <a:t>Message Protocol</a:t>
             </a:r>
@@ -18256,14 +18526,14 @@
       </p:sp>
       <p:sp>
         <p:nvSpPr>
-          <p:cNvPr id="369" name=""/>
+          <p:cNvPr id="371" name=""/>
           <p:cNvSpPr/>
           <p:nvPr/>
         </p:nvSpPr>
         <p:spPr>
           <a:xfrm>
             <a:off x="720000" y="1440000"/>
-            <a:ext cx="8423640" cy="3598560"/>
+            <a:ext cx="8423280" cy="3598200"/>
           </a:xfrm>
           <a:prstGeom prst="rect">
             <a:avLst/>
@@ -18284,7 +18554,7 @@
             <a:normAutofit/>
           </a:bodyPr>
           <a:p>
-            <a:pPr marL="432000" indent="-323640">
+            <a:pPr marL="432000" indent="-323280">
               <a:lnSpc>
                 <a:spcPct val="100000"/>
               </a:lnSpc>
@@ -18300,7 +18570,11 @@
             </a:pPr>
             <a:r>
               <a:rPr b="0" lang="en-US" sz="1800" spc="-1" strike="noStrike">
-                <a:latin typeface="Arial"/>
+                <a:solidFill>
+                  <a:srgbClr val="000000"/>
+                </a:solidFill>
+                <a:latin typeface="Arial"/>
+                <a:ea typeface="DejaVu Sans"/>
               </a:rPr>
               <a:t>Server will send the list of online users to Clients so they can invite each others.</a:t>
             </a:r>
@@ -18309,7 +18583,7 @@
             </a:endParaRPr>
           </a:p>
           <a:p>
-            <a:pPr marL="432000" indent="-323640">
+            <a:pPr marL="432000" indent="-323280">
               <a:lnSpc>
                 <a:spcPct val="100000"/>
               </a:lnSpc>
@@ -18325,7 +18599,11 @@
             </a:pPr>
             <a:r>
               <a:rPr b="0" lang="en-US" sz="1800" spc="-1" strike="noStrike">
-                <a:latin typeface="Arial"/>
+                <a:solidFill>
+                  <a:srgbClr val="000000"/>
+                </a:solidFill>
+                <a:latin typeface="Arial"/>
+                <a:ea typeface="DejaVu Sans"/>
               </a:rPr>
               <a:t>The Server will add a nametag after usernames to distinguish between similar ones.</a:t>
             </a:r>
@@ -18334,7 +18612,7 @@
             </a:endParaRPr>
           </a:p>
           <a:p>
-            <a:pPr marL="432000" indent="-323640">
+            <a:pPr marL="432000" indent="-323280">
               <a:lnSpc>
                 <a:spcPct val="100000"/>
               </a:lnSpc>
@@ -18354,6 +18632,7 @@
                   <a:srgbClr val="ff0000"/>
                 </a:solidFill>
                 <a:latin typeface="Arial"/>
+                <a:ea typeface="DejaVu Sans"/>
               </a:rPr>
               <a:t>S: </a:t>
             </a:r>
@@ -18363,6 +18642,7 @@
                   <a:srgbClr val="ff0000"/>
                 </a:solidFill>
                 <a:latin typeface="Arial"/>
+                <a:ea typeface="DejaVu Sans"/>
               </a:rPr>
               <a:t>	</a:t>
             </a:r>
@@ -18372,6 +18652,7 @@
                   <a:srgbClr val="00a933"/>
                 </a:solidFill>
                 <a:latin typeface="Arial"/>
+                <a:ea typeface="DejaVu Sans"/>
               </a:rPr>
               <a:t>userlist : [username1]#[tag]/[state] , [username2]#[tag]/[state] .</a:t>
             </a:r>
@@ -18380,7 +18661,7 @@
             </a:endParaRPr>
           </a:p>
           <a:p>
-            <a:pPr marL="432000" indent="-323640">
+            <a:pPr marL="432000" indent="-323280">
               <a:lnSpc>
                 <a:spcPct val="100000"/>
               </a:lnSpc>
@@ -18400,6 +18681,7 @@
                   <a:srgbClr val="000000"/>
                 </a:solidFill>
                 <a:latin typeface="Arial"/>
+                <a:ea typeface="DejaVu Sans"/>
               </a:rPr>
               <a:t>(example:</a:t>
             </a:r>
@@ -18409,6 +18691,7 @@
                   <a:srgbClr val="00a933"/>
                 </a:solidFill>
                 <a:latin typeface="Arial"/>
+                <a:ea typeface="DejaVu Sans"/>
               </a:rPr>
               <a:t> </a:t>
             </a:r>
@@ -18418,6 +18701,7 @@
                   <a:srgbClr val="00a933"/>
                 </a:solidFill>
                 <a:latin typeface="Arial"/>
+                <a:ea typeface="DejaVu Sans"/>
               </a:rPr>
               <a:t>	</a:t>
             </a:r>
@@ -18427,6 +18711,7 @@
                   <a:srgbClr val="00a933"/>
                 </a:solidFill>
                 <a:latin typeface="Arial"/>
+                <a:ea typeface="DejaVu Sans"/>
               </a:rPr>
               <a:t>userlist : Josh#20/A, Paimon#33/P, Josh#69/A, Steve#20/P. </a:t>
             </a:r>
@@ -18436,6 +18721,7 @@
                   <a:srgbClr val="000000"/>
                 </a:solidFill>
                 <a:latin typeface="Arial"/>
+                <a:ea typeface="DejaVu Sans"/>
               </a:rPr>
               <a:t>)</a:t>
             </a:r>
@@ -18444,7 +18730,7 @@
             </a:endParaRPr>
           </a:p>
           <a:p>
-            <a:pPr marL="432000" indent="-323640">
+            <a:pPr marL="432000" indent="-323280">
               <a:lnSpc>
                 <a:spcPct val="100000"/>
               </a:lnSpc>
@@ -18464,6 +18750,7 @@
                   <a:srgbClr val="000000"/>
                 </a:solidFill>
                 <a:latin typeface="Arial"/>
+                <a:ea typeface="DejaVu Sans"/>
               </a:rPr>
               <a:t>(User state: Active (A), Playing (P) )</a:t>
             </a:r>
@@ -18505,14 +18792,14 @@
       </p:grpSpPr>
       <p:sp>
         <p:nvSpPr>
-          <p:cNvPr id="370" name=""/>
+          <p:cNvPr id="372" name=""/>
           <p:cNvSpPr/>
           <p:nvPr/>
         </p:nvSpPr>
         <p:spPr>
           <a:xfrm>
             <a:off x="720000" y="360000"/>
-            <a:ext cx="8638560" cy="898560"/>
+            <a:ext cx="8638200" cy="898200"/>
           </a:xfrm>
           <a:prstGeom prst="rect">
             <a:avLst/>
@@ -18540,7 +18827,11 @@
             </a:pPr>
             <a:r>
               <a:rPr b="0" lang="en-US" sz="3200" spc="-1" strike="noStrike">
-                <a:latin typeface="Arial"/>
+                <a:solidFill>
+                  <a:srgbClr val="000000"/>
+                </a:solidFill>
+                <a:latin typeface="Arial"/>
+                <a:ea typeface="DejaVu Sans"/>
               </a:rPr>
               <a:t>Message Protocol</a:t>
             </a:r>
@@ -18552,14 +18843,14 @@
       </p:sp>
       <p:sp>
         <p:nvSpPr>
-          <p:cNvPr id="371" name=""/>
+          <p:cNvPr id="373" name=""/>
           <p:cNvSpPr/>
           <p:nvPr/>
         </p:nvSpPr>
         <p:spPr>
           <a:xfrm>
             <a:off x="720000" y="1440000"/>
-            <a:ext cx="9109440" cy="3598560"/>
+            <a:ext cx="9109080" cy="3598200"/>
           </a:xfrm>
           <a:prstGeom prst="rect">
             <a:avLst/>
@@ -18580,7 +18871,7 @@
             <a:normAutofit/>
           </a:bodyPr>
           <a:p>
-            <a:pPr marL="432000" indent="-323640">
+            <a:pPr marL="432000" indent="-323280">
               <a:lnSpc>
                 <a:spcPct val="100000"/>
               </a:lnSpc>
@@ -18596,7 +18887,11 @@
             </a:pPr>
             <a:r>
               <a:rPr b="0" lang="en-US" sz="1800" spc="-1" strike="noStrike">
-                <a:latin typeface="Arial"/>
+                <a:solidFill>
+                  <a:srgbClr val="000000"/>
+                </a:solidFill>
+                <a:latin typeface="Arial"/>
+                <a:ea typeface="DejaVu Sans"/>
               </a:rPr>
               <a:t>Client logged in successfully and active in game lobby. In this state Client may: log out, challenge another user, accept/decline a challenge.</a:t>
             </a:r>
@@ -18605,7 +18900,7 @@
             </a:endParaRPr>
           </a:p>
           <a:p>
-            <a:pPr marL="432000" indent="-323640">
+            <a:pPr marL="432000" indent="-323280">
               <a:lnSpc>
                 <a:spcPct val="100000"/>
               </a:lnSpc>
@@ -18625,6 +18920,7 @@
                   <a:srgbClr val="ff0000"/>
                 </a:solidFill>
                 <a:latin typeface="Arial"/>
+                <a:ea typeface="DejaVu Sans"/>
               </a:rPr>
               <a:t>C: </a:t>
             </a:r>
@@ -18634,6 +18930,7 @@
                   <a:srgbClr val="ff0000"/>
                 </a:solidFill>
                 <a:latin typeface="Arial"/>
+                <a:ea typeface="DejaVu Sans"/>
               </a:rPr>
               <a:t>	</a:t>
             </a:r>
@@ -18643,6 +18940,7 @@
                   <a:srgbClr val="00a933"/>
                 </a:solidFill>
                 <a:latin typeface="Arial"/>
+                <a:ea typeface="DejaVu Sans"/>
               </a:rPr>
               <a:t>logout</a:t>
             </a:r>
@@ -18651,7 +18949,7 @@
             </a:endParaRPr>
           </a:p>
           <a:p>
-            <a:pPr marL="432000" indent="-323640">
+            <a:pPr marL="432000" indent="-323280">
               <a:lnSpc>
                 <a:spcPct val="100000"/>
               </a:lnSpc>
@@ -18671,6 +18969,7 @@
                   <a:srgbClr val="ff0000"/>
                 </a:solidFill>
                 <a:latin typeface="Arial"/>
+                <a:ea typeface="DejaVu Sans"/>
               </a:rPr>
               <a:t>C: </a:t>
             </a:r>
@@ -18680,6 +18979,7 @@
                   <a:srgbClr val="ff0000"/>
                 </a:solidFill>
                 <a:latin typeface="Arial"/>
+                <a:ea typeface="DejaVu Sans"/>
               </a:rPr>
               <a:t>	</a:t>
             </a:r>
@@ -18689,6 +18989,7 @@
                   <a:srgbClr val="00a933"/>
                 </a:solidFill>
                 <a:latin typeface="Arial"/>
+                <a:ea typeface="DejaVu Sans"/>
               </a:rPr>
               <a:t>challenge : [username]#[tag]</a:t>
             </a:r>
@@ -18697,7 +18998,7 @@
             </a:endParaRPr>
           </a:p>
           <a:p>
-            <a:pPr marL="432000" indent="-323640">
+            <a:pPr marL="432000" indent="-323280">
               <a:lnSpc>
                 <a:spcPct val="100000"/>
               </a:lnSpc>
@@ -18746,7 +19047,7 @@
             </a:endParaRPr>
           </a:p>
           <a:p>
-            <a:pPr marL="432000" indent="-323640">
+            <a:pPr marL="432000" indent="-323280">
               <a:lnSpc>
                 <a:spcPct val="100000"/>
               </a:lnSpc>
@@ -18795,7 +19096,7 @@
             </a:endParaRPr>
           </a:p>
           <a:p>
-            <a:pPr marL="432000" indent="-323640">
+            <a:pPr marL="432000" indent="-323280">
               <a:lnSpc>
                 <a:spcPct val="100000"/>
               </a:lnSpc>
@@ -18824,7 +19125,7 @@
             </a:endParaRPr>
           </a:p>
           <a:p>
-            <a:pPr marL="432000" indent="-323640">
+            <a:pPr marL="432000" indent="-323280">
               <a:lnSpc>
                 <a:spcPct val="100000"/>
               </a:lnSpc>

</xml_diff>

<commit_message>
add some message protocol for challenging
</commit_message>
<xml_diff>
--- a/Slide/ship.pptx
+++ b/Slide/ship.pptx
@@ -12,26 +12,29 @@
     <p:sldMasterId id="2147483739" r:id="rId9"/>
     <p:sldMasterId id="2147483752" r:id="rId10"/>
     <p:sldMasterId id="2147483765" r:id="rId11"/>
+    <p:sldMasterId id="2147483778" r:id="rId12"/>
   </p:sldMasterIdLst>
   <p:sldIdLst>
-    <p:sldId id="256" r:id="rId12"/>
-    <p:sldId id="257" r:id="rId13"/>
-    <p:sldId id="258" r:id="rId14"/>
-    <p:sldId id="259" r:id="rId15"/>
-    <p:sldId id="260" r:id="rId16"/>
-    <p:sldId id="261" r:id="rId17"/>
-    <p:sldId id="262" r:id="rId18"/>
-    <p:sldId id="263" r:id="rId19"/>
-    <p:sldId id="264" r:id="rId20"/>
-    <p:sldId id="265" r:id="rId21"/>
-    <p:sldId id="266" r:id="rId22"/>
-    <p:sldId id="267" r:id="rId23"/>
-    <p:sldId id="268" r:id="rId24"/>
-    <p:sldId id="269" r:id="rId25"/>
-    <p:sldId id="270" r:id="rId26"/>
-    <p:sldId id="271" r:id="rId27"/>
-    <p:sldId id="272" r:id="rId28"/>
-    <p:sldId id="273" r:id="rId29"/>
+    <p:sldId id="256" r:id="rId13"/>
+    <p:sldId id="257" r:id="rId14"/>
+    <p:sldId id="258" r:id="rId15"/>
+    <p:sldId id="259" r:id="rId16"/>
+    <p:sldId id="260" r:id="rId17"/>
+    <p:sldId id="261" r:id="rId18"/>
+    <p:sldId id="262" r:id="rId19"/>
+    <p:sldId id="263" r:id="rId20"/>
+    <p:sldId id="264" r:id="rId21"/>
+    <p:sldId id="265" r:id="rId22"/>
+    <p:sldId id="266" r:id="rId23"/>
+    <p:sldId id="267" r:id="rId24"/>
+    <p:sldId id="268" r:id="rId25"/>
+    <p:sldId id="269" r:id="rId26"/>
+    <p:sldId id="270" r:id="rId27"/>
+    <p:sldId id="271" r:id="rId28"/>
+    <p:sldId id="272" r:id="rId29"/>
+    <p:sldId id="273" r:id="rId30"/>
+    <p:sldId id="274" r:id="rId31"/>
+    <p:sldId id="275" r:id="rId32"/>
   </p:sldIdLst>
   <p:sldSz cx="10080625" cy="5670550"/>
   <p:notesSz cx="7772400" cy="10058400"/>
@@ -3102,6 +3105,843 @@
 </p:sldLayout>
 </file>
 
+<file path=ppt/slideLayouts/slideLayout121.xml><?xml version="1.0" encoding="utf-8"?>
+<p:sldLayout xmlns:a="http://schemas.openxmlformats.org/drawingml/2006/main" xmlns:p="http://schemas.openxmlformats.org/presentationml/2006/main" xmlns:r="http://schemas.openxmlformats.org/officeDocument/2006/relationships" xmlns:p14="http://schemas.microsoft.com/office/powerpoint/2010/main" xmlns:p15="http://schemas.microsoft.com/office/powerpoint/2012/main" xmlns:mc="http://schemas.openxmlformats.org/markup-compatibility/2006" type="blank" preserve="1">
+  <p:cSld name="Blank Slide">
+    <p:spTree>
+      <p:nvGrpSpPr>
+        <p:cNvPr id="1" name=""/>
+        <p:cNvGrpSpPr/>
+        <p:nvPr/>
+      </p:nvGrpSpPr>
+      <p:grpSpPr>
+        <a:xfrm>
+          <a:off x="0" y="0"/>
+          <a:ext cx="0" cy="0"/>
+          <a:chOff x="0" y="0"/>
+          <a:chExt cx="0" cy="0"/>
+        </a:xfrm>
+      </p:grpSpPr>
+    </p:spTree>
+  </p:cSld>
+</p:sldLayout>
+</file>
+
+<file path=ppt/slideLayouts/slideLayout122.xml><?xml version="1.0" encoding="utf-8"?>
+<p:sldLayout xmlns:a="http://schemas.openxmlformats.org/drawingml/2006/main" xmlns:p="http://schemas.openxmlformats.org/presentationml/2006/main" xmlns:r="http://schemas.openxmlformats.org/officeDocument/2006/relationships" xmlns:p14="http://schemas.microsoft.com/office/powerpoint/2010/main" xmlns:p15="http://schemas.microsoft.com/office/powerpoint/2012/main" xmlns:mc="http://schemas.openxmlformats.org/markup-compatibility/2006" type="tx" preserve="1">
+  <p:cSld name="Title Slide">
+    <p:spTree>
+      <p:nvGrpSpPr>
+        <p:cNvPr id="1" name=""/>
+        <p:cNvGrpSpPr/>
+        <p:nvPr/>
+      </p:nvGrpSpPr>
+      <p:grpSpPr>
+        <a:xfrm>
+          <a:off x="0" y="0"/>
+          <a:ext cx="0" cy="0"/>
+          <a:chOff x="0" y="0"/>
+          <a:chExt cx="0" cy="0"/>
+        </a:xfrm>
+      </p:grpSpPr>
+      <p:sp>
+        <p:nvSpPr>
+          <p:cNvPr id="428" name="PlaceHolder 1"/>
+          <p:cNvSpPr>
+            <a:spLocks noGrp="1"/>
+          </p:cNvSpPr>
+          <p:nvPr>
+            <p:ph type="title"/>
+          </p:nvPr>
+        </p:nvSpPr>
+        <p:spPr>
+          <a:xfrm>
+            <a:off x="504000" y="226080"/>
+            <a:ext cx="9072000" cy="946440"/>
+          </a:xfrm>
+          <a:prstGeom prst="rect">
+            <a:avLst/>
+          </a:prstGeom>
+        </p:spPr>
+        <p:txBody>
+          <a:bodyPr lIns="0" rIns="0" tIns="0" bIns="0" anchor="ctr">
+            <a:noAutofit/>
+          </a:bodyPr>
+          <a:p>
+            <a:pPr algn="ctr"/>
+            <a:endParaRPr b="0" lang="en-US" sz="4400" spc="-1" strike="noStrike">
+              <a:latin typeface="Arial"/>
+            </a:endParaRPr>
+          </a:p>
+        </p:txBody>
+      </p:sp>
+      <p:sp>
+        <p:nvSpPr>
+          <p:cNvPr id="429" name="PlaceHolder 2"/>
+          <p:cNvSpPr>
+            <a:spLocks noGrp="1"/>
+          </p:cNvSpPr>
+          <p:nvPr>
+            <p:ph type="subTitle"/>
+          </p:nvPr>
+        </p:nvSpPr>
+        <p:spPr>
+          <a:xfrm>
+            <a:off x="504000" y="1326600"/>
+            <a:ext cx="9072000" cy="3288600"/>
+          </a:xfrm>
+          <a:prstGeom prst="rect">
+            <a:avLst/>
+          </a:prstGeom>
+        </p:spPr>
+        <p:txBody>
+          <a:bodyPr lIns="0" rIns="0" tIns="0" bIns="0" anchor="ctr">
+            <a:noAutofit/>
+          </a:bodyPr>
+          <a:p>
+            <a:pPr algn="ctr"/>
+            <a:endParaRPr b="0" lang="en-US" sz="3200" spc="-1" strike="noStrike">
+              <a:latin typeface="Arial"/>
+            </a:endParaRPr>
+          </a:p>
+        </p:txBody>
+      </p:sp>
+    </p:spTree>
+  </p:cSld>
+</p:sldLayout>
+</file>
+
+<file path=ppt/slideLayouts/slideLayout123.xml><?xml version="1.0" encoding="utf-8"?>
+<p:sldLayout xmlns:a="http://schemas.openxmlformats.org/drawingml/2006/main" xmlns:p="http://schemas.openxmlformats.org/presentationml/2006/main" xmlns:r="http://schemas.openxmlformats.org/officeDocument/2006/relationships" xmlns:p14="http://schemas.microsoft.com/office/powerpoint/2010/main" xmlns:p15="http://schemas.microsoft.com/office/powerpoint/2012/main" xmlns:mc="http://schemas.openxmlformats.org/markup-compatibility/2006" type="obj" preserve="1">
+  <p:cSld name="Title, Content">
+    <p:spTree>
+      <p:nvGrpSpPr>
+        <p:cNvPr id="1" name=""/>
+        <p:cNvGrpSpPr/>
+        <p:nvPr/>
+      </p:nvGrpSpPr>
+      <p:grpSpPr>
+        <a:xfrm>
+          <a:off x="0" y="0"/>
+          <a:ext cx="0" cy="0"/>
+          <a:chOff x="0" y="0"/>
+          <a:chExt cx="0" cy="0"/>
+        </a:xfrm>
+      </p:grpSpPr>
+      <p:sp>
+        <p:nvSpPr>
+          <p:cNvPr id="430" name="PlaceHolder 1"/>
+          <p:cNvSpPr>
+            <a:spLocks noGrp="1"/>
+          </p:cNvSpPr>
+          <p:nvPr>
+            <p:ph type="title"/>
+          </p:nvPr>
+        </p:nvSpPr>
+        <p:spPr>
+          <a:xfrm>
+            <a:off x="504000" y="226080"/>
+            <a:ext cx="9072000" cy="946440"/>
+          </a:xfrm>
+          <a:prstGeom prst="rect">
+            <a:avLst/>
+          </a:prstGeom>
+        </p:spPr>
+        <p:txBody>
+          <a:bodyPr lIns="0" rIns="0" tIns="0" bIns="0" anchor="ctr">
+            <a:noAutofit/>
+          </a:bodyPr>
+          <a:p>
+            <a:pPr algn="ctr"/>
+            <a:endParaRPr b="0" lang="en-US" sz="4400" spc="-1" strike="noStrike">
+              <a:latin typeface="Arial"/>
+            </a:endParaRPr>
+          </a:p>
+        </p:txBody>
+      </p:sp>
+      <p:sp>
+        <p:nvSpPr>
+          <p:cNvPr id="431" name="PlaceHolder 2"/>
+          <p:cNvSpPr>
+            <a:spLocks noGrp="1"/>
+          </p:cNvSpPr>
+          <p:nvPr>
+            <p:ph type="body"/>
+          </p:nvPr>
+        </p:nvSpPr>
+        <p:spPr>
+          <a:xfrm>
+            <a:off x="504000" y="1326600"/>
+            <a:ext cx="9072000" cy="3288600"/>
+          </a:xfrm>
+          <a:prstGeom prst="rect">
+            <a:avLst/>
+          </a:prstGeom>
+        </p:spPr>
+        <p:txBody>
+          <a:bodyPr lIns="0" rIns="0" tIns="0" bIns="0">
+            <a:normAutofit/>
+          </a:bodyPr>
+          <a:p>
+            <a:endParaRPr b="0" lang="en-US" sz="3200" spc="-1" strike="noStrike">
+              <a:latin typeface="Arial"/>
+            </a:endParaRPr>
+          </a:p>
+        </p:txBody>
+      </p:sp>
+    </p:spTree>
+  </p:cSld>
+</p:sldLayout>
+</file>
+
+<file path=ppt/slideLayouts/slideLayout124.xml><?xml version="1.0" encoding="utf-8"?>
+<p:sldLayout xmlns:a="http://schemas.openxmlformats.org/drawingml/2006/main" xmlns:p="http://schemas.openxmlformats.org/presentationml/2006/main" xmlns:r="http://schemas.openxmlformats.org/officeDocument/2006/relationships" xmlns:p14="http://schemas.microsoft.com/office/powerpoint/2010/main" xmlns:p15="http://schemas.microsoft.com/office/powerpoint/2012/main" xmlns:mc="http://schemas.openxmlformats.org/markup-compatibility/2006" type="twoObj" preserve="1">
+  <p:cSld name="Title, 2 Content">
+    <p:spTree>
+      <p:nvGrpSpPr>
+        <p:cNvPr id="1" name=""/>
+        <p:cNvGrpSpPr/>
+        <p:nvPr/>
+      </p:nvGrpSpPr>
+      <p:grpSpPr>
+        <a:xfrm>
+          <a:off x="0" y="0"/>
+          <a:ext cx="0" cy="0"/>
+          <a:chOff x="0" y="0"/>
+          <a:chExt cx="0" cy="0"/>
+        </a:xfrm>
+      </p:grpSpPr>
+      <p:sp>
+        <p:nvSpPr>
+          <p:cNvPr id="432" name="PlaceHolder 1"/>
+          <p:cNvSpPr>
+            <a:spLocks noGrp="1"/>
+          </p:cNvSpPr>
+          <p:nvPr>
+            <p:ph type="title"/>
+          </p:nvPr>
+        </p:nvSpPr>
+        <p:spPr>
+          <a:xfrm>
+            <a:off x="504000" y="226080"/>
+            <a:ext cx="9072000" cy="946440"/>
+          </a:xfrm>
+          <a:prstGeom prst="rect">
+            <a:avLst/>
+          </a:prstGeom>
+        </p:spPr>
+        <p:txBody>
+          <a:bodyPr lIns="0" rIns="0" tIns="0" bIns="0" anchor="ctr">
+            <a:noAutofit/>
+          </a:bodyPr>
+          <a:p>
+            <a:pPr algn="ctr"/>
+            <a:endParaRPr b="0" lang="en-US" sz="4400" spc="-1" strike="noStrike">
+              <a:latin typeface="Arial"/>
+            </a:endParaRPr>
+          </a:p>
+        </p:txBody>
+      </p:sp>
+      <p:sp>
+        <p:nvSpPr>
+          <p:cNvPr id="433" name="PlaceHolder 2"/>
+          <p:cNvSpPr>
+            <a:spLocks noGrp="1"/>
+          </p:cNvSpPr>
+          <p:nvPr>
+            <p:ph type="body"/>
+          </p:nvPr>
+        </p:nvSpPr>
+        <p:spPr>
+          <a:xfrm>
+            <a:off x="504000" y="1326600"/>
+            <a:ext cx="4426920" cy="3288600"/>
+          </a:xfrm>
+          <a:prstGeom prst="rect">
+            <a:avLst/>
+          </a:prstGeom>
+        </p:spPr>
+        <p:txBody>
+          <a:bodyPr lIns="0" rIns="0" tIns="0" bIns="0">
+            <a:normAutofit/>
+          </a:bodyPr>
+          <a:p>
+            <a:endParaRPr b="0" lang="en-US" sz="3200" spc="-1" strike="noStrike">
+              <a:latin typeface="Arial"/>
+            </a:endParaRPr>
+          </a:p>
+        </p:txBody>
+      </p:sp>
+      <p:sp>
+        <p:nvSpPr>
+          <p:cNvPr id="434" name="PlaceHolder 3"/>
+          <p:cNvSpPr>
+            <a:spLocks noGrp="1"/>
+          </p:cNvSpPr>
+          <p:nvPr>
+            <p:ph type="body"/>
+          </p:nvPr>
+        </p:nvSpPr>
+        <p:spPr>
+          <a:xfrm>
+            <a:off x="5152680" y="1326600"/>
+            <a:ext cx="4426920" cy="3288600"/>
+          </a:xfrm>
+          <a:prstGeom prst="rect">
+            <a:avLst/>
+          </a:prstGeom>
+        </p:spPr>
+        <p:txBody>
+          <a:bodyPr lIns="0" rIns="0" tIns="0" bIns="0">
+            <a:normAutofit/>
+          </a:bodyPr>
+          <a:p>
+            <a:endParaRPr b="0" lang="en-US" sz="3200" spc="-1" strike="noStrike">
+              <a:latin typeface="Arial"/>
+            </a:endParaRPr>
+          </a:p>
+        </p:txBody>
+      </p:sp>
+    </p:spTree>
+  </p:cSld>
+</p:sldLayout>
+</file>
+
+<file path=ppt/slideLayouts/slideLayout125.xml><?xml version="1.0" encoding="utf-8"?>
+<p:sldLayout xmlns:a="http://schemas.openxmlformats.org/drawingml/2006/main" xmlns:p="http://schemas.openxmlformats.org/presentationml/2006/main" xmlns:r="http://schemas.openxmlformats.org/officeDocument/2006/relationships" xmlns:p14="http://schemas.microsoft.com/office/powerpoint/2010/main" xmlns:p15="http://schemas.microsoft.com/office/powerpoint/2012/main" xmlns:mc="http://schemas.openxmlformats.org/markup-compatibility/2006" type="titleOnly" preserve="1">
+  <p:cSld name="Title Only">
+    <p:spTree>
+      <p:nvGrpSpPr>
+        <p:cNvPr id="1" name=""/>
+        <p:cNvGrpSpPr/>
+        <p:nvPr/>
+      </p:nvGrpSpPr>
+      <p:grpSpPr>
+        <a:xfrm>
+          <a:off x="0" y="0"/>
+          <a:ext cx="0" cy="0"/>
+          <a:chOff x="0" y="0"/>
+          <a:chExt cx="0" cy="0"/>
+        </a:xfrm>
+      </p:grpSpPr>
+      <p:sp>
+        <p:nvSpPr>
+          <p:cNvPr id="435" name="PlaceHolder 1"/>
+          <p:cNvSpPr>
+            <a:spLocks noGrp="1"/>
+          </p:cNvSpPr>
+          <p:nvPr>
+            <p:ph type="title"/>
+          </p:nvPr>
+        </p:nvSpPr>
+        <p:spPr>
+          <a:xfrm>
+            <a:off x="504000" y="226080"/>
+            <a:ext cx="9072000" cy="946440"/>
+          </a:xfrm>
+          <a:prstGeom prst="rect">
+            <a:avLst/>
+          </a:prstGeom>
+        </p:spPr>
+        <p:txBody>
+          <a:bodyPr lIns="0" rIns="0" tIns="0" bIns="0" anchor="ctr">
+            <a:noAutofit/>
+          </a:bodyPr>
+          <a:p>
+            <a:pPr algn="ctr"/>
+            <a:endParaRPr b="0" lang="en-US" sz="4400" spc="-1" strike="noStrike">
+              <a:latin typeface="Arial"/>
+            </a:endParaRPr>
+          </a:p>
+        </p:txBody>
+      </p:sp>
+    </p:spTree>
+  </p:cSld>
+</p:sldLayout>
+</file>
+
+<file path=ppt/slideLayouts/slideLayout126.xml><?xml version="1.0" encoding="utf-8"?>
+<p:sldLayout xmlns:a="http://schemas.openxmlformats.org/drawingml/2006/main" xmlns:p="http://schemas.openxmlformats.org/presentationml/2006/main" xmlns:r="http://schemas.openxmlformats.org/officeDocument/2006/relationships" xmlns:p14="http://schemas.microsoft.com/office/powerpoint/2010/main" xmlns:p15="http://schemas.microsoft.com/office/powerpoint/2012/main" xmlns:mc="http://schemas.openxmlformats.org/markup-compatibility/2006" type="objOnly" preserve="1">
+  <p:cSld name="Centered Text">
+    <p:spTree>
+      <p:nvGrpSpPr>
+        <p:cNvPr id="1" name=""/>
+        <p:cNvGrpSpPr/>
+        <p:nvPr/>
+      </p:nvGrpSpPr>
+      <p:grpSpPr>
+        <a:xfrm>
+          <a:off x="0" y="0"/>
+          <a:ext cx="0" cy="0"/>
+          <a:chOff x="0" y="0"/>
+          <a:chExt cx="0" cy="0"/>
+        </a:xfrm>
+      </p:grpSpPr>
+      <p:sp>
+        <p:nvSpPr>
+          <p:cNvPr id="436" name="PlaceHolder 1"/>
+          <p:cNvSpPr>
+            <a:spLocks noGrp="1"/>
+          </p:cNvSpPr>
+          <p:nvPr>
+            <p:ph type="subTitle"/>
+          </p:nvPr>
+        </p:nvSpPr>
+        <p:spPr>
+          <a:xfrm>
+            <a:off x="504000" y="226080"/>
+            <a:ext cx="9072000" cy="4388400"/>
+          </a:xfrm>
+          <a:prstGeom prst="rect">
+            <a:avLst/>
+          </a:prstGeom>
+        </p:spPr>
+        <p:txBody>
+          <a:bodyPr lIns="0" rIns="0" tIns="0" bIns="0" anchor="ctr">
+            <a:noAutofit/>
+          </a:bodyPr>
+          <a:p>
+            <a:pPr algn="ctr"/>
+            <a:endParaRPr b="0" lang="en-US" sz="3200" spc="-1" strike="noStrike">
+              <a:latin typeface="Arial"/>
+            </a:endParaRPr>
+          </a:p>
+        </p:txBody>
+      </p:sp>
+    </p:spTree>
+  </p:cSld>
+</p:sldLayout>
+</file>
+
+<file path=ppt/slideLayouts/slideLayout127.xml><?xml version="1.0" encoding="utf-8"?>
+<p:sldLayout xmlns:a="http://schemas.openxmlformats.org/drawingml/2006/main" xmlns:p="http://schemas.openxmlformats.org/presentationml/2006/main" xmlns:r="http://schemas.openxmlformats.org/officeDocument/2006/relationships" xmlns:p14="http://schemas.microsoft.com/office/powerpoint/2010/main" xmlns:p15="http://schemas.microsoft.com/office/powerpoint/2012/main" xmlns:mc="http://schemas.openxmlformats.org/markup-compatibility/2006" type="twoObjAndObj" preserve="1">
+  <p:cSld name="Title, 2 Content and Content">
+    <p:spTree>
+      <p:nvGrpSpPr>
+        <p:cNvPr id="1" name=""/>
+        <p:cNvGrpSpPr/>
+        <p:nvPr/>
+      </p:nvGrpSpPr>
+      <p:grpSpPr>
+        <a:xfrm>
+          <a:off x="0" y="0"/>
+          <a:ext cx="0" cy="0"/>
+          <a:chOff x="0" y="0"/>
+          <a:chExt cx="0" cy="0"/>
+        </a:xfrm>
+      </p:grpSpPr>
+      <p:sp>
+        <p:nvSpPr>
+          <p:cNvPr id="437" name="PlaceHolder 1"/>
+          <p:cNvSpPr>
+            <a:spLocks noGrp="1"/>
+          </p:cNvSpPr>
+          <p:nvPr>
+            <p:ph type="title"/>
+          </p:nvPr>
+        </p:nvSpPr>
+        <p:spPr>
+          <a:xfrm>
+            <a:off x="504000" y="226080"/>
+            <a:ext cx="9072000" cy="946440"/>
+          </a:xfrm>
+          <a:prstGeom prst="rect">
+            <a:avLst/>
+          </a:prstGeom>
+        </p:spPr>
+        <p:txBody>
+          <a:bodyPr lIns="0" rIns="0" tIns="0" bIns="0" anchor="ctr">
+            <a:noAutofit/>
+          </a:bodyPr>
+          <a:p>
+            <a:pPr algn="ctr"/>
+            <a:endParaRPr b="0" lang="en-US" sz="4400" spc="-1" strike="noStrike">
+              <a:latin typeface="Arial"/>
+            </a:endParaRPr>
+          </a:p>
+        </p:txBody>
+      </p:sp>
+      <p:sp>
+        <p:nvSpPr>
+          <p:cNvPr id="438" name="PlaceHolder 2"/>
+          <p:cNvSpPr>
+            <a:spLocks noGrp="1"/>
+          </p:cNvSpPr>
+          <p:nvPr>
+            <p:ph type="body"/>
+          </p:nvPr>
+        </p:nvSpPr>
+        <p:spPr>
+          <a:xfrm>
+            <a:off x="504000" y="1326600"/>
+            <a:ext cx="4426920" cy="1568520"/>
+          </a:xfrm>
+          <a:prstGeom prst="rect">
+            <a:avLst/>
+          </a:prstGeom>
+        </p:spPr>
+        <p:txBody>
+          <a:bodyPr lIns="0" rIns="0" tIns="0" bIns="0">
+            <a:normAutofit/>
+          </a:bodyPr>
+          <a:p>
+            <a:endParaRPr b="0" lang="en-US" sz="3200" spc="-1" strike="noStrike">
+              <a:latin typeface="Arial"/>
+            </a:endParaRPr>
+          </a:p>
+        </p:txBody>
+      </p:sp>
+      <p:sp>
+        <p:nvSpPr>
+          <p:cNvPr id="439" name="PlaceHolder 3"/>
+          <p:cNvSpPr>
+            <a:spLocks noGrp="1"/>
+          </p:cNvSpPr>
+          <p:nvPr>
+            <p:ph type="body"/>
+          </p:nvPr>
+        </p:nvSpPr>
+        <p:spPr>
+          <a:xfrm>
+            <a:off x="5152680" y="1326600"/>
+            <a:ext cx="4426920" cy="3288600"/>
+          </a:xfrm>
+          <a:prstGeom prst="rect">
+            <a:avLst/>
+          </a:prstGeom>
+        </p:spPr>
+        <p:txBody>
+          <a:bodyPr lIns="0" rIns="0" tIns="0" bIns="0">
+            <a:normAutofit/>
+          </a:bodyPr>
+          <a:p>
+            <a:endParaRPr b="0" lang="en-US" sz="3200" spc="-1" strike="noStrike">
+              <a:latin typeface="Arial"/>
+            </a:endParaRPr>
+          </a:p>
+        </p:txBody>
+      </p:sp>
+      <p:sp>
+        <p:nvSpPr>
+          <p:cNvPr id="440" name="PlaceHolder 4"/>
+          <p:cNvSpPr>
+            <a:spLocks noGrp="1"/>
+          </p:cNvSpPr>
+          <p:nvPr>
+            <p:ph type="body"/>
+          </p:nvPr>
+        </p:nvSpPr>
+        <p:spPr>
+          <a:xfrm>
+            <a:off x="504000" y="3044520"/>
+            <a:ext cx="4426920" cy="1568520"/>
+          </a:xfrm>
+          <a:prstGeom prst="rect">
+            <a:avLst/>
+          </a:prstGeom>
+        </p:spPr>
+        <p:txBody>
+          <a:bodyPr lIns="0" rIns="0" tIns="0" bIns="0">
+            <a:normAutofit/>
+          </a:bodyPr>
+          <a:p>
+            <a:endParaRPr b="0" lang="en-US" sz="3200" spc="-1" strike="noStrike">
+              <a:latin typeface="Arial"/>
+            </a:endParaRPr>
+          </a:p>
+        </p:txBody>
+      </p:sp>
+    </p:spTree>
+  </p:cSld>
+</p:sldLayout>
+</file>
+
+<file path=ppt/slideLayouts/slideLayout128.xml><?xml version="1.0" encoding="utf-8"?>
+<p:sldLayout xmlns:a="http://schemas.openxmlformats.org/drawingml/2006/main" xmlns:p="http://schemas.openxmlformats.org/presentationml/2006/main" xmlns:r="http://schemas.openxmlformats.org/officeDocument/2006/relationships" xmlns:p14="http://schemas.microsoft.com/office/powerpoint/2010/main" xmlns:p15="http://schemas.microsoft.com/office/powerpoint/2012/main" xmlns:mc="http://schemas.openxmlformats.org/markup-compatibility/2006" type="objAndTwoObj" preserve="1">
+  <p:cSld name="Title Content and 2 Content">
+    <p:spTree>
+      <p:nvGrpSpPr>
+        <p:cNvPr id="1" name=""/>
+        <p:cNvGrpSpPr/>
+        <p:nvPr/>
+      </p:nvGrpSpPr>
+      <p:grpSpPr>
+        <a:xfrm>
+          <a:off x="0" y="0"/>
+          <a:ext cx="0" cy="0"/>
+          <a:chOff x="0" y="0"/>
+          <a:chExt cx="0" cy="0"/>
+        </a:xfrm>
+      </p:grpSpPr>
+      <p:sp>
+        <p:nvSpPr>
+          <p:cNvPr id="441" name="PlaceHolder 1"/>
+          <p:cNvSpPr>
+            <a:spLocks noGrp="1"/>
+          </p:cNvSpPr>
+          <p:nvPr>
+            <p:ph type="title"/>
+          </p:nvPr>
+        </p:nvSpPr>
+        <p:spPr>
+          <a:xfrm>
+            <a:off x="504000" y="226080"/>
+            <a:ext cx="9072000" cy="946440"/>
+          </a:xfrm>
+          <a:prstGeom prst="rect">
+            <a:avLst/>
+          </a:prstGeom>
+        </p:spPr>
+        <p:txBody>
+          <a:bodyPr lIns="0" rIns="0" tIns="0" bIns="0" anchor="ctr">
+            <a:noAutofit/>
+          </a:bodyPr>
+          <a:p>
+            <a:pPr algn="ctr"/>
+            <a:endParaRPr b="0" lang="en-US" sz="4400" spc="-1" strike="noStrike">
+              <a:latin typeface="Arial"/>
+            </a:endParaRPr>
+          </a:p>
+        </p:txBody>
+      </p:sp>
+      <p:sp>
+        <p:nvSpPr>
+          <p:cNvPr id="442" name="PlaceHolder 2"/>
+          <p:cNvSpPr>
+            <a:spLocks noGrp="1"/>
+          </p:cNvSpPr>
+          <p:nvPr>
+            <p:ph type="body"/>
+          </p:nvPr>
+        </p:nvSpPr>
+        <p:spPr>
+          <a:xfrm>
+            <a:off x="504000" y="1326600"/>
+            <a:ext cx="4426920" cy="3288600"/>
+          </a:xfrm>
+          <a:prstGeom prst="rect">
+            <a:avLst/>
+          </a:prstGeom>
+        </p:spPr>
+        <p:txBody>
+          <a:bodyPr lIns="0" rIns="0" tIns="0" bIns="0">
+            <a:normAutofit/>
+          </a:bodyPr>
+          <a:p>
+            <a:endParaRPr b="0" lang="en-US" sz="3200" spc="-1" strike="noStrike">
+              <a:latin typeface="Arial"/>
+            </a:endParaRPr>
+          </a:p>
+        </p:txBody>
+      </p:sp>
+      <p:sp>
+        <p:nvSpPr>
+          <p:cNvPr id="443" name="PlaceHolder 3"/>
+          <p:cNvSpPr>
+            <a:spLocks noGrp="1"/>
+          </p:cNvSpPr>
+          <p:nvPr>
+            <p:ph type="body"/>
+          </p:nvPr>
+        </p:nvSpPr>
+        <p:spPr>
+          <a:xfrm>
+            <a:off x="5152680" y="1326600"/>
+            <a:ext cx="4426920" cy="1568520"/>
+          </a:xfrm>
+          <a:prstGeom prst="rect">
+            <a:avLst/>
+          </a:prstGeom>
+        </p:spPr>
+        <p:txBody>
+          <a:bodyPr lIns="0" rIns="0" tIns="0" bIns="0">
+            <a:normAutofit/>
+          </a:bodyPr>
+          <a:p>
+            <a:endParaRPr b="0" lang="en-US" sz="3200" spc="-1" strike="noStrike">
+              <a:latin typeface="Arial"/>
+            </a:endParaRPr>
+          </a:p>
+        </p:txBody>
+      </p:sp>
+      <p:sp>
+        <p:nvSpPr>
+          <p:cNvPr id="444" name="PlaceHolder 4"/>
+          <p:cNvSpPr>
+            <a:spLocks noGrp="1"/>
+          </p:cNvSpPr>
+          <p:nvPr>
+            <p:ph type="body"/>
+          </p:nvPr>
+        </p:nvSpPr>
+        <p:spPr>
+          <a:xfrm>
+            <a:off x="5152680" y="3044520"/>
+            <a:ext cx="4426920" cy="1568520"/>
+          </a:xfrm>
+          <a:prstGeom prst="rect">
+            <a:avLst/>
+          </a:prstGeom>
+        </p:spPr>
+        <p:txBody>
+          <a:bodyPr lIns="0" rIns="0" tIns="0" bIns="0">
+            <a:normAutofit/>
+          </a:bodyPr>
+          <a:p>
+            <a:endParaRPr b="0" lang="en-US" sz="3200" spc="-1" strike="noStrike">
+              <a:latin typeface="Arial"/>
+            </a:endParaRPr>
+          </a:p>
+        </p:txBody>
+      </p:sp>
+    </p:spTree>
+  </p:cSld>
+</p:sldLayout>
+</file>
+
+<file path=ppt/slideLayouts/slideLayout129.xml><?xml version="1.0" encoding="utf-8"?>
+<p:sldLayout xmlns:a="http://schemas.openxmlformats.org/drawingml/2006/main" xmlns:p="http://schemas.openxmlformats.org/presentationml/2006/main" xmlns:r="http://schemas.openxmlformats.org/officeDocument/2006/relationships" xmlns:p14="http://schemas.microsoft.com/office/powerpoint/2010/main" xmlns:p15="http://schemas.microsoft.com/office/powerpoint/2012/main" xmlns:mc="http://schemas.openxmlformats.org/markup-compatibility/2006" type="twoObjOverTx" preserve="1">
+  <p:cSld name="Title, 2 Content over Content">
+    <p:spTree>
+      <p:nvGrpSpPr>
+        <p:cNvPr id="1" name=""/>
+        <p:cNvGrpSpPr/>
+        <p:nvPr/>
+      </p:nvGrpSpPr>
+      <p:grpSpPr>
+        <a:xfrm>
+          <a:off x="0" y="0"/>
+          <a:ext cx="0" cy="0"/>
+          <a:chOff x="0" y="0"/>
+          <a:chExt cx="0" cy="0"/>
+        </a:xfrm>
+      </p:grpSpPr>
+      <p:sp>
+        <p:nvSpPr>
+          <p:cNvPr id="445" name="PlaceHolder 1"/>
+          <p:cNvSpPr>
+            <a:spLocks noGrp="1"/>
+          </p:cNvSpPr>
+          <p:nvPr>
+            <p:ph type="title"/>
+          </p:nvPr>
+        </p:nvSpPr>
+        <p:spPr>
+          <a:xfrm>
+            <a:off x="504000" y="226080"/>
+            <a:ext cx="9072000" cy="946440"/>
+          </a:xfrm>
+          <a:prstGeom prst="rect">
+            <a:avLst/>
+          </a:prstGeom>
+        </p:spPr>
+        <p:txBody>
+          <a:bodyPr lIns="0" rIns="0" tIns="0" bIns="0" anchor="ctr">
+            <a:noAutofit/>
+          </a:bodyPr>
+          <a:p>
+            <a:pPr algn="ctr"/>
+            <a:endParaRPr b="0" lang="en-US" sz="4400" spc="-1" strike="noStrike">
+              <a:latin typeface="Arial"/>
+            </a:endParaRPr>
+          </a:p>
+        </p:txBody>
+      </p:sp>
+      <p:sp>
+        <p:nvSpPr>
+          <p:cNvPr id="446" name="PlaceHolder 2"/>
+          <p:cNvSpPr>
+            <a:spLocks noGrp="1"/>
+          </p:cNvSpPr>
+          <p:nvPr>
+            <p:ph type="body"/>
+          </p:nvPr>
+        </p:nvSpPr>
+        <p:spPr>
+          <a:xfrm>
+            <a:off x="504000" y="1326600"/>
+            <a:ext cx="4426920" cy="1568520"/>
+          </a:xfrm>
+          <a:prstGeom prst="rect">
+            <a:avLst/>
+          </a:prstGeom>
+        </p:spPr>
+        <p:txBody>
+          <a:bodyPr lIns="0" rIns="0" tIns="0" bIns="0">
+            <a:normAutofit/>
+          </a:bodyPr>
+          <a:p>
+            <a:endParaRPr b="0" lang="en-US" sz="3200" spc="-1" strike="noStrike">
+              <a:latin typeface="Arial"/>
+            </a:endParaRPr>
+          </a:p>
+        </p:txBody>
+      </p:sp>
+      <p:sp>
+        <p:nvSpPr>
+          <p:cNvPr id="447" name="PlaceHolder 3"/>
+          <p:cNvSpPr>
+            <a:spLocks noGrp="1"/>
+          </p:cNvSpPr>
+          <p:nvPr>
+            <p:ph type="body"/>
+          </p:nvPr>
+        </p:nvSpPr>
+        <p:spPr>
+          <a:xfrm>
+            <a:off x="5152680" y="1326600"/>
+            <a:ext cx="4426920" cy="1568520"/>
+          </a:xfrm>
+          <a:prstGeom prst="rect">
+            <a:avLst/>
+          </a:prstGeom>
+        </p:spPr>
+        <p:txBody>
+          <a:bodyPr lIns="0" rIns="0" tIns="0" bIns="0">
+            <a:normAutofit/>
+          </a:bodyPr>
+          <a:p>
+            <a:endParaRPr b="0" lang="en-US" sz="3200" spc="-1" strike="noStrike">
+              <a:latin typeface="Arial"/>
+            </a:endParaRPr>
+          </a:p>
+        </p:txBody>
+      </p:sp>
+      <p:sp>
+        <p:nvSpPr>
+          <p:cNvPr id="448" name="PlaceHolder 4"/>
+          <p:cNvSpPr>
+            <a:spLocks noGrp="1"/>
+          </p:cNvSpPr>
+          <p:nvPr>
+            <p:ph type="body"/>
+          </p:nvPr>
+        </p:nvSpPr>
+        <p:spPr>
+          <a:xfrm>
+            <a:off x="504000" y="3044520"/>
+            <a:ext cx="9072000" cy="1568520"/>
+          </a:xfrm>
+          <a:prstGeom prst="rect">
+            <a:avLst/>
+          </a:prstGeom>
+        </p:spPr>
+        <p:txBody>
+          <a:bodyPr lIns="0" rIns="0" tIns="0" bIns="0">
+            <a:normAutofit/>
+          </a:bodyPr>
+          <a:p>
+            <a:endParaRPr b="0" lang="en-US" sz="3200" spc="-1" strike="noStrike">
+              <a:latin typeface="Arial"/>
+            </a:endParaRPr>
+          </a:p>
+        </p:txBody>
+      </p:sp>
+    </p:spTree>
+  </p:cSld>
+</p:sldLayout>
+</file>
+
 <file path=ppt/slideLayouts/slideLayout13.xml><?xml version="1.0" encoding="utf-8"?>
 <p:sldLayout xmlns:a="http://schemas.openxmlformats.org/drawingml/2006/main" xmlns:p="http://schemas.openxmlformats.org/presentationml/2006/main" xmlns:r="http://schemas.openxmlformats.org/officeDocument/2006/relationships" xmlns:p14="http://schemas.microsoft.com/office/powerpoint/2010/main" xmlns:p15="http://schemas.microsoft.com/office/powerpoint/2012/main" xmlns:mc="http://schemas.openxmlformats.org/markup-compatibility/2006" type="blank" preserve="1">
   <p:cSld name="Blank Slide">
@@ -3119,6 +3959,525 @@
           <a:chExt cx="0" cy="0"/>
         </a:xfrm>
       </p:grpSpPr>
+    </p:spTree>
+  </p:cSld>
+</p:sldLayout>
+</file>
+
+<file path=ppt/slideLayouts/slideLayout130.xml><?xml version="1.0" encoding="utf-8"?>
+<p:sldLayout xmlns:a="http://schemas.openxmlformats.org/drawingml/2006/main" xmlns:p="http://schemas.openxmlformats.org/presentationml/2006/main" xmlns:r="http://schemas.openxmlformats.org/officeDocument/2006/relationships" xmlns:p14="http://schemas.microsoft.com/office/powerpoint/2010/main" xmlns:p15="http://schemas.microsoft.com/office/powerpoint/2012/main" xmlns:mc="http://schemas.openxmlformats.org/markup-compatibility/2006" type="objOverTx" preserve="1">
+  <p:cSld name="Title, Content over Content">
+    <p:spTree>
+      <p:nvGrpSpPr>
+        <p:cNvPr id="1" name=""/>
+        <p:cNvGrpSpPr/>
+        <p:nvPr/>
+      </p:nvGrpSpPr>
+      <p:grpSpPr>
+        <a:xfrm>
+          <a:off x="0" y="0"/>
+          <a:ext cx="0" cy="0"/>
+          <a:chOff x="0" y="0"/>
+          <a:chExt cx="0" cy="0"/>
+        </a:xfrm>
+      </p:grpSpPr>
+      <p:sp>
+        <p:nvSpPr>
+          <p:cNvPr id="449" name="PlaceHolder 1"/>
+          <p:cNvSpPr>
+            <a:spLocks noGrp="1"/>
+          </p:cNvSpPr>
+          <p:nvPr>
+            <p:ph type="title"/>
+          </p:nvPr>
+        </p:nvSpPr>
+        <p:spPr>
+          <a:xfrm>
+            <a:off x="504000" y="226080"/>
+            <a:ext cx="9072000" cy="946440"/>
+          </a:xfrm>
+          <a:prstGeom prst="rect">
+            <a:avLst/>
+          </a:prstGeom>
+        </p:spPr>
+        <p:txBody>
+          <a:bodyPr lIns="0" rIns="0" tIns="0" bIns="0" anchor="ctr">
+            <a:noAutofit/>
+          </a:bodyPr>
+          <a:p>
+            <a:pPr algn="ctr"/>
+            <a:endParaRPr b="0" lang="en-US" sz="4400" spc="-1" strike="noStrike">
+              <a:latin typeface="Arial"/>
+            </a:endParaRPr>
+          </a:p>
+        </p:txBody>
+      </p:sp>
+      <p:sp>
+        <p:nvSpPr>
+          <p:cNvPr id="450" name="PlaceHolder 2"/>
+          <p:cNvSpPr>
+            <a:spLocks noGrp="1"/>
+          </p:cNvSpPr>
+          <p:nvPr>
+            <p:ph type="body"/>
+          </p:nvPr>
+        </p:nvSpPr>
+        <p:spPr>
+          <a:xfrm>
+            <a:off x="504000" y="1326600"/>
+            <a:ext cx="9072000" cy="1568520"/>
+          </a:xfrm>
+          <a:prstGeom prst="rect">
+            <a:avLst/>
+          </a:prstGeom>
+        </p:spPr>
+        <p:txBody>
+          <a:bodyPr lIns="0" rIns="0" tIns="0" bIns="0">
+            <a:normAutofit/>
+          </a:bodyPr>
+          <a:p>
+            <a:endParaRPr b="0" lang="en-US" sz="3200" spc="-1" strike="noStrike">
+              <a:latin typeface="Arial"/>
+            </a:endParaRPr>
+          </a:p>
+        </p:txBody>
+      </p:sp>
+      <p:sp>
+        <p:nvSpPr>
+          <p:cNvPr id="451" name="PlaceHolder 3"/>
+          <p:cNvSpPr>
+            <a:spLocks noGrp="1"/>
+          </p:cNvSpPr>
+          <p:nvPr>
+            <p:ph type="body"/>
+          </p:nvPr>
+        </p:nvSpPr>
+        <p:spPr>
+          <a:xfrm>
+            <a:off x="504000" y="3044520"/>
+            <a:ext cx="9072000" cy="1568520"/>
+          </a:xfrm>
+          <a:prstGeom prst="rect">
+            <a:avLst/>
+          </a:prstGeom>
+        </p:spPr>
+        <p:txBody>
+          <a:bodyPr lIns="0" rIns="0" tIns="0" bIns="0">
+            <a:normAutofit/>
+          </a:bodyPr>
+          <a:p>
+            <a:endParaRPr b="0" lang="en-US" sz="3200" spc="-1" strike="noStrike">
+              <a:latin typeface="Arial"/>
+            </a:endParaRPr>
+          </a:p>
+        </p:txBody>
+      </p:sp>
+    </p:spTree>
+  </p:cSld>
+</p:sldLayout>
+</file>
+
+<file path=ppt/slideLayouts/slideLayout131.xml><?xml version="1.0" encoding="utf-8"?>
+<p:sldLayout xmlns:a="http://schemas.openxmlformats.org/drawingml/2006/main" xmlns:p="http://schemas.openxmlformats.org/presentationml/2006/main" xmlns:r="http://schemas.openxmlformats.org/officeDocument/2006/relationships" xmlns:p14="http://schemas.microsoft.com/office/powerpoint/2010/main" xmlns:p15="http://schemas.microsoft.com/office/powerpoint/2012/main" xmlns:mc="http://schemas.openxmlformats.org/markup-compatibility/2006" type="fourObj" preserve="1">
+  <p:cSld name="Title, 4 Content">
+    <p:spTree>
+      <p:nvGrpSpPr>
+        <p:cNvPr id="1" name=""/>
+        <p:cNvGrpSpPr/>
+        <p:nvPr/>
+      </p:nvGrpSpPr>
+      <p:grpSpPr>
+        <a:xfrm>
+          <a:off x="0" y="0"/>
+          <a:ext cx="0" cy="0"/>
+          <a:chOff x="0" y="0"/>
+          <a:chExt cx="0" cy="0"/>
+        </a:xfrm>
+      </p:grpSpPr>
+      <p:sp>
+        <p:nvSpPr>
+          <p:cNvPr id="452" name="PlaceHolder 1"/>
+          <p:cNvSpPr>
+            <a:spLocks noGrp="1"/>
+          </p:cNvSpPr>
+          <p:nvPr>
+            <p:ph type="title"/>
+          </p:nvPr>
+        </p:nvSpPr>
+        <p:spPr>
+          <a:xfrm>
+            <a:off x="504000" y="226080"/>
+            <a:ext cx="9072000" cy="946440"/>
+          </a:xfrm>
+          <a:prstGeom prst="rect">
+            <a:avLst/>
+          </a:prstGeom>
+        </p:spPr>
+        <p:txBody>
+          <a:bodyPr lIns="0" rIns="0" tIns="0" bIns="0" anchor="ctr">
+            <a:noAutofit/>
+          </a:bodyPr>
+          <a:p>
+            <a:pPr algn="ctr"/>
+            <a:endParaRPr b="0" lang="en-US" sz="4400" spc="-1" strike="noStrike">
+              <a:latin typeface="Arial"/>
+            </a:endParaRPr>
+          </a:p>
+        </p:txBody>
+      </p:sp>
+      <p:sp>
+        <p:nvSpPr>
+          <p:cNvPr id="453" name="PlaceHolder 2"/>
+          <p:cNvSpPr>
+            <a:spLocks noGrp="1"/>
+          </p:cNvSpPr>
+          <p:nvPr>
+            <p:ph type="body"/>
+          </p:nvPr>
+        </p:nvSpPr>
+        <p:spPr>
+          <a:xfrm>
+            <a:off x="504000" y="1326600"/>
+            <a:ext cx="4426920" cy="1568520"/>
+          </a:xfrm>
+          <a:prstGeom prst="rect">
+            <a:avLst/>
+          </a:prstGeom>
+        </p:spPr>
+        <p:txBody>
+          <a:bodyPr lIns="0" rIns="0" tIns="0" bIns="0">
+            <a:normAutofit/>
+          </a:bodyPr>
+          <a:p>
+            <a:endParaRPr b="0" lang="en-US" sz="3200" spc="-1" strike="noStrike">
+              <a:latin typeface="Arial"/>
+            </a:endParaRPr>
+          </a:p>
+        </p:txBody>
+      </p:sp>
+      <p:sp>
+        <p:nvSpPr>
+          <p:cNvPr id="454" name="PlaceHolder 3"/>
+          <p:cNvSpPr>
+            <a:spLocks noGrp="1"/>
+          </p:cNvSpPr>
+          <p:nvPr>
+            <p:ph type="body"/>
+          </p:nvPr>
+        </p:nvSpPr>
+        <p:spPr>
+          <a:xfrm>
+            <a:off x="5152680" y="1326600"/>
+            <a:ext cx="4426920" cy="1568520"/>
+          </a:xfrm>
+          <a:prstGeom prst="rect">
+            <a:avLst/>
+          </a:prstGeom>
+        </p:spPr>
+        <p:txBody>
+          <a:bodyPr lIns="0" rIns="0" tIns="0" bIns="0">
+            <a:normAutofit/>
+          </a:bodyPr>
+          <a:p>
+            <a:endParaRPr b="0" lang="en-US" sz="3200" spc="-1" strike="noStrike">
+              <a:latin typeface="Arial"/>
+            </a:endParaRPr>
+          </a:p>
+        </p:txBody>
+      </p:sp>
+      <p:sp>
+        <p:nvSpPr>
+          <p:cNvPr id="455" name="PlaceHolder 4"/>
+          <p:cNvSpPr>
+            <a:spLocks noGrp="1"/>
+          </p:cNvSpPr>
+          <p:nvPr>
+            <p:ph type="body"/>
+          </p:nvPr>
+        </p:nvSpPr>
+        <p:spPr>
+          <a:xfrm>
+            <a:off x="504000" y="3044520"/>
+            <a:ext cx="4426920" cy="1568520"/>
+          </a:xfrm>
+          <a:prstGeom prst="rect">
+            <a:avLst/>
+          </a:prstGeom>
+        </p:spPr>
+        <p:txBody>
+          <a:bodyPr lIns="0" rIns="0" tIns="0" bIns="0">
+            <a:normAutofit/>
+          </a:bodyPr>
+          <a:p>
+            <a:endParaRPr b="0" lang="en-US" sz="3200" spc="-1" strike="noStrike">
+              <a:latin typeface="Arial"/>
+            </a:endParaRPr>
+          </a:p>
+        </p:txBody>
+      </p:sp>
+      <p:sp>
+        <p:nvSpPr>
+          <p:cNvPr id="456" name="PlaceHolder 5"/>
+          <p:cNvSpPr>
+            <a:spLocks noGrp="1"/>
+          </p:cNvSpPr>
+          <p:nvPr>
+            <p:ph type="body"/>
+          </p:nvPr>
+        </p:nvSpPr>
+        <p:spPr>
+          <a:xfrm>
+            <a:off x="5152680" y="3044520"/>
+            <a:ext cx="4426920" cy="1568520"/>
+          </a:xfrm>
+          <a:prstGeom prst="rect">
+            <a:avLst/>
+          </a:prstGeom>
+        </p:spPr>
+        <p:txBody>
+          <a:bodyPr lIns="0" rIns="0" tIns="0" bIns="0">
+            <a:normAutofit/>
+          </a:bodyPr>
+          <a:p>
+            <a:endParaRPr b="0" lang="en-US" sz="3200" spc="-1" strike="noStrike">
+              <a:latin typeface="Arial"/>
+            </a:endParaRPr>
+          </a:p>
+        </p:txBody>
+      </p:sp>
+    </p:spTree>
+  </p:cSld>
+</p:sldLayout>
+</file>
+
+<file path=ppt/slideLayouts/slideLayout132.xml><?xml version="1.0" encoding="utf-8"?>
+<p:sldLayout xmlns:a="http://schemas.openxmlformats.org/drawingml/2006/main" xmlns:p="http://schemas.openxmlformats.org/presentationml/2006/main" xmlns:r="http://schemas.openxmlformats.org/officeDocument/2006/relationships" xmlns:p14="http://schemas.microsoft.com/office/powerpoint/2010/main" xmlns:p15="http://schemas.microsoft.com/office/powerpoint/2012/main" xmlns:mc="http://schemas.openxmlformats.org/markup-compatibility/2006" type="blank" preserve="1">
+  <p:cSld name="Title, 6 Content">
+    <p:spTree>
+      <p:nvGrpSpPr>
+        <p:cNvPr id="1" name=""/>
+        <p:cNvGrpSpPr/>
+        <p:nvPr/>
+      </p:nvGrpSpPr>
+      <p:grpSpPr>
+        <a:xfrm>
+          <a:off x="0" y="0"/>
+          <a:ext cx="0" cy="0"/>
+          <a:chOff x="0" y="0"/>
+          <a:chExt cx="0" cy="0"/>
+        </a:xfrm>
+      </p:grpSpPr>
+      <p:sp>
+        <p:nvSpPr>
+          <p:cNvPr id="457" name="PlaceHolder 1"/>
+          <p:cNvSpPr>
+            <a:spLocks noGrp="1"/>
+          </p:cNvSpPr>
+          <p:nvPr>
+            <p:ph type="title"/>
+          </p:nvPr>
+        </p:nvSpPr>
+        <p:spPr>
+          <a:xfrm>
+            <a:off x="504000" y="226080"/>
+            <a:ext cx="9072000" cy="946440"/>
+          </a:xfrm>
+          <a:prstGeom prst="rect">
+            <a:avLst/>
+          </a:prstGeom>
+        </p:spPr>
+        <p:txBody>
+          <a:bodyPr lIns="0" rIns="0" tIns="0" bIns="0" anchor="ctr">
+            <a:noAutofit/>
+          </a:bodyPr>
+          <a:p>
+            <a:pPr algn="ctr"/>
+            <a:endParaRPr b="0" lang="en-US" sz="4400" spc="-1" strike="noStrike">
+              <a:latin typeface="Arial"/>
+            </a:endParaRPr>
+          </a:p>
+        </p:txBody>
+      </p:sp>
+      <p:sp>
+        <p:nvSpPr>
+          <p:cNvPr id="458" name="PlaceHolder 2"/>
+          <p:cNvSpPr>
+            <a:spLocks noGrp="1"/>
+          </p:cNvSpPr>
+          <p:nvPr>
+            <p:ph type="body"/>
+          </p:nvPr>
+        </p:nvSpPr>
+        <p:spPr>
+          <a:xfrm>
+            <a:off x="504000" y="1326600"/>
+            <a:ext cx="2921040" cy="1568520"/>
+          </a:xfrm>
+          <a:prstGeom prst="rect">
+            <a:avLst/>
+          </a:prstGeom>
+        </p:spPr>
+        <p:txBody>
+          <a:bodyPr lIns="0" rIns="0" tIns="0" bIns="0">
+            <a:normAutofit/>
+          </a:bodyPr>
+          <a:p>
+            <a:endParaRPr b="0" lang="en-US" sz="3200" spc="-1" strike="noStrike">
+              <a:latin typeface="Arial"/>
+            </a:endParaRPr>
+          </a:p>
+        </p:txBody>
+      </p:sp>
+      <p:sp>
+        <p:nvSpPr>
+          <p:cNvPr id="459" name="PlaceHolder 3"/>
+          <p:cNvSpPr>
+            <a:spLocks noGrp="1"/>
+          </p:cNvSpPr>
+          <p:nvPr>
+            <p:ph type="body"/>
+          </p:nvPr>
+        </p:nvSpPr>
+        <p:spPr>
+          <a:xfrm>
+            <a:off x="3571560" y="1326600"/>
+            <a:ext cx="2921040" cy="1568520"/>
+          </a:xfrm>
+          <a:prstGeom prst="rect">
+            <a:avLst/>
+          </a:prstGeom>
+        </p:spPr>
+        <p:txBody>
+          <a:bodyPr lIns="0" rIns="0" tIns="0" bIns="0">
+            <a:normAutofit/>
+          </a:bodyPr>
+          <a:p>
+            <a:endParaRPr b="0" lang="en-US" sz="3200" spc="-1" strike="noStrike">
+              <a:latin typeface="Arial"/>
+            </a:endParaRPr>
+          </a:p>
+        </p:txBody>
+      </p:sp>
+      <p:sp>
+        <p:nvSpPr>
+          <p:cNvPr id="460" name="PlaceHolder 4"/>
+          <p:cNvSpPr>
+            <a:spLocks noGrp="1"/>
+          </p:cNvSpPr>
+          <p:nvPr>
+            <p:ph type="body"/>
+          </p:nvPr>
+        </p:nvSpPr>
+        <p:spPr>
+          <a:xfrm>
+            <a:off x="6639120" y="1326600"/>
+            <a:ext cx="2921040" cy="1568520"/>
+          </a:xfrm>
+          <a:prstGeom prst="rect">
+            <a:avLst/>
+          </a:prstGeom>
+        </p:spPr>
+        <p:txBody>
+          <a:bodyPr lIns="0" rIns="0" tIns="0" bIns="0">
+            <a:normAutofit/>
+          </a:bodyPr>
+          <a:p>
+            <a:endParaRPr b="0" lang="en-US" sz="3200" spc="-1" strike="noStrike">
+              <a:latin typeface="Arial"/>
+            </a:endParaRPr>
+          </a:p>
+        </p:txBody>
+      </p:sp>
+      <p:sp>
+        <p:nvSpPr>
+          <p:cNvPr id="461" name="PlaceHolder 5"/>
+          <p:cNvSpPr>
+            <a:spLocks noGrp="1"/>
+          </p:cNvSpPr>
+          <p:nvPr>
+            <p:ph type="body"/>
+          </p:nvPr>
+        </p:nvSpPr>
+        <p:spPr>
+          <a:xfrm>
+            <a:off x="504000" y="3044520"/>
+            <a:ext cx="2921040" cy="1568520"/>
+          </a:xfrm>
+          <a:prstGeom prst="rect">
+            <a:avLst/>
+          </a:prstGeom>
+        </p:spPr>
+        <p:txBody>
+          <a:bodyPr lIns="0" rIns="0" tIns="0" bIns="0">
+            <a:normAutofit/>
+          </a:bodyPr>
+          <a:p>
+            <a:endParaRPr b="0" lang="en-US" sz="3200" spc="-1" strike="noStrike">
+              <a:latin typeface="Arial"/>
+            </a:endParaRPr>
+          </a:p>
+        </p:txBody>
+      </p:sp>
+      <p:sp>
+        <p:nvSpPr>
+          <p:cNvPr id="462" name="PlaceHolder 6"/>
+          <p:cNvSpPr>
+            <a:spLocks noGrp="1"/>
+          </p:cNvSpPr>
+          <p:nvPr>
+            <p:ph type="body"/>
+          </p:nvPr>
+        </p:nvSpPr>
+        <p:spPr>
+          <a:xfrm>
+            <a:off x="3571560" y="3044520"/>
+            <a:ext cx="2921040" cy="1568520"/>
+          </a:xfrm>
+          <a:prstGeom prst="rect">
+            <a:avLst/>
+          </a:prstGeom>
+        </p:spPr>
+        <p:txBody>
+          <a:bodyPr lIns="0" rIns="0" tIns="0" bIns="0">
+            <a:normAutofit/>
+          </a:bodyPr>
+          <a:p>
+            <a:endParaRPr b="0" lang="en-US" sz="3200" spc="-1" strike="noStrike">
+              <a:latin typeface="Arial"/>
+            </a:endParaRPr>
+          </a:p>
+        </p:txBody>
+      </p:sp>
+      <p:sp>
+        <p:nvSpPr>
+          <p:cNvPr id="463" name="PlaceHolder 7"/>
+          <p:cNvSpPr>
+            <a:spLocks noGrp="1"/>
+          </p:cNvSpPr>
+          <p:nvPr>
+            <p:ph type="body"/>
+          </p:nvPr>
+        </p:nvSpPr>
+        <p:spPr>
+          <a:xfrm>
+            <a:off x="6639120" y="3044520"/>
+            <a:ext cx="2921040" cy="1568520"/>
+          </a:xfrm>
+          <a:prstGeom prst="rect">
+            <a:avLst/>
+          </a:prstGeom>
+        </p:spPr>
+        <p:txBody>
+          <a:bodyPr lIns="0" rIns="0" tIns="0" bIns="0">
+            <a:normAutofit/>
+          </a:bodyPr>
+          <a:p>
+            <a:endParaRPr b="0" lang="en-US" sz="3200" spc="-1" strike="noStrike">
+              <a:latin typeface="Arial"/>
+            </a:endParaRPr>
+          </a:p>
+        </p:txBody>
+      </p:sp>
     </p:spTree>
   </p:cSld>
 </p:sldLayout>
@@ -13624,7 +14983,7 @@
         <p:spPr>
           <a:xfrm>
             <a:off x="0" y="4320000"/>
-            <a:ext cx="1977840" cy="1347840"/>
+            <a:ext cx="1977480" cy="1347480"/>
           </a:xfrm>
           <a:custGeom>
             <a:avLst/>
@@ -13672,7 +15031,7 @@
         <p:spPr>
           <a:xfrm>
             <a:off x="0" y="0"/>
-            <a:ext cx="1077840" cy="3417840"/>
+            <a:ext cx="1077480" cy="3417480"/>
           </a:xfrm>
           <a:custGeom>
             <a:avLst/>
@@ -13720,7 +15079,7 @@
         <p:spPr>
           <a:xfrm>
             <a:off x="7740000" y="0"/>
-            <a:ext cx="2337840" cy="1617840"/>
+            <a:ext cx="2337480" cy="1617480"/>
           </a:xfrm>
           <a:custGeom>
             <a:avLst/>
@@ -13768,7 +15127,7 @@
         <p:spPr>
           <a:xfrm>
             <a:off x="9000000" y="2520000"/>
-            <a:ext cx="1077840" cy="3147840"/>
+            <a:ext cx="1077480" cy="3147480"/>
           </a:xfrm>
           <a:custGeom>
             <a:avLst/>
@@ -14069,7 +15428,7 @@
         <p:spPr>
           <a:xfrm>
             <a:off x="0" y="4320000"/>
-            <a:ext cx="1977840" cy="1347840"/>
+            <a:ext cx="1977480" cy="1347480"/>
           </a:xfrm>
           <a:custGeom>
             <a:avLst/>
@@ -14117,7 +15476,7 @@
         <p:spPr>
           <a:xfrm>
             <a:off x="0" y="0"/>
-            <a:ext cx="1077840" cy="3417840"/>
+            <a:ext cx="1077480" cy="3417480"/>
           </a:xfrm>
           <a:custGeom>
             <a:avLst/>
@@ -14165,7 +15524,7 @@
         <p:spPr>
           <a:xfrm>
             <a:off x="7740000" y="0"/>
-            <a:ext cx="2337840" cy="1617840"/>
+            <a:ext cx="2337480" cy="1617480"/>
           </a:xfrm>
           <a:custGeom>
             <a:avLst/>
@@ -14213,7 +15572,7 @@
         <p:spPr>
           <a:xfrm>
             <a:off x="9000000" y="2520000"/>
-            <a:ext cx="1077840" cy="3147840"/>
+            <a:ext cx="1077480" cy="3147480"/>
           </a:xfrm>
           <a:custGeom>
             <a:avLst/>
@@ -14488,7 +15847,7 @@
 </p:sldMaster>
 </file>
 
-<file path=ppt/slideMasters/slideMaster2.xml><?xml version="1.0" encoding="utf-8"?>
+<file path=ppt/slideMasters/slideMaster11.xml><?xml version="1.0" encoding="utf-8"?>
 <p:sldMaster xmlns:a="http://schemas.openxmlformats.org/drawingml/2006/main" xmlns:p="http://schemas.openxmlformats.org/presentationml/2006/main" xmlns:r="http://schemas.openxmlformats.org/officeDocument/2006/relationships" xmlns:p14="http://schemas.microsoft.com/office/powerpoint/2010/main" xmlns:p15="http://schemas.microsoft.com/office/powerpoint/2012/main" xmlns:mc="http://schemas.openxmlformats.org/markup-compatibility/2006">
   <p:cSld>
     <p:spTree>
@@ -14507,14 +15866,14 @@
       </p:grpSpPr>
       <p:sp>
         <p:nvSpPr>
-          <p:cNvPr id="42" name=""/>
+          <p:cNvPr id="422" name=""/>
           <p:cNvSpPr/>
           <p:nvPr/>
         </p:nvSpPr>
         <p:spPr>
           <a:xfrm>
             <a:off x="0" y="4320000"/>
-            <a:ext cx="1977840" cy="1347840"/>
+            <a:ext cx="1977480" cy="1347480"/>
           </a:xfrm>
           <a:custGeom>
             <a:avLst/>
@@ -14555,14 +15914,14 @@
       </p:sp>
       <p:sp>
         <p:nvSpPr>
-          <p:cNvPr id="43" name=""/>
+          <p:cNvPr id="423" name=""/>
           <p:cNvSpPr/>
           <p:nvPr/>
         </p:nvSpPr>
         <p:spPr>
           <a:xfrm>
             <a:off x="0" y="0"/>
-            <a:ext cx="1077840" cy="3417840"/>
+            <a:ext cx="1077480" cy="3417480"/>
           </a:xfrm>
           <a:custGeom>
             <a:avLst/>
@@ -14603,14 +15962,14 @@
       </p:sp>
       <p:sp>
         <p:nvSpPr>
-          <p:cNvPr id="44" name=""/>
+          <p:cNvPr id="424" name=""/>
           <p:cNvSpPr/>
           <p:nvPr/>
         </p:nvSpPr>
         <p:spPr>
           <a:xfrm>
             <a:off x="7740000" y="0"/>
-            <a:ext cx="2337840" cy="1617840"/>
+            <a:ext cx="2337480" cy="1617480"/>
           </a:xfrm>
           <a:custGeom>
             <a:avLst/>
@@ -14651,6 +16010,451 @@
       </p:sp>
       <p:sp>
         <p:nvSpPr>
+          <p:cNvPr id="425" name=""/>
+          <p:cNvSpPr/>
+          <p:nvPr/>
+        </p:nvSpPr>
+        <p:spPr>
+          <a:xfrm>
+            <a:off x="9000000" y="2520000"/>
+            <a:ext cx="1077480" cy="3147480"/>
+          </a:xfrm>
+          <a:custGeom>
+            <a:avLst/>
+            <a:gdLst/>
+            <a:ahLst/>
+            <a:rect l="l" t="t" r="r" b="b"/>
+            <a:pathLst>
+              <a:path w="3001" h="8751">
+                <a:moveTo>
+                  <a:pt x="3000" y="8750"/>
+                </a:moveTo>
+                <a:lnTo>
+                  <a:pt x="3000" y="0"/>
+                </a:lnTo>
+                <a:lnTo>
+                  <a:pt x="0" y="8750"/>
+                </a:lnTo>
+                <a:lnTo>
+                  <a:pt x="3000" y="8750"/>
+                </a:lnTo>
+                <a:close/>
+              </a:path>
+            </a:pathLst>
+          </a:custGeom>
+          <a:solidFill>
+            <a:srgbClr val="168253"/>
+          </a:solidFill>
+          <a:ln w="0">
+            <a:noFill/>
+          </a:ln>
+        </p:spPr>
+        <p:style>
+          <a:lnRef idx="0"/>
+          <a:fillRef idx="0"/>
+          <a:effectRef idx="0"/>
+          <a:fontRef idx="minor"/>
+        </p:style>
+      </p:sp>
+      <p:sp>
+        <p:nvSpPr>
+          <p:cNvPr id="426" name="PlaceHolder 1"/>
+          <p:cNvSpPr>
+            <a:spLocks noGrp="1"/>
+          </p:cNvSpPr>
+          <p:nvPr>
+            <p:ph type="title"/>
+          </p:nvPr>
+        </p:nvSpPr>
+        <p:spPr>
+          <a:xfrm>
+            <a:off x="504000" y="226080"/>
+            <a:ext cx="9072000" cy="946440"/>
+          </a:xfrm>
+          <a:prstGeom prst="rect">
+            <a:avLst/>
+          </a:prstGeom>
+        </p:spPr>
+        <p:txBody>
+          <a:bodyPr lIns="0" rIns="0" tIns="0" bIns="0" anchor="ctr">
+            <a:noAutofit/>
+          </a:bodyPr>
+          <a:p>
+            <a:pPr algn="ctr"/>
+            <a:r>
+              <a:rPr b="0" lang="en-US" sz="4400" spc="-1" strike="noStrike">
+                <a:latin typeface="Arial"/>
+              </a:rPr>
+              <a:t>Click to edit the title text format</a:t>
+            </a:r>
+            <a:endParaRPr b="0" lang="en-US" sz="4400" spc="-1" strike="noStrike">
+              <a:latin typeface="Arial"/>
+            </a:endParaRPr>
+          </a:p>
+        </p:txBody>
+      </p:sp>
+      <p:sp>
+        <p:nvSpPr>
+          <p:cNvPr id="427" name="PlaceHolder 2"/>
+          <p:cNvSpPr>
+            <a:spLocks noGrp="1"/>
+          </p:cNvSpPr>
+          <p:nvPr>
+            <p:ph type="body"/>
+          </p:nvPr>
+        </p:nvSpPr>
+        <p:spPr>
+          <a:xfrm>
+            <a:off x="504000" y="1326600"/>
+            <a:ext cx="9072000" cy="3288600"/>
+          </a:xfrm>
+          <a:prstGeom prst="rect">
+            <a:avLst/>
+          </a:prstGeom>
+        </p:spPr>
+        <p:txBody>
+          <a:bodyPr lIns="0" rIns="0" tIns="0" bIns="0">
+            <a:normAutofit/>
+          </a:bodyPr>
+          <a:p>
+            <a:pPr marL="432000" indent="-324000">
+              <a:spcBef>
+                <a:spcPts val="1417"/>
+              </a:spcBef>
+              <a:buClr>
+                <a:srgbClr val="000000"/>
+              </a:buClr>
+              <a:buSzPct val="45000"/>
+              <a:buFont typeface="Wingdings" charset="2"/>
+              <a:buChar char=""/>
+            </a:pPr>
+            <a:r>
+              <a:rPr b="0" lang="en-US" sz="3200" spc="-1" strike="noStrike">
+                <a:latin typeface="Arial"/>
+              </a:rPr>
+              <a:t>Click to edit the outline text format</a:t>
+            </a:r>
+            <a:endParaRPr b="0" lang="en-US" sz="3200" spc="-1" strike="noStrike">
+              <a:latin typeface="Arial"/>
+            </a:endParaRPr>
+          </a:p>
+          <a:p>
+            <a:pPr lvl="1" marL="864000" indent="-324000">
+              <a:spcBef>
+                <a:spcPts val="1134"/>
+              </a:spcBef>
+              <a:buClr>
+                <a:srgbClr val="000000"/>
+              </a:buClr>
+              <a:buSzPct val="75000"/>
+              <a:buFont typeface="Symbol" charset="2"/>
+              <a:buChar char=""/>
+            </a:pPr>
+            <a:r>
+              <a:rPr b="0" lang="en-US" sz="2800" spc="-1" strike="noStrike">
+                <a:latin typeface="Arial"/>
+              </a:rPr>
+              <a:t>Second Outline Level</a:t>
+            </a:r>
+            <a:endParaRPr b="0" lang="en-US" sz="2800" spc="-1" strike="noStrike">
+              <a:latin typeface="Arial"/>
+            </a:endParaRPr>
+          </a:p>
+          <a:p>
+            <a:pPr lvl="2" marL="1296000" indent="-288000">
+              <a:spcBef>
+                <a:spcPts val="850"/>
+              </a:spcBef>
+              <a:buClr>
+                <a:srgbClr val="000000"/>
+              </a:buClr>
+              <a:buSzPct val="45000"/>
+              <a:buFont typeface="Wingdings" charset="2"/>
+              <a:buChar char=""/>
+            </a:pPr>
+            <a:r>
+              <a:rPr b="0" lang="en-US" sz="2400" spc="-1" strike="noStrike">
+                <a:latin typeface="Arial"/>
+              </a:rPr>
+              <a:t>Third Outline Level</a:t>
+            </a:r>
+            <a:endParaRPr b="0" lang="en-US" sz="2400" spc="-1" strike="noStrike">
+              <a:latin typeface="Arial"/>
+            </a:endParaRPr>
+          </a:p>
+          <a:p>
+            <a:pPr lvl="3" marL="1728000" indent="-216000">
+              <a:spcBef>
+                <a:spcPts val="567"/>
+              </a:spcBef>
+              <a:buClr>
+                <a:srgbClr val="000000"/>
+              </a:buClr>
+              <a:buSzPct val="75000"/>
+              <a:buFont typeface="Symbol" charset="2"/>
+              <a:buChar char=""/>
+            </a:pPr>
+            <a:r>
+              <a:rPr b="0" lang="en-US" sz="2000" spc="-1" strike="noStrike">
+                <a:latin typeface="Arial"/>
+              </a:rPr>
+              <a:t>Fourth Outline Level</a:t>
+            </a:r>
+            <a:endParaRPr b="0" lang="en-US" sz="2000" spc="-1" strike="noStrike">
+              <a:latin typeface="Arial"/>
+            </a:endParaRPr>
+          </a:p>
+          <a:p>
+            <a:pPr lvl="4" marL="2160000" indent="-216000">
+              <a:spcBef>
+                <a:spcPts val="283"/>
+              </a:spcBef>
+              <a:buClr>
+                <a:srgbClr val="000000"/>
+              </a:buClr>
+              <a:buSzPct val="45000"/>
+              <a:buFont typeface="Wingdings" charset="2"/>
+              <a:buChar char=""/>
+            </a:pPr>
+            <a:r>
+              <a:rPr b="0" lang="en-US" sz="2000" spc="-1" strike="noStrike">
+                <a:latin typeface="Arial"/>
+              </a:rPr>
+              <a:t>Fifth Outline Level</a:t>
+            </a:r>
+            <a:endParaRPr b="0" lang="en-US" sz="2000" spc="-1" strike="noStrike">
+              <a:latin typeface="Arial"/>
+            </a:endParaRPr>
+          </a:p>
+          <a:p>
+            <a:pPr lvl="5" marL="2592000" indent="-216000">
+              <a:spcBef>
+                <a:spcPts val="283"/>
+              </a:spcBef>
+              <a:buClr>
+                <a:srgbClr val="000000"/>
+              </a:buClr>
+              <a:buSzPct val="45000"/>
+              <a:buFont typeface="Wingdings" charset="2"/>
+              <a:buChar char=""/>
+            </a:pPr>
+            <a:r>
+              <a:rPr b="0" lang="en-US" sz="2000" spc="-1" strike="noStrike">
+                <a:latin typeface="Arial"/>
+              </a:rPr>
+              <a:t>Sixth Outline Level</a:t>
+            </a:r>
+            <a:endParaRPr b="0" lang="en-US" sz="2000" spc="-1" strike="noStrike">
+              <a:latin typeface="Arial"/>
+            </a:endParaRPr>
+          </a:p>
+          <a:p>
+            <a:pPr lvl="6" marL="3024000" indent="-216000">
+              <a:spcBef>
+                <a:spcPts val="283"/>
+              </a:spcBef>
+              <a:buClr>
+                <a:srgbClr val="000000"/>
+              </a:buClr>
+              <a:buSzPct val="45000"/>
+              <a:buFont typeface="Wingdings" charset="2"/>
+              <a:buChar char=""/>
+            </a:pPr>
+            <a:r>
+              <a:rPr b="0" lang="en-US" sz="2000" spc="-1" strike="noStrike">
+                <a:latin typeface="Arial"/>
+              </a:rPr>
+              <a:t>Seventh Outline Level</a:t>
+            </a:r>
+            <a:endParaRPr b="0" lang="en-US" sz="2000" spc="-1" strike="noStrike">
+              <a:latin typeface="Arial"/>
+            </a:endParaRPr>
+          </a:p>
+        </p:txBody>
+      </p:sp>
+    </p:spTree>
+  </p:cSld>
+  <p:clrMap bg1="lt1" bg2="lt2" tx1="dk1" tx2="dk2" accent1="accent1" accent2="accent2" accent3="accent3" accent4="accent4" accent5="accent5" accent6="accent6" hlink="hlink" folHlink="folHlink"/>
+  <p:sldLayoutIdLst>
+    <p:sldLayoutId id="2147483779" r:id="rId2"/>
+    <p:sldLayoutId id="2147483780" r:id="rId3"/>
+    <p:sldLayoutId id="2147483781" r:id="rId4"/>
+    <p:sldLayoutId id="2147483782" r:id="rId5"/>
+    <p:sldLayoutId id="2147483783" r:id="rId6"/>
+    <p:sldLayoutId id="2147483784" r:id="rId7"/>
+    <p:sldLayoutId id="2147483785" r:id="rId8"/>
+    <p:sldLayoutId id="2147483786" r:id="rId9"/>
+    <p:sldLayoutId id="2147483787" r:id="rId10"/>
+    <p:sldLayoutId id="2147483788" r:id="rId11"/>
+    <p:sldLayoutId id="2147483789" r:id="rId12"/>
+    <p:sldLayoutId id="2147483790" r:id="rId13"/>
+  </p:sldLayoutIdLst>
+</p:sldMaster>
+</file>
+
+<file path=ppt/slideMasters/slideMaster2.xml><?xml version="1.0" encoding="utf-8"?>
+<p:sldMaster xmlns:a="http://schemas.openxmlformats.org/drawingml/2006/main" xmlns:p="http://schemas.openxmlformats.org/presentationml/2006/main" xmlns:r="http://schemas.openxmlformats.org/officeDocument/2006/relationships" xmlns:p14="http://schemas.microsoft.com/office/powerpoint/2010/main" xmlns:p15="http://schemas.microsoft.com/office/powerpoint/2012/main" xmlns:mc="http://schemas.openxmlformats.org/markup-compatibility/2006">
+  <p:cSld>
+    <p:spTree>
+      <p:nvGrpSpPr>
+        <p:cNvPr id="1" name=""/>
+        <p:cNvGrpSpPr/>
+        <p:nvPr/>
+      </p:nvGrpSpPr>
+      <p:grpSpPr>
+        <a:xfrm>
+          <a:off x="0" y="0"/>
+          <a:ext cx="0" cy="0"/>
+          <a:chOff x="0" y="0"/>
+          <a:chExt cx="0" cy="0"/>
+        </a:xfrm>
+      </p:grpSpPr>
+      <p:sp>
+        <p:nvSpPr>
+          <p:cNvPr id="42" name=""/>
+          <p:cNvSpPr/>
+          <p:nvPr/>
+        </p:nvSpPr>
+        <p:spPr>
+          <a:xfrm>
+            <a:off x="0" y="4320000"/>
+            <a:ext cx="1977480" cy="1347480"/>
+          </a:xfrm>
+          <a:custGeom>
+            <a:avLst/>
+            <a:gdLst/>
+            <a:ahLst/>
+            <a:rect l="l" t="t" r="r" b="b"/>
+            <a:pathLst>
+              <a:path w="5501" h="3751">
+                <a:moveTo>
+                  <a:pt x="0" y="0"/>
+                </a:moveTo>
+                <a:lnTo>
+                  <a:pt x="0" y="3750"/>
+                </a:lnTo>
+                <a:lnTo>
+                  <a:pt x="5500" y="3750"/>
+                </a:lnTo>
+                <a:lnTo>
+                  <a:pt x="0" y="0"/>
+                </a:lnTo>
+                <a:close/>
+              </a:path>
+            </a:pathLst>
+          </a:custGeom>
+          <a:solidFill>
+            <a:srgbClr val="780373"/>
+          </a:solidFill>
+          <a:ln w="0">
+            <a:noFill/>
+          </a:ln>
+        </p:spPr>
+        <p:style>
+          <a:lnRef idx="0"/>
+          <a:fillRef idx="0"/>
+          <a:effectRef idx="0"/>
+          <a:fontRef idx="minor"/>
+        </p:style>
+      </p:sp>
+      <p:sp>
+        <p:nvSpPr>
+          <p:cNvPr id="43" name=""/>
+          <p:cNvSpPr/>
+          <p:nvPr/>
+        </p:nvSpPr>
+        <p:spPr>
+          <a:xfrm>
+            <a:off x="0" y="0"/>
+            <a:ext cx="1077480" cy="3417480"/>
+          </a:xfrm>
+          <a:custGeom>
+            <a:avLst/>
+            <a:gdLst/>
+            <a:ahLst/>
+            <a:rect l="l" t="t" r="r" b="b"/>
+            <a:pathLst>
+              <a:path w="3001" h="9501">
+                <a:moveTo>
+                  <a:pt x="0" y="0"/>
+                </a:moveTo>
+                <a:lnTo>
+                  <a:pt x="0" y="9500"/>
+                </a:lnTo>
+                <a:lnTo>
+                  <a:pt x="3000" y="0"/>
+                </a:lnTo>
+                <a:lnTo>
+                  <a:pt x="0" y="0"/>
+                </a:lnTo>
+                <a:close/>
+              </a:path>
+            </a:pathLst>
+          </a:custGeom>
+          <a:solidFill>
+            <a:srgbClr val="f10d0c"/>
+          </a:solidFill>
+          <a:ln w="0">
+            <a:noFill/>
+          </a:ln>
+        </p:spPr>
+        <p:style>
+          <a:lnRef idx="0"/>
+          <a:fillRef idx="0"/>
+          <a:effectRef idx="0"/>
+          <a:fontRef idx="minor"/>
+        </p:style>
+      </p:sp>
+      <p:sp>
+        <p:nvSpPr>
+          <p:cNvPr id="44" name=""/>
+          <p:cNvSpPr/>
+          <p:nvPr/>
+        </p:nvSpPr>
+        <p:spPr>
+          <a:xfrm>
+            <a:off x="7740000" y="0"/>
+            <a:ext cx="2337480" cy="1617480"/>
+          </a:xfrm>
+          <a:custGeom>
+            <a:avLst/>
+            <a:gdLst/>
+            <a:ahLst/>
+            <a:rect l="l" t="t" r="r" b="b"/>
+            <a:pathLst>
+              <a:path w="6501" h="4501">
+                <a:moveTo>
+                  <a:pt x="6500" y="0"/>
+                </a:moveTo>
+                <a:lnTo>
+                  <a:pt x="0" y="0"/>
+                </a:lnTo>
+                <a:lnTo>
+                  <a:pt x="6500" y="4500"/>
+                </a:lnTo>
+                <a:lnTo>
+                  <a:pt x="6500" y="0"/>
+                </a:lnTo>
+                <a:close/>
+              </a:path>
+            </a:pathLst>
+          </a:custGeom>
+          <a:solidFill>
+            <a:srgbClr val="e8a202"/>
+          </a:solidFill>
+          <a:ln w="0">
+            <a:noFill/>
+          </a:ln>
+        </p:spPr>
+        <p:style>
+          <a:lnRef idx="0"/>
+          <a:fillRef idx="0"/>
+          <a:effectRef idx="0"/>
+          <a:fontRef idx="minor"/>
+        </p:style>
+      </p:sp>
+      <p:sp>
+        <p:nvSpPr>
           <p:cNvPr id="45" name=""/>
           <p:cNvSpPr/>
           <p:nvPr/>
@@ -14658,7 +16462,7 @@
         <p:spPr>
           <a:xfrm>
             <a:off x="9000000" y="2520000"/>
-            <a:ext cx="1077840" cy="3147840"/>
+            <a:ext cx="1077480" cy="3147480"/>
           </a:xfrm>
           <a:custGeom>
             <a:avLst/>
@@ -15137,7 +16941,7 @@
         <p:spPr>
           <a:xfrm>
             <a:off x="0" y="4320000"/>
-            <a:ext cx="1977840" cy="1347840"/>
+            <a:ext cx="1977480" cy="1347480"/>
           </a:xfrm>
           <a:custGeom>
             <a:avLst/>
@@ -15185,7 +16989,7 @@
         <p:spPr>
           <a:xfrm>
             <a:off x="0" y="0"/>
-            <a:ext cx="1077840" cy="3417840"/>
+            <a:ext cx="1077480" cy="3417480"/>
           </a:xfrm>
           <a:custGeom>
             <a:avLst/>
@@ -15233,7 +17037,7 @@
         <p:spPr>
           <a:xfrm>
             <a:off x="7740000" y="0"/>
-            <a:ext cx="2337840" cy="1617840"/>
+            <a:ext cx="2337480" cy="1617480"/>
           </a:xfrm>
           <a:custGeom>
             <a:avLst/>
@@ -15281,7 +17085,7 @@
         <p:spPr>
           <a:xfrm>
             <a:off x="9000000" y="2520000"/>
-            <a:ext cx="1077840" cy="3147840"/>
+            <a:ext cx="1077480" cy="3147480"/>
           </a:xfrm>
           <a:custGeom>
             <a:avLst/>
@@ -15760,7 +17564,7 @@
         <p:spPr>
           <a:xfrm>
             <a:off x="0" y="4320000"/>
-            <a:ext cx="1977840" cy="1347840"/>
+            <a:ext cx="1977480" cy="1347480"/>
           </a:xfrm>
           <a:custGeom>
             <a:avLst/>
@@ -15808,7 +17612,7 @@
         <p:spPr>
           <a:xfrm>
             <a:off x="0" y="0"/>
-            <a:ext cx="1077840" cy="3417840"/>
+            <a:ext cx="1077480" cy="3417480"/>
           </a:xfrm>
           <a:custGeom>
             <a:avLst/>
@@ -15856,7 +17660,7 @@
         <p:spPr>
           <a:xfrm>
             <a:off x="7740000" y="0"/>
-            <a:ext cx="2337840" cy="1617840"/>
+            <a:ext cx="2337480" cy="1617480"/>
           </a:xfrm>
           <a:custGeom>
             <a:avLst/>
@@ -15904,7 +17708,7 @@
         <p:spPr>
           <a:xfrm>
             <a:off x="9000000" y="2520000"/>
-            <a:ext cx="1077840" cy="3147840"/>
+            <a:ext cx="1077480" cy="3147480"/>
           </a:xfrm>
           <a:custGeom>
             <a:avLst/>
@@ -16205,7 +18009,7 @@
         <p:spPr>
           <a:xfrm>
             <a:off x="0" y="4320000"/>
-            <a:ext cx="1977840" cy="1347840"/>
+            <a:ext cx="1977480" cy="1347480"/>
           </a:xfrm>
           <a:custGeom>
             <a:avLst/>
@@ -16253,7 +18057,7 @@
         <p:spPr>
           <a:xfrm>
             <a:off x="0" y="0"/>
-            <a:ext cx="1077840" cy="3417840"/>
+            <a:ext cx="1077480" cy="3417480"/>
           </a:xfrm>
           <a:custGeom>
             <a:avLst/>
@@ -16301,7 +18105,7 @@
         <p:spPr>
           <a:xfrm>
             <a:off x="7740000" y="0"/>
-            <a:ext cx="2337840" cy="1617840"/>
+            <a:ext cx="2337480" cy="1617480"/>
           </a:xfrm>
           <a:custGeom>
             <a:avLst/>
@@ -16349,7 +18153,7 @@
         <p:spPr>
           <a:xfrm>
             <a:off x="9000000" y="2520000"/>
-            <a:ext cx="1077840" cy="3147840"/>
+            <a:ext cx="1077480" cy="3147480"/>
           </a:xfrm>
           <a:custGeom>
             <a:avLst/>
@@ -16650,7 +18454,7 @@
         <p:spPr>
           <a:xfrm>
             <a:off x="0" y="4320000"/>
-            <a:ext cx="1977840" cy="1347840"/>
+            <a:ext cx="1977480" cy="1347480"/>
           </a:xfrm>
           <a:custGeom>
             <a:avLst/>
@@ -16698,7 +18502,7 @@
         <p:spPr>
           <a:xfrm>
             <a:off x="0" y="0"/>
-            <a:ext cx="1077840" cy="3417840"/>
+            <a:ext cx="1077480" cy="3417480"/>
           </a:xfrm>
           <a:custGeom>
             <a:avLst/>
@@ -16746,7 +18550,7 @@
         <p:spPr>
           <a:xfrm>
             <a:off x="7740000" y="0"/>
-            <a:ext cx="2337840" cy="1617840"/>
+            <a:ext cx="2337480" cy="1617480"/>
           </a:xfrm>
           <a:custGeom>
             <a:avLst/>
@@ -16794,7 +18598,7 @@
         <p:spPr>
           <a:xfrm>
             <a:off x="9000000" y="2520000"/>
-            <a:ext cx="1077840" cy="3147840"/>
+            <a:ext cx="1077480" cy="3147480"/>
           </a:xfrm>
           <a:custGeom>
             <a:avLst/>
@@ -16882,7 +18686,7 @@
         <p:spPr>
           <a:xfrm>
             <a:off x="504000" y="1326600"/>
-            <a:ext cx="9072000" cy="3288600"/>
+            <a:ext cx="9071640" cy="3288240"/>
           </a:xfrm>
           <a:prstGeom prst="rect">
             <a:avLst/>
@@ -16905,12 +18709,12 @@
               <a:buChar char=""/>
             </a:pPr>
             <a:r>
-              <a:rPr b="0" lang="en-US" sz="3200" spc="-1" strike="noStrike">
+              <a:rPr b="0" lang="en-US" sz="1800" spc="-1" strike="noStrike">
                 <a:latin typeface="Arial"/>
               </a:rPr>
               <a:t>Click to edit the outline text format</a:t>
             </a:r>
-            <a:endParaRPr b="0" lang="en-US" sz="3200" spc="-1" strike="noStrike">
+            <a:endParaRPr b="0" lang="en-US" sz="1800" spc="-1" strike="noStrike">
               <a:latin typeface="Arial"/>
             </a:endParaRPr>
           </a:p>
@@ -16927,12 +18731,12 @@
               <a:buChar char=""/>
             </a:pPr>
             <a:r>
-              <a:rPr b="0" lang="en-US" sz="2800" spc="-1" strike="noStrike">
+              <a:rPr b="0" lang="en-US" sz="1800" spc="-1" strike="noStrike">
                 <a:latin typeface="Arial"/>
               </a:rPr>
               <a:t>Second Outline Level</a:t>
             </a:r>
-            <a:endParaRPr b="0" lang="en-US" sz="2800" spc="-1" strike="noStrike">
+            <a:endParaRPr b="0" lang="en-US" sz="1800" spc="-1" strike="noStrike">
               <a:latin typeface="Arial"/>
             </a:endParaRPr>
           </a:p>
@@ -16949,12 +18753,12 @@
               <a:buChar char=""/>
             </a:pPr>
             <a:r>
-              <a:rPr b="0" lang="en-US" sz="2400" spc="-1" strike="noStrike">
+              <a:rPr b="0" lang="en-US" sz="1800" spc="-1" strike="noStrike">
                 <a:latin typeface="Arial"/>
               </a:rPr>
               <a:t>Third Outline Level</a:t>
             </a:r>
-            <a:endParaRPr b="0" lang="en-US" sz="2400" spc="-1" strike="noStrike">
+            <a:endParaRPr b="0" lang="en-US" sz="1800" spc="-1" strike="noStrike">
               <a:latin typeface="Arial"/>
             </a:endParaRPr>
           </a:p>
@@ -16971,12 +18775,12 @@
               <a:buChar char=""/>
             </a:pPr>
             <a:r>
-              <a:rPr b="0" lang="en-US" sz="2000" spc="-1" strike="noStrike">
+              <a:rPr b="0" lang="en-US" sz="1800" spc="-1" strike="noStrike">
                 <a:latin typeface="Arial"/>
               </a:rPr>
               <a:t>Fourth Outline Level</a:t>
             </a:r>
-            <a:endParaRPr b="0" lang="en-US" sz="2000" spc="-1" strike="noStrike">
+            <a:endParaRPr b="0" lang="en-US" sz="1800" spc="-1" strike="noStrike">
               <a:latin typeface="Arial"/>
             </a:endParaRPr>
           </a:p>
@@ -16993,12 +18797,12 @@
               <a:buChar char=""/>
             </a:pPr>
             <a:r>
-              <a:rPr b="0" lang="en-US" sz="2000" spc="-1" strike="noStrike">
+              <a:rPr b="0" lang="en-US" sz="1800" spc="-1" strike="noStrike">
                 <a:latin typeface="Arial"/>
               </a:rPr>
               <a:t>Fifth Outline Level</a:t>
             </a:r>
-            <a:endParaRPr b="0" lang="en-US" sz="2000" spc="-1" strike="noStrike">
+            <a:endParaRPr b="0" lang="en-US" sz="1800" spc="-1" strike="noStrike">
               <a:latin typeface="Arial"/>
             </a:endParaRPr>
           </a:p>
@@ -17015,12 +18819,12 @@
               <a:buChar char=""/>
             </a:pPr>
             <a:r>
-              <a:rPr b="0" lang="en-US" sz="2000" spc="-1" strike="noStrike">
+              <a:rPr b="0" lang="en-US" sz="1800" spc="-1" strike="noStrike">
                 <a:latin typeface="Arial"/>
               </a:rPr>
               <a:t>Sixth Outline Level</a:t>
             </a:r>
-            <a:endParaRPr b="0" lang="en-US" sz="2000" spc="-1" strike="noStrike">
+            <a:endParaRPr b="0" lang="en-US" sz="1800" spc="-1" strike="noStrike">
               <a:latin typeface="Arial"/>
             </a:endParaRPr>
           </a:p>
@@ -17037,12 +18841,12 @@
               <a:buChar char=""/>
             </a:pPr>
             <a:r>
-              <a:rPr b="0" lang="en-US" sz="2000" spc="-1" strike="noStrike">
+              <a:rPr b="0" lang="en-US" sz="1800" spc="-1" strike="noStrike">
                 <a:latin typeface="Arial"/>
               </a:rPr>
               <a:t>Seventh Outline Level</a:t>
             </a:r>
-            <a:endParaRPr b="0" lang="en-US" sz="2000" spc="-1" strike="noStrike">
+            <a:endParaRPr b="0" lang="en-US" sz="1800" spc="-1" strike="noStrike">
               <a:latin typeface="Arial"/>
             </a:endParaRPr>
           </a:p>
@@ -17094,7 +18898,7 @@
         <p:spPr>
           <a:xfrm>
             <a:off x="0" y="4320000"/>
-            <a:ext cx="1977840" cy="1347840"/>
+            <a:ext cx="1977480" cy="1347480"/>
           </a:xfrm>
           <a:custGeom>
             <a:avLst/>
@@ -17142,7 +18946,7 @@
         <p:spPr>
           <a:xfrm>
             <a:off x="0" y="0"/>
-            <a:ext cx="1077840" cy="3417840"/>
+            <a:ext cx="1077480" cy="3417480"/>
           </a:xfrm>
           <a:custGeom>
             <a:avLst/>
@@ -17190,7 +18994,7 @@
         <p:spPr>
           <a:xfrm>
             <a:off x="7740000" y="0"/>
-            <a:ext cx="2337840" cy="1617840"/>
+            <a:ext cx="2337480" cy="1617480"/>
           </a:xfrm>
           <a:custGeom>
             <a:avLst/>
@@ -17238,7 +19042,7 @@
         <p:spPr>
           <a:xfrm>
             <a:off x="9000000" y="2520000"/>
-            <a:ext cx="1077840" cy="3147840"/>
+            <a:ext cx="1077480" cy="3147480"/>
           </a:xfrm>
           <a:custGeom>
             <a:avLst/>
@@ -17539,7 +19343,7 @@
         <p:spPr>
           <a:xfrm>
             <a:off x="0" y="4320000"/>
-            <a:ext cx="1977840" cy="1347840"/>
+            <a:ext cx="1977480" cy="1347480"/>
           </a:xfrm>
           <a:custGeom>
             <a:avLst/>
@@ -17587,7 +19391,7 @@
         <p:spPr>
           <a:xfrm>
             <a:off x="0" y="0"/>
-            <a:ext cx="1077840" cy="3417840"/>
+            <a:ext cx="1077480" cy="3417480"/>
           </a:xfrm>
           <a:custGeom>
             <a:avLst/>
@@ -17635,7 +19439,7 @@
         <p:spPr>
           <a:xfrm>
             <a:off x="7740000" y="0"/>
-            <a:ext cx="2337840" cy="1617840"/>
+            <a:ext cx="2337480" cy="1617480"/>
           </a:xfrm>
           <a:custGeom>
             <a:avLst/>
@@ -17683,7 +19487,7 @@
         <p:spPr>
           <a:xfrm>
             <a:off x="9000000" y="2520000"/>
-            <a:ext cx="1077840" cy="3147840"/>
+            <a:ext cx="1077480" cy="3147480"/>
           </a:xfrm>
           <a:custGeom>
             <a:avLst/>
@@ -17984,7 +19788,7 @@
         <p:spPr>
           <a:xfrm>
             <a:off x="0" y="4320000"/>
-            <a:ext cx="1977840" cy="1347840"/>
+            <a:ext cx="1977480" cy="1347480"/>
           </a:xfrm>
           <a:custGeom>
             <a:avLst/>
@@ -18032,7 +19836,7 @@
         <p:spPr>
           <a:xfrm>
             <a:off x="0" y="0"/>
-            <a:ext cx="1077840" cy="3417840"/>
+            <a:ext cx="1077480" cy="3417480"/>
           </a:xfrm>
           <a:custGeom>
             <a:avLst/>
@@ -18080,7 +19884,7 @@
         <p:spPr>
           <a:xfrm>
             <a:off x="7740000" y="0"/>
-            <a:ext cx="2337840" cy="1617840"/>
+            <a:ext cx="2337480" cy="1617480"/>
           </a:xfrm>
           <a:custGeom>
             <a:avLst/>
@@ -18128,7 +19932,7 @@
         <p:spPr>
           <a:xfrm>
             <a:off x="9000000" y="2520000"/>
-            <a:ext cx="1077840" cy="3147840"/>
+            <a:ext cx="1077480" cy="3147480"/>
           </a:xfrm>
           <a:custGeom>
             <a:avLst/>
@@ -18421,14 +20225,14 @@
       </p:grpSpPr>
       <p:sp>
         <p:nvSpPr>
-          <p:cNvPr id="422" name=""/>
+          <p:cNvPr id="464" name=""/>
           <p:cNvSpPr/>
           <p:nvPr/>
         </p:nvSpPr>
         <p:spPr>
           <a:xfrm>
             <a:off x="720000" y="360000"/>
-            <a:ext cx="8637480" cy="4895280"/>
+            <a:ext cx="8637120" cy="4894920"/>
           </a:xfrm>
           <a:prstGeom prst="rect">
             <a:avLst/>
@@ -18632,14 +20436,14 @@
       </p:grpSpPr>
       <p:sp>
         <p:nvSpPr>
-          <p:cNvPr id="458" name=""/>
+          <p:cNvPr id="500" name=""/>
           <p:cNvSpPr/>
           <p:nvPr/>
         </p:nvSpPr>
         <p:spPr>
           <a:xfrm>
             <a:off x="720000" y="360000"/>
-            <a:ext cx="8637480" cy="897480"/>
+            <a:ext cx="8637120" cy="897120"/>
           </a:xfrm>
           <a:prstGeom prst="rect">
             <a:avLst/>
@@ -18683,14 +20487,14 @@
       </p:sp>
       <p:sp>
         <p:nvSpPr>
-          <p:cNvPr id="459" name=""/>
+          <p:cNvPr id="501" name=""/>
           <p:cNvSpPr/>
           <p:nvPr/>
         </p:nvSpPr>
         <p:spPr>
           <a:xfrm>
             <a:off x="720000" y="1440000"/>
-            <a:ext cx="9108360" cy="3597480"/>
+            <a:ext cx="9108000" cy="3597120"/>
           </a:xfrm>
           <a:prstGeom prst="rect">
             <a:avLst/>
@@ -18711,7 +20515,7 @@
             <a:normAutofit/>
           </a:bodyPr>
           <a:p>
-            <a:pPr marL="432000" indent="-322560">
+            <a:pPr marL="432000" indent="-322200">
               <a:lnSpc>
                 <a:spcPct val="100000"/>
               </a:lnSpc>
@@ -18740,7 +20544,7 @@
             </a:endParaRPr>
           </a:p>
           <a:p>
-            <a:pPr marL="432000" indent="-322560">
+            <a:pPr marL="432000" indent="-322200">
               <a:lnSpc>
                 <a:spcPct val="100000"/>
               </a:lnSpc>
@@ -18789,7 +20593,7 @@
             </a:endParaRPr>
           </a:p>
           <a:p>
-            <a:pPr marL="432000" indent="-322560">
+            <a:pPr marL="432000" indent="-322200">
               <a:lnSpc>
                 <a:spcPct val="100000"/>
               </a:lnSpc>
@@ -18838,7 +20642,7 @@
             </a:endParaRPr>
           </a:p>
           <a:p>
-            <a:pPr marL="432000" indent="-322560">
+            <a:pPr marL="432000" indent="-322200">
               <a:lnSpc>
                 <a:spcPct val="100000"/>
               </a:lnSpc>
@@ -18887,7 +20691,7 @@
             </a:endParaRPr>
           </a:p>
           <a:p>
-            <a:pPr marL="432000" indent="-322560">
+            <a:pPr marL="432000" indent="-322200">
               <a:lnSpc>
                 <a:spcPct val="100000"/>
               </a:lnSpc>
@@ -18936,7 +20740,7 @@
             </a:endParaRPr>
           </a:p>
           <a:p>
-            <a:pPr marL="432000" indent="-322560">
+            <a:pPr marL="432000" indent="-322200">
               <a:lnSpc>
                 <a:spcPct val="100000"/>
               </a:lnSpc>
@@ -18965,7 +20769,7 @@
             </a:endParaRPr>
           </a:p>
           <a:p>
-            <a:pPr marL="432000" indent="-322560">
+            <a:pPr marL="432000" indent="-322200">
               <a:lnSpc>
                 <a:spcPct val="100000"/>
               </a:lnSpc>
@@ -19047,14 +20851,14 @@
       </p:grpSpPr>
       <p:sp>
         <p:nvSpPr>
-          <p:cNvPr id="460" name=""/>
+          <p:cNvPr id="502" name=""/>
           <p:cNvSpPr/>
           <p:nvPr/>
         </p:nvSpPr>
         <p:spPr>
           <a:xfrm>
             <a:off x="720000" y="360000"/>
-            <a:ext cx="8637480" cy="897480"/>
+            <a:ext cx="8637120" cy="897120"/>
           </a:xfrm>
           <a:prstGeom prst="rect">
             <a:avLst/>
@@ -19098,14 +20902,14 @@
       </p:sp>
       <p:sp>
         <p:nvSpPr>
-          <p:cNvPr id="461" name=""/>
+          <p:cNvPr id="503" name=""/>
           <p:cNvSpPr/>
           <p:nvPr/>
         </p:nvSpPr>
         <p:spPr>
           <a:xfrm>
             <a:off x="720000" y="1440000"/>
-            <a:ext cx="8422560" cy="3597480"/>
+            <a:ext cx="8422200" cy="3597120"/>
           </a:xfrm>
           <a:prstGeom prst="rect">
             <a:avLst/>
@@ -19126,7 +20930,7 @@
             <a:normAutofit/>
           </a:bodyPr>
           <a:p>
-            <a:pPr marL="432000" indent="-322560">
+            <a:pPr marL="432000" indent="-322200">
               <a:lnSpc>
                 <a:spcPct val="100000"/>
               </a:lnSpc>
@@ -19205,7 +21009,7 @@
             </a:endParaRPr>
           </a:p>
           <a:p>
-            <a:pPr marL="432000" indent="-322560">
+            <a:pPr marL="432000" indent="-322200">
               <a:lnSpc>
                 <a:spcPct val="100000"/>
               </a:lnSpc>
@@ -19234,7 +21038,7 @@
             </a:endParaRPr>
           </a:p>
           <a:p>
-            <a:pPr marL="432000" indent="-322560">
+            <a:pPr marL="432000" indent="-322200">
               <a:lnSpc>
                 <a:spcPct val="100000"/>
               </a:lnSpc>
@@ -19575,14 +21379,14 @@
       </p:grpSpPr>
       <p:sp>
         <p:nvSpPr>
-          <p:cNvPr id="462" name=""/>
+          <p:cNvPr id="504" name=""/>
           <p:cNvSpPr/>
           <p:nvPr/>
         </p:nvSpPr>
         <p:spPr>
           <a:xfrm>
             <a:off x="720000" y="360000"/>
-            <a:ext cx="8637480" cy="897480"/>
+            <a:ext cx="8637120" cy="897120"/>
           </a:xfrm>
           <a:prstGeom prst="rect">
             <a:avLst/>
@@ -19626,14 +21430,14 @@
       </p:sp>
       <p:sp>
         <p:nvSpPr>
-          <p:cNvPr id="463" name=""/>
+          <p:cNvPr id="505" name=""/>
           <p:cNvSpPr/>
           <p:nvPr/>
         </p:nvSpPr>
         <p:spPr>
           <a:xfrm>
             <a:off x="720000" y="1440000"/>
-            <a:ext cx="8422560" cy="3597480"/>
+            <a:ext cx="8422200" cy="3597120"/>
           </a:xfrm>
           <a:prstGeom prst="rect">
             <a:avLst/>
@@ -19654,7 +21458,7 @@
             <a:normAutofit/>
           </a:bodyPr>
           <a:p>
-            <a:pPr marL="432000" indent="-322560">
+            <a:pPr marL="432000" indent="-322200">
               <a:lnSpc>
                 <a:spcPct val="100000"/>
               </a:lnSpc>
@@ -19696,7 +21500,7 @@
             </a:endParaRPr>
           </a:p>
           <a:p>
-            <a:pPr marL="432000" indent="-322560">
+            <a:pPr marL="432000" indent="-322200">
               <a:lnSpc>
                 <a:spcPct val="100000"/>
               </a:lnSpc>
@@ -19845,7 +21649,7 @@
             </a:endParaRPr>
           </a:p>
           <a:p>
-            <a:pPr marL="432000" indent="-322560">
+            <a:pPr marL="432000" indent="-322200">
               <a:lnSpc>
                 <a:spcPct val="100000"/>
               </a:lnSpc>
@@ -19904,7 +21708,7 @@
             </a:endParaRPr>
           </a:p>
           <a:p>
-            <a:pPr marL="432000" indent="-322560">
+            <a:pPr marL="432000" indent="-322200">
               <a:lnSpc>
                 <a:spcPct val="100000"/>
               </a:lnSpc>
@@ -19966,7 +21770,7 @@
       </p:sp>
       <p:pic>
         <p:nvPicPr>
-          <p:cNvPr id="464" name="" descr=""/>
+          <p:cNvPr id="506" name="" descr=""/>
           <p:cNvPicPr/>
           <p:nvPr/>
         </p:nvPicPr>
@@ -19977,7 +21781,7 @@
         <p:spPr>
           <a:xfrm>
             <a:off x="5715000" y="2971800"/>
-            <a:ext cx="2572560" cy="2572560"/>
+            <a:ext cx="2572200" cy="2572200"/>
           </a:xfrm>
           <a:prstGeom prst="rect">
             <a:avLst/>
@@ -20019,14 +21823,14 @@
       </p:grpSpPr>
       <p:sp>
         <p:nvSpPr>
-          <p:cNvPr id="465" name=""/>
+          <p:cNvPr id="507" name=""/>
           <p:cNvSpPr/>
           <p:nvPr/>
         </p:nvSpPr>
         <p:spPr>
           <a:xfrm>
             <a:off x="720000" y="360000"/>
-            <a:ext cx="8637480" cy="897480"/>
+            <a:ext cx="8637120" cy="897120"/>
           </a:xfrm>
           <a:prstGeom prst="rect">
             <a:avLst/>
@@ -20070,14 +21874,14 @@
       </p:sp>
       <p:sp>
         <p:nvSpPr>
-          <p:cNvPr id="466" name=""/>
+          <p:cNvPr id="508" name=""/>
           <p:cNvSpPr/>
           <p:nvPr/>
         </p:nvSpPr>
         <p:spPr>
           <a:xfrm>
             <a:off x="720000" y="1440000"/>
-            <a:ext cx="8422560" cy="3597480"/>
+            <a:ext cx="8422200" cy="3597120"/>
           </a:xfrm>
           <a:prstGeom prst="rect">
             <a:avLst/>
@@ -20098,7 +21902,7 @@
             <a:normAutofit/>
           </a:bodyPr>
           <a:p>
-            <a:pPr marL="432000" indent="-322560">
+            <a:pPr marL="432000" indent="-322200">
               <a:lnSpc>
                 <a:spcPct val="100000"/>
               </a:lnSpc>
@@ -20140,7 +21944,7 @@
             </a:endParaRPr>
           </a:p>
           <a:p>
-            <a:pPr marL="432000" indent="-322560">
+            <a:pPr marL="432000" indent="-322200">
               <a:lnSpc>
                 <a:spcPct val="100000"/>
               </a:lnSpc>
@@ -20199,7 +22003,7 @@
             </a:endParaRPr>
           </a:p>
           <a:p>
-            <a:pPr marL="432000" indent="-322560">
+            <a:pPr marL="432000" indent="-322200">
               <a:lnSpc>
                 <a:spcPct val="100000"/>
               </a:lnSpc>
@@ -20291,14 +22095,14 @@
       </p:grpSpPr>
       <p:sp>
         <p:nvSpPr>
-          <p:cNvPr id="467" name=""/>
+          <p:cNvPr id="509" name=""/>
           <p:cNvSpPr/>
           <p:nvPr/>
         </p:nvSpPr>
         <p:spPr>
           <a:xfrm>
             <a:off x="504000" y="226080"/>
-            <a:ext cx="9071640" cy="946080"/>
+            <a:ext cx="9071280" cy="945720"/>
           </a:xfrm>
           <a:prstGeom prst="rect">
             <a:avLst/>
@@ -20326,7 +22130,11 @@
             </a:pPr>
             <a:r>
               <a:rPr b="0" lang="en-US" sz="4400" spc="-1" strike="noStrike">
+                <a:solidFill>
+                  <a:srgbClr val="000000"/>
+                </a:solidFill>
                 <a:latin typeface="Arial"/>
+                <a:ea typeface="DejaVu Sans"/>
               </a:rPr>
               <a:t>GUI</a:t>
             </a:r>
@@ -20338,7 +22146,7 @@
       </p:sp>
       <p:pic>
         <p:nvPicPr>
-          <p:cNvPr id="468" name="" descr=""/>
+          <p:cNvPr id="510" name="" descr=""/>
           <p:cNvPicPr/>
           <p:nvPr/>
         </p:nvPicPr>
@@ -20349,7 +22157,7 @@
         <p:spPr>
           <a:xfrm>
             <a:off x="2743200" y="1143000"/>
-            <a:ext cx="4899960" cy="3879000"/>
+            <a:ext cx="4899600" cy="3878640"/>
           </a:xfrm>
           <a:prstGeom prst="rect">
             <a:avLst/>
@@ -20361,14 +22169,14 @@
       </p:pic>
       <p:sp>
         <p:nvSpPr>
-          <p:cNvPr id="469" name=""/>
+          <p:cNvPr id="511" name=""/>
           <p:cNvSpPr/>
           <p:nvPr/>
         </p:nvSpPr>
         <p:spPr>
           <a:xfrm>
             <a:off x="2743200" y="5055120"/>
-            <a:ext cx="5028840" cy="430920"/>
+            <a:ext cx="5028480" cy="430560"/>
           </a:xfrm>
           <a:prstGeom prst="rect">
             <a:avLst/>
@@ -20442,14 +22250,14 @@
       </p:grpSpPr>
       <p:sp>
         <p:nvSpPr>
-          <p:cNvPr id="470" name=""/>
+          <p:cNvPr id="512" name=""/>
           <p:cNvSpPr/>
           <p:nvPr/>
         </p:nvSpPr>
         <p:spPr>
           <a:xfrm>
             <a:off x="504000" y="226080"/>
-            <a:ext cx="9071640" cy="946080"/>
+            <a:ext cx="9071280" cy="945720"/>
           </a:xfrm>
           <a:prstGeom prst="rect">
             <a:avLst/>
@@ -20477,7 +22285,11 @@
             </a:pPr>
             <a:r>
               <a:rPr b="0" lang="en-US" sz="4400" spc="-1" strike="noStrike">
+                <a:solidFill>
+                  <a:srgbClr val="000000"/>
+                </a:solidFill>
                 <a:latin typeface="Arial"/>
+                <a:ea typeface="DejaVu Sans"/>
               </a:rPr>
               <a:t>GUI</a:t>
             </a:r>
@@ -20489,14 +22301,14 @@
       </p:sp>
       <p:sp>
         <p:nvSpPr>
-          <p:cNvPr id="471" name=""/>
+          <p:cNvPr id="513" name=""/>
           <p:cNvSpPr/>
           <p:nvPr/>
         </p:nvSpPr>
         <p:spPr>
           <a:xfrm>
             <a:off x="2743200" y="5055120"/>
-            <a:ext cx="5028840" cy="430920"/>
+            <a:ext cx="5028480" cy="430560"/>
           </a:xfrm>
           <a:prstGeom prst="rect">
             <a:avLst/>
@@ -20540,7 +22352,7 @@
       </p:sp>
       <p:pic>
         <p:nvPicPr>
-          <p:cNvPr id="472" name="" descr=""/>
+          <p:cNvPr id="514" name="" descr=""/>
           <p:cNvPicPr/>
           <p:nvPr/>
         </p:nvPicPr>
@@ -20551,7 +22363,7 @@
         <p:spPr>
           <a:xfrm>
             <a:off x="1143000" y="1371600"/>
-            <a:ext cx="4102920" cy="3562560"/>
+            <a:ext cx="4102560" cy="3562200"/>
           </a:xfrm>
           <a:prstGeom prst="rect">
             <a:avLst/>
@@ -20563,7 +22375,7 @@
       </p:pic>
       <p:pic>
         <p:nvPicPr>
-          <p:cNvPr id="473" name="" descr=""/>
+          <p:cNvPr id="515" name="" descr=""/>
           <p:cNvPicPr/>
           <p:nvPr/>
         </p:nvPicPr>
@@ -20574,7 +22386,7 @@
         <p:spPr>
           <a:xfrm>
             <a:off x="5308560" y="1371600"/>
-            <a:ext cx="3835080" cy="3350160"/>
+            <a:ext cx="3834720" cy="3349800"/>
           </a:xfrm>
           <a:prstGeom prst="rect">
             <a:avLst/>
@@ -20616,14 +22428,14 @@
       </p:grpSpPr>
       <p:sp>
         <p:nvSpPr>
-          <p:cNvPr id="474" name=""/>
+          <p:cNvPr id="516" name=""/>
           <p:cNvSpPr/>
           <p:nvPr/>
         </p:nvSpPr>
         <p:spPr>
           <a:xfrm>
             <a:off x="504000" y="226080"/>
-            <a:ext cx="9071640" cy="946080"/>
+            <a:ext cx="9071280" cy="945720"/>
           </a:xfrm>
           <a:prstGeom prst="rect">
             <a:avLst/>
@@ -20651,7 +22463,11 @@
             </a:pPr>
             <a:r>
               <a:rPr b="0" lang="en-US" sz="4400" spc="-1" strike="noStrike">
+                <a:solidFill>
+                  <a:srgbClr val="000000"/>
+                </a:solidFill>
                 <a:latin typeface="Arial"/>
+                <a:ea typeface="DejaVu Sans"/>
               </a:rPr>
               <a:t>GUI</a:t>
             </a:r>
@@ -20663,14 +22479,14 @@
       </p:sp>
       <p:sp>
         <p:nvSpPr>
-          <p:cNvPr id="475" name=""/>
+          <p:cNvPr id="517" name=""/>
           <p:cNvSpPr/>
           <p:nvPr/>
         </p:nvSpPr>
         <p:spPr>
           <a:xfrm>
             <a:off x="5943600" y="4572000"/>
-            <a:ext cx="2285640" cy="888120"/>
+            <a:ext cx="2285280" cy="887760"/>
           </a:xfrm>
           <a:prstGeom prst="rect">
             <a:avLst/>
@@ -20714,7 +22530,7 @@
       </p:sp>
       <p:pic>
         <p:nvPicPr>
-          <p:cNvPr id="476" name="" descr=""/>
+          <p:cNvPr id="518" name="" descr=""/>
           <p:cNvPicPr/>
           <p:nvPr/>
         </p:nvPicPr>
@@ -20725,7 +22541,7 @@
         <p:spPr>
           <a:xfrm>
             <a:off x="2057400" y="1172520"/>
-            <a:ext cx="3657240" cy="4204800"/>
+            <a:ext cx="3656880" cy="4204440"/>
           </a:xfrm>
           <a:prstGeom prst="rect">
             <a:avLst/>
@@ -20767,14 +22583,14 @@
       </p:grpSpPr>
       <p:sp>
         <p:nvSpPr>
-          <p:cNvPr id="477" name=""/>
+          <p:cNvPr id="519" name=""/>
           <p:cNvSpPr/>
           <p:nvPr/>
         </p:nvSpPr>
         <p:spPr>
           <a:xfrm>
             <a:off x="504000" y="226080"/>
-            <a:ext cx="9071640" cy="946080"/>
+            <a:ext cx="9071280" cy="945720"/>
           </a:xfrm>
           <a:prstGeom prst="rect">
             <a:avLst/>
@@ -20802,7 +22618,11 @@
             </a:pPr>
             <a:r>
               <a:rPr b="0" lang="en-US" sz="4400" spc="-1" strike="noStrike">
+                <a:solidFill>
+                  <a:srgbClr val="000000"/>
+                </a:solidFill>
                 <a:latin typeface="Arial"/>
+                <a:ea typeface="DejaVu Sans"/>
               </a:rPr>
               <a:t>GUI</a:t>
             </a:r>
@@ -20814,14 +22634,14 @@
       </p:sp>
       <p:sp>
         <p:nvSpPr>
-          <p:cNvPr id="478" name=""/>
+          <p:cNvPr id="520" name=""/>
           <p:cNvSpPr/>
           <p:nvPr/>
         </p:nvSpPr>
         <p:spPr>
           <a:xfrm>
             <a:off x="2743200" y="5055120"/>
-            <a:ext cx="5028840" cy="430920"/>
+            <a:ext cx="5028480" cy="430560"/>
           </a:xfrm>
           <a:prstGeom prst="rect">
             <a:avLst/>
@@ -20865,7 +22685,7 @@
       </p:sp>
       <p:pic>
         <p:nvPicPr>
-          <p:cNvPr id="479" name="" descr=""/>
+          <p:cNvPr id="521" name="" descr=""/>
           <p:cNvPicPr/>
           <p:nvPr/>
         </p:nvPicPr>
@@ -20876,7 +22696,7 @@
         <p:spPr>
           <a:xfrm>
             <a:off x="1723320" y="1134720"/>
-            <a:ext cx="7064280" cy="3864600"/>
+            <a:ext cx="7063920" cy="3864240"/>
           </a:xfrm>
           <a:prstGeom prst="rect">
             <a:avLst/>
@@ -20918,14 +22738,14 @@
       </p:grpSpPr>
       <p:sp>
         <p:nvSpPr>
-          <p:cNvPr id="480" name=""/>
+          <p:cNvPr id="522" name=""/>
           <p:cNvSpPr/>
           <p:nvPr/>
         </p:nvSpPr>
         <p:spPr>
           <a:xfrm>
-            <a:off x="733320" y="685800"/>
-            <a:ext cx="8637480" cy="4168080"/>
+            <a:off x="720000" y="360000"/>
+            <a:ext cx="8637120" cy="897120"/>
           </a:xfrm>
           <a:prstGeom prst="rect">
             <a:avLst/>
@@ -20952,16 +22772,391 @@
               </a:lnSpc>
             </a:pPr>
             <a:r>
-              <a:rPr b="0" lang="en-US" sz="5400" spc="-1" strike="noStrike">
+              <a:rPr b="0" lang="en-US" sz="3200" spc="-1" strike="noStrike">
                 <a:solidFill>
                   <a:srgbClr val="000000"/>
                 </a:solidFill>
                 <a:latin typeface="Arial"/>
                 <a:ea typeface="DejaVu Sans"/>
               </a:rPr>
-              <a:t>Thanks for listening :3</a:t>
+              <a:t>Functions implemented so far</a:t>
             </a:r>
-            <a:endParaRPr b="0" lang="en-US" sz="5400" spc="-1" strike="noStrike">
+            <a:endParaRPr b="0" lang="en-US" sz="3200" spc="-1" strike="noStrike">
+              <a:latin typeface="Arial"/>
+            </a:endParaRPr>
+          </a:p>
+        </p:txBody>
+      </p:sp>
+      <p:sp>
+        <p:nvSpPr>
+          <p:cNvPr id="523" name=""/>
+          <p:cNvSpPr/>
+          <p:nvPr/>
+        </p:nvSpPr>
+        <p:spPr>
+          <a:xfrm>
+            <a:off x="720000" y="1430280"/>
+            <a:ext cx="8422200" cy="3597120"/>
+          </a:xfrm>
+          <a:prstGeom prst="rect">
+            <a:avLst/>
+          </a:prstGeom>
+          <a:noFill/>
+          <a:ln w="0">
+            <a:noFill/>
+          </a:ln>
+        </p:spPr>
+        <p:style>
+          <a:lnRef idx="0"/>
+          <a:fillRef idx="0"/>
+          <a:effectRef idx="0"/>
+          <a:fontRef idx="minor"/>
+        </p:style>
+        <p:txBody>
+          <a:bodyPr lIns="0" rIns="0" tIns="0" bIns="0">
+            <a:normAutofit/>
+          </a:bodyPr>
+          <a:p>
+            <a:pPr marL="432000" indent="-322200">
+              <a:lnSpc>
+                <a:spcPct val="100000"/>
+              </a:lnSpc>
+              <a:spcBef>
+                <a:spcPts val="1417"/>
+              </a:spcBef>
+              <a:buClr>
+                <a:srgbClr val="000000"/>
+              </a:buClr>
+              <a:buSzPct val="45000"/>
+              <a:buFont typeface="Wingdings" charset="2"/>
+              <a:buChar char=""/>
+            </a:pPr>
+            <a:r>
+              <a:rPr b="0" lang="en-US" sz="1800" spc="-1" strike="noStrike">
+                <a:solidFill>
+                  <a:srgbClr val="000000"/>
+                </a:solidFill>
+                <a:latin typeface="Arial"/>
+                <a:ea typeface="DejaVu Sans"/>
+              </a:rPr>
+              <a:t>Log in with a valid username</a:t>
+            </a:r>
+            <a:endParaRPr b="0" lang="en-US" sz="1800" spc="-1" strike="noStrike">
+              <a:latin typeface="Arial"/>
+            </a:endParaRPr>
+          </a:p>
+          <a:p>
+            <a:pPr marL="432000" indent="-322200">
+              <a:lnSpc>
+                <a:spcPct val="100000"/>
+              </a:lnSpc>
+              <a:spcBef>
+                <a:spcPts val="1417"/>
+              </a:spcBef>
+              <a:buClr>
+                <a:srgbClr val="000000"/>
+              </a:buClr>
+              <a:buSzPct val="45000"/>
+              <a:buFont typeface="Wingdings" charset="2"/>
+              <a:buChar char=""/>
+            </a:pPr>
+            <a:r>
+              <a:rPr b="0" lang="en-US" sz="1800" spc="-1" strike="noStrike">
+                <a:solidFill>
+                  <a:srgbClr val="000000"/>
+                </a:solidFill>
+                <a:latin typeface="Arial"/>
+                <a:ea typeface="DejaVu Sans"/>
+              </a:rPr>
+              <a:t>Show / update the list of current online players</a:t>
+            </a:r>
+            <a:endParaRPr b="0" lang="en-US" sz="1800" spc="-1" strike="noStrike">
+              <a:latin typeface="Arial"/>
+            </a:endParaRPr>
+          </a:p>
+          <a:p>
+            <a:pPr marL="432000" indent="-322200">
+              <a:lnSpc>
+                <a:spcPct val="100000"/>
+              </a:lnSpc>
+              <a:spcBef>
+                <a:spcPts val="1417"/>
+              </a:spcBef>
+              <a:buClr>
+                <a:srgbClr val="000000"/>
+              </a:buClr>
+              <a:buSzPct val="45000"/>
+              <a:buFont typeface="Wingdings" charset="2"/>
+              <a:buChar char=""/>
+            </a:pPr>
+            <a:r>
+              <a:rPr b="0" lang="en-US" sz="1800" spc="-1" strike="noStrike">
+                <a:solidFill>
+                  <a:srgbClr val="000000"/>
+                </a:solidFill>
+                <a:latin typeface="Arial"/>
+                <a:ea typeface="DejaVu Sans"/>
+              </a:rPr>
+              <a:t>Match 2 random players together</a:t>
+            </a:r>
+            <a:endParaRPr b="0" lang="en-US" sz="1800" spc="-1" strike="noStrike">
+              <a:latin typeface="Arial"/>
+            </a:endParaRPr>
+          </a:p>
+          <a:p>
+            <a:pPr marL="432000" indent="-322200">
+              <a:lnSpc>
+                <a:spcPct val="100000"/>
+              </a:lnSpc>
+              <a:spcBef>
+                <a:spcPts val="1417"/>
+              </a:spcBef>
+              <a:buClr>
+                <a:srgbClr val="000000"/>
+              </a:buClr>
+              <a:buSzPct val="45000"/>
+              <a:buFont typeface="Wingdings" charset="2"/>
+              <a:buChar char=""/>
+            </a:pPr>
+            <a:r>
+              <a:rPr b="0" lang="en-US" sz="1800" spc="-1" strike="noStrike">
+                <a:solidFill>
+                  <a:srgbClr val="000000"/>
+                </a:solidFill>
+                <a:latin typeface="Arial"/>
+                <a:ea typeface="DejaVu Sans"/>
+              </a:rPr>
+              <a:t>Gameplay (including set up phase and battle phase) implemented, but in offline mode</a:t>
+            </a:r>
+            <a:endParaRPr b="0" lang="en-US" sz="1800" spc="-1" strike="noStrike">
+              <a:latin typeface="Arial"/>
+            </a:endParaRPr>
+          </a:p>
+        </p:txBody>
+      </p:sp>
+    </p:spTree>
+  </p:cSld>
+  <mc:AlternateContent>
+    <mc:Choice Requires="p14">
+      <p:transition spd="slow" p14:dur="2000"/>
+    </mc:Choice>
+    <mc:Fallback>
+      <p:transition spd="slow"/>
+    </mc:Fallback>
+  </mc:AlternateContent>
+</p:sld>
+</file>
+
+<file path=ppt/slides/slide19.xml><?xml version="1.0" encoding="utf-8"?>
+<p:sld xmlns:a="http://schemas.openxmlformats.org/drawingml/2006/main" xmlns:p="http://schemas.openxmlformats.org/presentationml/2006/main" xmlns:r="http://schemas.openxmlformats.org/officeDocument/2006/relationships" xmlns:p14="http://schemas.microsoft.com/office/powerpoint/2010/main" xmlns:p15="http://schemas.microsoft.com/office/powerpoint/2012/main" xmlns:mc="http://schemas.openxmlformats.org/markup-compatibility/2006">
+  <p:cSld>
+    <p:spTree>
+      <p:nvGrpSpPr>
+        <p:cNvPr id="1" name=""/>
+        <p:cNvGrpSpPr/>
+        <p:nvPr/>
+      </p:nvGrpSpPr>
+      <p:grpSpPr>
+        <a:xfrm>
+          <a:off x="0" y="0"/>
+          <a:ext cx="0" cy="0"/>
+          <a:chOff x="0" y="0"/>
+          <a:chExt cx="0" cy="0"/>
+        </a:xfrm>
+      </p:grpSpPr>
+      <p:sp>
+        <p:nvSpPr>
+          <p:cNvPr id="524" name=""/>
+          <p:cNvSpPr/>
+          <p:nvPr/>
+        </p:nvSpPr>
+        <p:spPr>
+          <a:xfrm>
+            <a:off x="720000" y="360000"/>
+            <a:ext cx="8637120" cy="897120"/>
+          </a:xfrm>
+          <a:prstGeom prst="rect">
+            <a:avLst/>
+          </a:prstGeom>
+          <a:noFill/>
+          <a:ln w="0">
+            <a:noFill/>
+          </a:ln>
+        </p:spPr>
+        <p:style>
+          <a:lnRef idx="0"/>
+          <a:fillRef idx="0"/>
+          <a:effectRef idx="0"/>
+          <a:fontRef idx="minor"/>
+        </p:style>
+        <p:txBody>
+          <a:bodyPr lIns="0" rIns="0" tIns="0" bIns="0" anchor="ctr">
+            <a:noAutofit/>
+          </a:bodyPr>
+          <a:p>
+            <a:pPr algn="ctr">
+              <a:lnSpc>
+                <a:spcPct val="100000"/>
+              </a:lnSpc>
+            </a:pPr>
+            <a:r>
+              <a:rPr b="0" lang="en-US" sz="3200" spc="-1" strike="noStrike">
+                <a:solidFill>
+                  <a:srgbClr val="000000"/>
+                </a:solidFill>
+                <a:latin typeface="Arial"/>
+                <a:ea typeface="DejaVu Sans"/>
+              </a:rPr>
+              <a:t>Remaining work</a:t>
+            </a:r>
+            <a:endParaRPr b="0" lang="en-US" sz="3200" spc="-1" strike="noStrike">
+              <a:latin typeface="Arial"/>
+            </a:endParaRPr>
+          </a:p>
+        </p:txBody>
+      </p:sp>
+      <p:sp>
+        <p:nvSpPr>
+          <p:cNvPr id="525" name=""/>
+          <p:cNvSpPr/>
+          <p:nvPr/>
+        </p:nvSpPr>
+        <p:spPr>
+          <a:xfrm>
+            <a:off x="720000" y="1430280"/>
+            <a:ext cx="8422200" cy="3597120"/>
+          </a:xfrm>
+          <a:prstGeom prst="rect">
+            <a:avLst/>
+          </a:prstGeom>
+          <a:noFill/>
+          <a:ln w="0">
+            <a:noFill/>
+          </a:ln>
+        </p:spPr>
+        <p:style>
+          <a:lnRef idx="0"/>
+          <a:fillRef idx="0"/>
+          <a:effectRef idx="0"/>
+          <a:fontRef idx="minor"/>
+        </p:style>
+        <p:txBody>
+          <a:bodyPr lIns="0" rIns="0" tIns="0" bIns="0">
+            <a:normAutofit/>
+          </a:bodyPr>
+          <a:p>
+            <a:pPr marL="432000" indent="-322200">
+              <a:lnSpc>
+                <a:spcPct val="100000"/>
+              </a:lnSpc>
+              <a:spcBef>
+                <a:spcPts val="1417"/>
+              </a:spcBef>
+              <a:buClr>
+                <a:srgbClr val="000000"/>
+              </a:buClr>
+              <a:buSzPct val="45000"/>
+              <a:buFont typeface="Wingdings" charset="2"/>
+              <a:buChar char=""/>
+            </a:pPr>
+            <a:r>
+              <a:rPr b="0" lang="en-US" sz="1800" spc="-1" strike="noStrike">
+                <a:solidFill>
+                  <a:srgbClr val="000000"/>
+                </a:solidFill>
+                <a:latin typeface="Arial"/>
+                <a:ea typeface="DejaVu Sans"/>
+              </a:rPr>
+              <a:t>Enable users to directly challenge each others</a:t>
+            </a:r>
+            <a:endParaRPr b="0" lang="en-US" sz="1800" spc="-1" strike="noStrike">
+              <a:latin typeface="Arial"/>
+            </a:endParaRPr>
+          </a:p>
+          <a:p>
+            <a:pPr marL="432000" indent="-322200">
+              <a:lnSpc>
+                <a:spcPct val="100000"/>
+              </a:lnSpc>
+              <a:spcBef>
+                <a:spcPts val="1417"/>
+              </a:spcBef>
+              <a:buClr>
+                <a:srgbClr val="000000"/>
+              </a:buClr>
+              <a:buSzPct val="45000"/>
+              <a:buFont typeface="Wingdings" charset="2"/>
+              <a:buChar char=""/>
+            </a:pPr>
+            <a:r>
+              <a:rPr b="0" lang="en-US" sz="1800" spc="-1" strike="noStrike">
+                <a:solidFill>
+                  <a:srgbClr val="000000"/>
+                </a:solidFill>
+                <a:latin typeface="Arial"/>
+                <a:ea typeface="DejaVu Sans"/>
+              </a:rPr>
+              <a:t>Play the game online</a:t>
+            </a:r>
+            <a:endParaRPr b="0" lang="en-US" sz="1800" spc="-1" strike="noStrike">
+              <a:latin typeface="Arial"/>
+            </a:endParaRPr>
+          </a:p>
+          <a:p>
+            <a:pPr marL="432000" indent="-322200">
+              <a:lnSpc>
+                <a:spcPct val="100000"/>
+              </a:lnSpc>
+              <a:spcBef>
+                <a:spcPts val="1417"/>
+              </a:spcBef>
+              <a:buClr>
+                <a:srgbClr val="000000"/>
+              </a:buClr>
+              <a:buSzPct val="45000"/>
+              <a:buFont typeface="Wingdings" charset="2"/>
+              <a:buChar char=""/>
+            </a:pPr>
+            <a:r>
+              <a:rPr b="0" lang="en-US" sz="1800" spc="-1" strike="noStrike">
+                <a:solidFill>
+                  <a:srgbClr val="000000"/>
+                </a:solidFill>
+                <a:latin typeface="Arial"/>
+                <a:ea typeface="DejaVu Sans"/>
+              </a:rPr>
+              <a:t>Handle as many potential errors as possible</a:t>
+            </a:r>
+            <a:endParaRPr b="0" lang="en-US" sz="1800" spc="-1" strike="noStrike">
+              <a:latin typeface="Arial"/>
+            </a:endParaRPr>
+          </a:p>
+          <a:p>
+            <a:pPr marL="432000" indent="-322200">
+              <a:lnSpc>
+                <a:spcPct val="100000"/>
+              </a:lnSpc>
+              <a:spcBef>
+                <a:spcPts val="1417"/>
+              </a:spcBef>
+              <a:buClr>
+                <a:srgbClr val="000000"/>
+              </a:buClr>
+              <a:buSzPct val="45000"/>
+              <a:buFont typeface="Wingdings" charset="2"/>
+              <a:buChar char=""/>
+            </a:pPr>
+            <a:r>
+              <a:rPr b="0" lang="en-US" sz="1800" spc="-1" strike="noStrike">
+                <a:solidFill>
+                  <a:srgbClr val="000000"/>
+                </a:solidFill>
+                <a:latin typeface="Arial"/>
+                <a:ea typeface="DejaVu Sans"/>
+              </a:rPr>
+              <a:t>(Optional) Advanced Game mode</a:t>
+            </a:r>
+            <a:endParaRPr b="0" lang="en-US" sz="1800" spc="-1" strike="noStrike">
               <a:latin typeface="Arial"/>
             </a:endParaRPr>
           </a:p>
@@ -20999,14 +23194,14 @@
       </p:grpSpPr>
       <p:sp>
         <p:nvSpPr>
-          <p:cNvPr id="423" name=""/>
+          <p:cNvPr id="465" name=""/>
           <p:cNvSpPr/>
           <p:nvPr/>
         </p:nvSpPr>
         <p:spPr>
           <a:xfrm>
             <a:off x="720000" y="360000"/>
-            <a:ext cx="8637480" cy="897480"/>
+            <a:ext cx="8637120" cy="897120"/>
           </a:xfrm>
           <a:prstGeom prst="rect">
             <a:avLst/>
@@ -21050,14 +23245,14 @@
       </p:sp>
       <p:sp>
         <p:nvSpPr>
-          <p:cNvPr id="424" name=""/>
+          <p:cNvPr id="466" name=""/>
           <p:cNvSpPr/>
           <p:nvPr/>
         </p:nvSpPr>
         <p:spPr>
           <a:xfrm>
             <a:off x="720000" y="1440000"/>
-            <a:ext cx="4213440" cy="3597480"/>
+            <a:ext cx="4213080" cy="3597120"/>
           </a:xfrm>
           <a:prstGeom prst="rect">
             <a:avLst/>
@@ -21076,7 +23271,7 @@
       </p:sp>
       <p:pic>
         <p:nvPicPr>
-          <p:cNvPr id="425" name="" descr=""/>
+          <p:cNvPr id="467" name="" descr=""/>
           <p:cNvPicPr/>
           <p:nvPr/>
         </p:nvPicPr>
@@ -21087,7 +23282,7 @@
         <p:spPr>
           <a:xfrm>
             <a:off x="5146920" y="1751040"/>
-            <a:ext cx="4213440" cy="2975400"/>
+            <a:ext cx="4213080" cy="2975040"/>
           </a:xfrm>
           <a:prstGeom prst="rect">
             <a:avLst/>
@@ -21099,14 +23294,14 @@
       </p:pic>
       <p:sp>
         <p:nvSpPr>
-          <p:cNvPr id="426" name=""/>
+          <p:cNvPr id="468" name=""/>
           <p:cNvSpPr/>
           <p:nvPr/>
         </p:nvSpPr>
         <p:spPr>
           <a:xfrm>
             <a:off x="720000" y="1600200"/>
-            <a:ext cx="4078440" cy="2903760"/>
+            <a:ext cx="4078080" cy="2903400"/>
           </a:xfrm>
           <a:prstGeom prst="rect">
             <a:avLst/>
@@ -21280,14 +23475,14 @@
       </p:sp>
       <p:sp>
         <p:nvSpPr>
-          <p:cNvPr id="427" name=""/>
+          <p:cNvPr id="469" name=""/>
           <p:cNvSpPr/>
           <p:nvPr/>
         </p:nvSpPr>
         <p:spPr>
           <a:xfrm>
             <a:off x="5257800" y="5029200"/>
-            <a:ext cx="3656880" cy="430920"/>
+            <a:ext cx="3656520" cy="430560"/>
           </a:xfrm>
           <a:prstGeom prst="rect">
             <a:avLst/>
@@ -21324,6 +23519,87 @@
               <a:t>(The image is for illustration, not presented for the final product)</a:t>
             </a:r>
             <a:endParaRPr b="0" lang="en-US" sz="1200" spc="-1" strike="noStrike">
+              <a:latin typeface="Arial"/>
+            </a:endParaRPr>
+          </a:p>
+        </p:txBody>
+      </p:sp>
+    </p:spTree>
+  </p:cSld>
+  <mc:AlternateContent>
+    <mc:Choice Requires="p14">
+      <p:transition spd="slow" p14:dur="2000"/>
+    </mc:Choice>
+    <mc:Fallback>
+      <p:transition spd="slow"/>
+    </mc:Fallback>
+  </mc:AlternateContent>
+</p:sld>
+</file>
+
+<file path=ppt/slides/slide20.xml><?xml version="1.0" encoding="utf-8"?>
+<p:sld xmlns:a="http://schemas.openxmlformats.org/drawingml/2006/main" xmlns:p="http://schemas.openxmlformats.org/presentationml/2006/main" xmlns:r="http://schemas.openxmlformats.org/officeDocument/2006/relationships" xmlns:p14="http://schemas.microsoft.com/office/powerpoint/2010/main" xmlns:p15="http://schemas.microsoft.com/office/powerpoint/2012/main" xmlns:mc="http://schemas.openxmlformats.org/markup-compatibility/2006">
+  <p:cSld>
+    <p:spTree>
+      <p:nvGrpSpPr>
+        <p:cNvPr id="1" name=""/>
+        <p:cNvGrpSpPr/>
+        <p:nvPr/>
+      </p:nvGrpSpPr>
+      <p:grpSpPr>
+        <a:xfrm>
+          <a:off x="0" y="0"/>
+          <a:ext cx="0" cy="0"/>
+          <a:chOff x="0" y="0"/>
+          <a:chExt cx="0" cy="0"/>
+        </a:xfrm>
+      </p:grpSpPr>
+      <p:sp>
+        <p:nvSpPr>
+          <p:cNvPr id="526" name=""/>
+          <p:cNvSpPr/>
+          <p:nvPr/>
+        </p:nvSpPr>
+        <p:spPr>
+          <a:xfrm>
+            <a:off x="733320" y="685800"/>
+            <a:ext cx="8637120" cy="4167720"/>
+          </a:xfrm>
+          <a:prstGeom prst="rect">
+            <a:avLst/>
+          </a:prstGeom>
+          <a:noFill/>
+          <a:ln w="0">
+            <a:noFill/>
+          </a:ln>
+        </p:spPr>
+        <p:style>
+          <a:lnRef idx="0"/>
+          <a:fillRef idx="0"/>
+          <a:effectRef idx="0"/>
+          <a:fontRef idx="minor"/>
+        </p:style>
+        <p:txBody>
+          <a:bodyPr lIns="0" rIns="0" tIns="0" bIns="0" anchor="ctr">
+            <a:noAutofit/>
+          </a:bodyPr>
+          <a:p>
+            <a:pPr algn="ctr">
+              <a:lnSpc>
+                <a:spcPct val="100000"/>
+              </a:lnSpc>
+            </a:pPr>
+            <a:r>
+              <a:rPr b="0" lang="en-US" sz="5400" spc="-1" strike="noStrike">
+                <a:solidFill>
+                  <a:srgbClr val="000000"/>
+                </a:solidFill>
+                <a:latin typeface="Arial"/>
+                <a:ea typeface="DejaVu Sans"/>
+              </a:rPr>
+              <a:t>Thanks for listening :3</a:t>
+            </a:r>
+            <a:endParaRPr b="0" lang="en-US" sz="5400" spc="-1" strike="noStrike">
               <a:latin typeface="Arial"/>
             </a:endParaRPr>
           </a:p>
@@ -21361,14 +23637,14 @@
       </p:grpSpPr>
       <p:sp>
         <p:nvSpPr>
-          <p:cNvPr id="428" name=""/>
+          <p:cNvPr id="470" name=""/>
           <p:cNvSpPr/>
           <p:nvPr/>
         </p:nvSpPr>
         <p:spPr>
           <a:xfrm>
             <a:off x="720000" y="360000"/>
-            <a:ext cx="8637480" cy="897480"/>
+            <a:ext cx="8637120" cy="897120"/>
           </a:xfrm>
           <a:prstGeom prst="rect">
             <a:avLst/>
@@ -21412,14 +23688,14 @@
       </p:sp>
       <p:sp>
         <p:nvSpPr>
-          <p:cNvPr id="429" name=""/>
+          <p:cNvPr id="471" name=""/>
           <p:cNvSpPr/>
           <p:nvPr/>
         </p:nvSpPr>
         <p:spPr>
           <a:xfrm>
             <a:off x="720000" y="1440000"/>
-            <a:ext cx="4213440" cy="3597480"/>
+            <a:ext cx="4213080" cy="3597120"/>
           </a:xfrm>
           <a:prstGeom prst="rect">
             <a:avLst/>
@@ -21438,7 +23714,7 @@
       </p:sp>
       <p:pic>
         <p:nvPicPr>
-          <p:cNvPr id="430" name="" descr=""/>
+          <p:cNvPr id="472" name="" descr=""/>
           <p:cNvPicPr/>
           <p:nvPr/>
         </p:nvPicPr>
@@ -21449,7 +23725,7 @@
         <p:spPr>
           <a:xfrm>
             <a:off x="5146920" y="1751040"/>
-            <a:ext cx="4213440" cy="2975400"/>
+            <a:ext cx="4213080" cy="2975040"/>
           </a:xfrm>
           <a:prstGeom prst="rect">
             <a:avLst/>
@@ -21461,14 +23737,14 @@
       </p:pic>
       <p:sp>
         <p:nvSpPr>
-          <p:cNvPr id="431" name=""/>
+          <p:cNvPr id="473" name=""/>
           <p:cNvSpPr/>
           <p:nvPr/>
         </p:nvSpPr>
         <p:spPr>
           <a:xfrm>
             <a:off x="720000" y="1600200"/>
-            <a:ext cx="4078440" cy="2903760"/>
+            <a:ext cx="4078080" cy="2903400"/>
           </a:xfrm>
           <a:prstGeom prst="rect">
             <a:avLst/>
@@ -21612,14 +23888,14 @@
       </p:sp>
       <p:sp>
         <p:nvSpPr>
-          <p:cNvPr id="432" name=""/>
+          <p:cNvPr id="474" name=""/>
           <p:cNvSpPr/>
           <p:nvPr/>
         </p:nvSpPr>
         <p:spPr>
           <a:xfrm>
             <a:off x="5257800" y="5029560"/>
-            <a:ext cx="3656880" cy="430920"/>
+            <a:ext cx="3656520" cy="430560"/>
           </a:xfrm>
           <a:prstGeom prst="rect">
             <a:avLst/>
@@ -21693,14 +23969,14 @@
       </p:grpSpPr>
       <p:sp>
         <p:nvSpPr>
-          <p:cNvPr id="433" name=""/>
+          <p:cNvPr id="475" name=""/>
           <p:cNvSpPr/>
           <p:nvPr/>
         </p:nvSpPr>
         <p:spPr>
           <a:xfrm>
             <a:off x="720000" y="360000"/>
-            <a:ext cx="8637480" cy="897480"/>
+            <a:ext cx="8637120" cy="897120"/>
           </a:xfrm>
           <a:prstGeom prst="rect">
             <a:avLst/>
@@ -21744,14 +24020,14 @@
       </p:sp>
       <p:sp>
         <p:nvSpPr>
-          <p:cNvPr id="434" name=""/>
+          <p:cNvPr id="476" name=""/>
           <p:cNvSpPr/>
           <p:nvPr/>
         </p:nvSpPr>
         <p:spPr>
           <a:xfrm>
             <a:off x="720000" y="1440000"/>
-            <a:ext cx="8650800" cy="3597480"/>
+            <a:ext cx="8650440" cy="3597120"/>
           </a:xfrm>
           <a:prstGeom prst="rect">
             <a:avLst/>
@@ -21772,7 +24048,7 @@
             <a:normAutofit fontScale="14000"/>
           </a:bodyPr>
           <a:p>
-            <a:pPr marL="432000" indent="-322200">
+            <a:pPr marL="432000" indent="-321840">
               <a:lnSpc>
                 <a:spcPct val="100000"/>
               </a:lnSpc>
@@ -21801,7 +24077,7 @@
             </a:endParaRPr>
           </a:p>
           <a:p>
-            <a:pPr marL="432000" indent="-322200">
+            <a:pPr marL="432000" indent="-321840">
               <a:lnSpc>
                 <a:spcPct val="100000"/>
               </a:lnSpc>
@@ -21830,7 +24106,7 @@
             </a:endParaRPr>
           </a:p>
           <a:p>
-            <a:pPr marL="432000" indent="-322200">
+            <a:pPr marL="432000" indent="-321840">
               <a:lnSpc>
                 <a:spcPct val="100000"/>
               </a:lnSpc>
@@ -21859,7 +24135,7 @@
             </a:endParaRPr>
           </a:p>
           <a:p>
-            <a:pPr marL="432000" indent="-322200">
+            <a:pPr marL="432000" indent="-321840">
               <a:lnSpc>
                 <a:spcPct val="100000"/>
               </a:lnSpc>
@@ -21888,7 +24164,7 @@
             </a:endParaRPr>
           </a:p>
           <a:p>
-            <a:pPr marL="432000" indent="-322200">
+            <a:pPr marL="432000" indent="-321840">
               <a:lnSpc>
                 <a:spcPct val="100000"/>
               </a:lnSpc>
@@ -21917,7 +24193,7 @@
             </a:endParaRPr>
           </a:p>
           <a:p>
-            <a:pPr marL="432000" indent="-322200">
+            <a:pPr marL="432000" indent="-321840">
               <a:lnSpc>
                 <a:spcPct val="100000"/>
               </a:lnSpc>
@@ -21979,14 +24255,14 @@
       </p:grpSpPr>
       <p:sp>
         <p:nvSpPr>
-          <p:cNvPr id="435" name=""/>
+          <p:cNvPr id="477" name=""/>
           <p:cNvSpPr/>
           <p:nvPr/>
         </p:nvSpPr>
         <p:spPr>
           <a:xfrm>
             <a:off x="720000" y="360000"/>
-            <a:ext cx="8637480" cy="897480"/>
+            <a:ext cx="8637120" cy="897120"/>
           </a:xfrm>
           <a:prstGeom prst="rect">
             <a:avLst/>
@@ -22030,14 +24306,14 @@
       </p:sp>
       <p:sp>
         <p:nvSpPr>
-          <p:cNvPr id="436" name=""/>
+          <p:cNvPr id="478" name=""/>
           <p:cNvSpPr/>
           <p:nvPr/>
         </p:nvSpPr>
         <p:spPr>
           <a:xfrm>
             <a:off x="720000" y="1440000"/>
-            <a:ext cx="8193960" cy="3597480"/>
+            <a:ext cx="8193600" cy="3597120"/>
           </a:xfrm>
           <a:prstGeom prst="rect">
             <a:avLst/>
@@ -22058,7 +24334,7 @@
             <a:normAutofit/>
           </a:bodyPr>
           <a:p>
-            <a:pPr marL="432000" indent="-322560">
+            <a:pPr marL="432000" indent="-322200">
               <a:lnSpc>
                 <a:spcPct val="100000"/>
               </a:lnSpc>
@@ -22087,7 +24363,7 @@
             </a:endParaRPr>
           </a:p>
           <a:p>
-            <a:pPr marL="432000" indent="-322560">
+            <a:pPr marL="432000" indent="-322200">
               <a:lnSpc>
                 <a:spcPct val="100000"/>
               </a:lnSpc>
@@ -22116,7 +24392,7 @@
             </a:endParaRPr>
           </a:p>
           <a:p>
-            <a:pPr lvl="2" marL="1296000" indent="-286560">
+            <a:pPr lvl="2" marL="1296000" indent="-286200">
               <a:lnSpc>
                 <a:spcPct val="100000"/>
               </a:lnSpc>
@@ -22168,7 +24444,7 @@
             </a:endParaRPr>
           </a:p>
           <a:p>
-            <a:pPr lvl="2" marL="1296000" indent="-286560">
+            <a:pPr lvl="2" marL="1296000" indent="-286200">
               <a:lnSpc>
                 <a:spcPct val="100000"/>
               </a:lnSpc>
@@ -22240,7 +24516,7 @@
       </p:sp>
       <p:sp>
         <p:nvSpPr>
-          <p:cNvPr id="437" name=""/>
+          <p:cNvPr id="479" name=""/>
           <p:cNvSpPr/>
           <p:nvPr/>
         </p:nvSpPr>
@@ -22268,7 +24544,7 @@
       </p:sp>
       <p:sp>
         <p:nvSpPr>
-          <p:cNvPr id="438" name=""/>
+          <p:cNvPr id="480" name=""/>
           <p:cNvSpPr/>
           <p:nvPr/>
         </p:nvSpPr>
@@ -22296,7 +24572,7 @@
       </p:sp>
       <p:pic>
         <p:nvPicPr>
-          <p:cNvPr id="439" name="" descr=""/>
+          <p:cNvPr id="481" name="" descr=""/>
           <p:cNvPicPr/>
           <p:nvPr/>
         </p:nvPicPr>
@@ -22307,7 +24583,7 @@
         <p:spPr>
           <a:xfrm>
             <a:off x="7101000" y="1440000"/>
-            <a:ext cx="817560" cy="844920"/>
+            <a:ext cx="817200" cy="844560"/>
           </a:xfrm>
           <a:prstGeom prst="rect">
             <a:avLst/>
@@ -22319,7 +24595,7 @@
       </p:pic>
       <p:pic>
         <p:nvPicPr>
-          <p:cNvPr id="440" name="" descr=""/>
+          <p:cNvPr id="482" name="" descr=""/>
           <p:cNvPicPr/>
           <p:nvPr/>
         </p:nvPicPr>
@@ -22330,7 +24606,7 @@
         <p:spPr>
           <a:xfrm>
             <a:off x="6039360" y="2811600"/>
-            <a:ext cx="817560" cy="844920"/>
+            <a:ext cx="817200" cy="844560"/>
           </a:xfrm>
           <a:prstGeom prst="rect">
             <a:avLst/>
@@ -22342,7 +24618,7 @@
       </p:pic>
       <p:pic>
         <p:nvPicPr>
-          <p:cNvPr id="441" name="" descr=""/>
+          <p:cNvPr id="483" name="" descr=""/>
           <p:cNvPicPr/>
           <p:nvPr/>
         </p:nvPicPr>
@@ -22353,7 +24629,7 @@
         <p:spPr>
           <a:xfrm>
             <a:off x="7182360" y="2811600"/>
-            <a:ext cx="817560" cy="844920"/>
+            <a:ext cx="817200" cy="844560"/>
           </a:xfrm>
           <a:prstGeom prst="rect">
             <a:avLst/>
@@ -22365,7 +24641,7 @@
       </p:pic>
       <p:pic>
         <p:nvPicPr>
-          <p:cNvPr id="442" name="" descr=""/>
+          <p:cNvPr id="484" name="" descr=""/>
           <p:cNvPicPr/>
           <p:nvPr/>
         </p:nvPicPr>
@@ -22376,7 +24652,7 @@
         <p:spPr>
           <a:xfrm>
             <a:off x="8325360" y="2811600"/>
-            <a:ext cx="817560" cy="844920"/>
+            <a:ext cx="817200" cy="844560"/>
           </a:xfrm>
           <a:prstGeom prst="rect">
             <a:avLst/>
@@ -22388,7 +24664,7 @@
       </p:pic>
       <p:sp>
         <p:nvSpPr>
-          <p:cNvPr id="443" name=""/>
+          <p:cNvPr id="485" name=""/>
           <p:cNvSpPr/>
           <p:nvPr/>
         </p:nvSpPr>
@@ -22417,7 +24693,7 @@
       </p:sp>
       <p:sp>
         <p:nvSpPr>
-          <p:cNvPr id="444" name=""/>
+          <p:cNvPr id="486" name=""/>
           <p:cNvSpPr/>
           <p:nvPr/>
         </p:nvSpPr>
@@ -22446,7 +24722,7 @@
       </p:sp>
       <p:sp>
         <p:nvSpPr>
-          <p:cNvPr id="445" name=""/>
+          <p:cNvPr id="487" name=""/>
           <p:cNvSpPr/>
           <p:nvPr/>
         </p:nvSpPr>
@@ -22475,14 +24751,14 @@
       </p:sp>
       <p:sp>
         <p:nvSpPr>
-          <p:cNvPr id="446" name=""/>
+          <p:cNvPr id="488" name=""/>
           <p:cNvSpPr/>
           <p:nvPr/>
         </p:nvSpPr>
         <p:spPr>
           <a:xfrm>
             <a:off x="8001000" y="1687320"/>
-            <a:ext cx="1599120" cy="369000"/>
+            <a:ext cx="1598760" cy="368640"/>
           </a:xfrm>
           <a:prstGeom prst="rect">
             <a:avLst/>
@@ -22526,14 +24802,14 @@
       </p:sp>
       <p:sp>
         <p:nvSpPr>
-          <p:cNvPr id="447" name=""/>
+          <p:cNvPr id="489" name=""/>
           <p:cNvSpPr/>
           <p:nvPr/>
         </p:nvSpPr>
         <p:spPr>
           <a:xfrm>
             <a:off x="5715000" y="3744720"/>
-            <a:ext cx="913320" cy="369000"/>
+            <a:ext cx="912960" cy="368640"/>
           </a:xfrm>
           <a:prstGeom prst="rect">
             <a:avLst/>
@@ -22577,14 +24853,14 @@
       </p:sp>
       <p:sp>
         <p:nvSpPr>
-          <p:cNvPr id="448" name=""/>
+          <p:cNvPr id="490" name=""/>
           <p:cNvSpPr/>
           <p:nvPr/>
         </p:nvSpPr>
         <p:spPr>
           <a:xfrm>
             <a:off x="7086600" y="3744720"/>
-            <a:ext cx="913320" cy="369000"/>
+            <a:ext cx="912960" cy="368640"/>
           </a:xfrm>
           <a:prstGeom prst="rect">
             <a:avLst/>
@@ -22628,14 +24904,14 @@
       </p:sp>
       <p:sp>
         <p:nvSpPr>
-          <p:cNvPr id="449" name=""/>
+          <p:cNvPr id="491" name=""/>
           <p:cNvSpPr/>
           <p:nvPr/>
         </p:nvSpPr>
         <p:spPr>
           <a:xfrm>
             <a:off x="8458200" y="3744720"/>
-            <a:ext cx="913320" cy="369000"/>
+            <a:ext cx="912960" cy="368640"/>
           </a:xfrm>
           <a:prstGeom prst="rect">
             <a:avLst/>
@@ -22709,14 +24985,14 @@
       </p:grpSpPr>
       <p:sp>
         <p:nvSpPr>
-          <p:cNvPr id="450" name=""/>
+          <p:cNvPr id="492" name=""/>
           <p:cNvSpPr/>
           <p:nvPr/>
         </p:nvSpPr>
         <p:spPr>
           <a:xfrm>
             <a:off x="504000" y="226080"/>
-            <a:ext cx="9071640" cy="946080"/>
+            <a:ext cx="9071280" cy="945720"/>
           </a:xfrm>
           <a:prstGeom prst="rect">
             <a:avLst/>
@@ -22744,7 +25020,11 @@
             </a:pPr>
             <a:r>
               <a:rPr b="0" lang="en-US" sz="3200" spc="-1" strike="noStrike">
+                <a:solidFill>
+                  <a:srgbClr val="000000"/>
+                </a:solidFill>
                 <a:latin typeface="Arial"/>
+                <a:ea typeface="DejaVu Sans"/>
               </a:rPr>
               <a:t>Usecase diagram</a:t>
             </a:r>
@@ -22756,7 +25036,7 @@
       </p:sp>
       <p:pic>
         <p:nvPicPr>
-          <p:cNvPr id="451" name="" descr=""/>
+          <p:cNvPr id="493" name="" descr=""/>
           <p:cNvPicPr/>
           <p:nvPr/>
         </p:nvPicPr>
@@ -22767,7 +25047,7 @@
         <p:spPr>
           <a:xfrm>
             <a:off x="3429000" y="1371600"/>
-            <a:ext cx="3190320" cy="3056760"/>
+            <a:ext cx="3189960" cy="3056400"/>
           </a:xfrm>
           <a:prstGeom prst="rect">
             <a:avLst/>
@@ -22809,14 +25089,14 @@
       </p:grpSpPr>
       <p:sp>
         <p:nvSpPr>
-          <p:cNvPr id="452" name=""/>
+          <p:cNvPr id="494" name=""/>
           <p:cNvSpPr/>
           <p:nvPr/>
         </p:nvSpPr>
         <p:spPr>
           <a:xfrm>
             <a:off x="720000" y="15840"/>
-            <a:ext cx="8637480" cy="897480"/>
+            <a:ext cx="8637120" cy="897120"/>
           </a:xfrm>
           <a:prstGeom prst="rect">
             <a:avLst/>
@@ -22860,7 +25140,7 @@
       </p:sp>
       <p:pic>
         <p:nvPicPr>
-          <p:cNvPr id="453" name="" descr=""/>
+          <p:cNvPr id="495" name="" descr=""/>
           <p:cNvPicPr/>
           <p:nvPr/>
         </p:nvPicPr>
@@ -22871,7 +25151,7 @@
         <p:spPr>
           <a:xfrm>
             <a:off x="1600200" y="914040"/>
-            <a:ext cx="7085880" cy="4483800"/>
+            <a:ext cx="7085520" cy="4483440"/>
           </a:xfrm>
           <a:prstGeom prst="rect">
             <a:avLst/>
@@ -22913,14 +25193,14 @@
       </p:grpSpPr>
       <p:sp>
         <p:nvSpPr>
-          <p:cNvPr id="454" name=""/>
+          <p:cNvPr id="496" name=""/>
           <p:cNvSpPr/>
           <p:nvPr/>
         </p:nvSpPr>
         <p:spPr>
           <a:xfrm>
             <a:off x="720000" y="360000"/>
-            <a:ext cx="8637480" cy="897480"/>
+            <a:ext cx="8637120" cy="897120"/>
           </a:xfrm>
           <a:prstGeom prst="rect">
             <a:avLst/>
@@ -22964,14 +25244,14 @@
       </p:sp>
       <p:sp>
         <p:nvSpPr>
-          <p:cNvPr id="455" name=""/>
+          <p:cNvPr id="497" name=""/>
           <p:cNvSpPr/>
           <p:nvPr/>
         </p:nvSpPr>
         <p:spPr>
           <a:xfrm>
             <a:off x="720000" y="1430280"/>
-            <a:ext cx="8422560" cy="3597480"/>
+            <a:ext cx="8422200" cy="3597120"/>
           </a:xfrm>
           <a:prstGeom prst="rect">
             <a:avLst/>
@@ -22992,7 +25272,7 @@
             <a:normAutofit/>
           </a:bodyPr>
           <a:p>
-            <a:pPr marL="432000" indent="-322560">
+            <a:pPr marL="432000" indent="-322200">
               <a:lnSpc>
                 <a:spcPct val="100000"/>
               </a:lnSpc>
@@ -23021,7 +25301,7 @@
             </a:endParaRPr>
           </a:p>
           <a:p>
-            <a:pPr marL="432000" indent="-322560">
+            <a:pPr marL="432000" indent="-322200">
               <a:lnSpc>
                 <a:spcPct val="100000"/>
               </a:lnSpc>
@@ -23070,7 +25350,7 @@
             </a:endParaRPr>
           </a:p>
           <a:p>
-            <a:pPr marL="432000" indent="-322560">
+            <a:pPr marL="432000" indent="-322200">
               <a:lnSpc>
                 <a:spcPct val="100000"/>
               </a:lnSpc>
@@ -23099,7 +25379,7 @@
             </a:endParaRPr>
           </a:p>
           <a:p>
-            <a:pPr marL="432000" indent="-322560">
+            <a:pPr marL="432000" indent="-322200">
               <a:lnSpc>
                 <a:spcPct val="100000"/>
               </a:lnSpc>
@@ -23168,7 +25448,7 @@
             </a:endParaRPr>
           </a:p>
           <a:p>
-            <a:pPr marL="432000" indent="-322560">
+            <a:pPr marL="432000" indent="-322200">
               <a:lnSpc>
                 <a:spcPct val="100000"/>
               </a:lnSpc>
@@ -23270,14 +25550,14 @@
       </p:grpSpPr>
       <p:sp>
         <p:nvSpPr>
-          <p:cNvPr id="456" name=""/>
+          <p:cNvPr id="498" name=""/>
           <p:cNvSpPr/>
           <p:nvPr/>
         </p:nvSpPr>
         <p:spPr>
           <a:xfrm>
             <a:off x="720000" y="360000"/>
-            <a:ext cx="8637480" cy="897480"/>
+            <a:ext cx="8637120" cy="897120"/>
           </a:xfrm>
           <a:prstGeom prst="rect">
             <a:avLst/>
@@ -23321,14 +25601,14 @@
       </p:sp>
       <p:sp>
         <p:nvSpPr>
-          <p:cNvPr id="457" name=""/>
+          <p:cNvPr id="499" name=""/>
           <p:cNvSpPr/>
           <p:nvPr/>
         </p:nvSpPr>
         <p:spPr>
           <a:xfrm>
             <a:off x="720000" y="1440000"/>
-            <a:ext cx="8422560" cy="3597480"/>
+            <a:ext cx="8422200" cy="3597120"/>
           </a:xfrm>
           <a:prstGeom prst="rect">
             <a:avLst/>
@@ -23349,7 +25629,7 @@
             <a:normAutofit/>
           </a:bodyPr>
           <a:p>
-            <a:pPr marL="432000" indent="-322560">
+            <a:pPr marL="432000" indent="-322200">
               <a:lnSpc>
                 <a:spcPct val="100000"/>
               </a:lnSpc>
@@ -23378,7 +25658,7 @@
             </a:endParaRPr>
           </a:p>
           <a:p>
-            <a:pPr marL="432000" indent="-322560">
+            <a:pPr marL="432000" indent="-322200">
               <a:lnSpc>
                 <a:spcPct val="100000"/>
               </a:lnSpc>
@@ -23407,7 +25687,7 @@
             </a:endParaRPr>
           </a:p>
           <a:p>
-            <a:pPr marL="432000" indent="-322560">
+            <a:pPr marL="432000" indent="-322200">
               <a:lnSpc>
                 <a:spcPct val="100000"/>
               </a:lnSpc>
@@ -23456,7 +25736,7 @@
             </a:endParaRPr>
           </a:p>
           <a:p>
-            <a:pPr marL="432000" indent="-322560">
+            <a:pPr marL="432000" indent="-322200">
               <a:lnSpc>
                 <a:spcPct val="100000"/>
               </a:lnSpc>
@@ -23525,7 +25805,7 @@
             </a:endParaRPr>
           </a:p>
           <a:p>
-            <a:pPr marL="432000" indent="-322560">
+            <a:pPr marL="432000" indent="-322200">
               <a:lnSpc>
                 <a:spcPct val="100000"/>
               </a:lnSpc>
@@ -23795,6 +26075,232 @@
 </file>
 
 <file path=ppt/theme/theme10.xml><?xml version="1.0" encoding="utf-8"?>
+<a:theme xmlns:a="http://schemas.openxmlformats.org/drawingml/2006/main" name="Office Theme">
+  <a:themeElements>
+    <a:clrScheme name="Office">
+      <a:dk1>
+        <a:sysClr val="windowText" lastClr="000000"/>
+      </a:dk1>
+      <a:lt1>
+        <a:sysClr val="window" lastClr="FFFFFF"/>
+      </a:lt1>
+      <a:dk2>
+        <a:srgbClr val="1f497d"/>
+      </a:dk2>
+      <a:lt2>
+        <a:srgbClr val="eeece1"/>
+      </a:lt2>
+      <a:accent1>
+        <a:srgbClr val="4f81bd"/>
+      </a:accent1>
+      <a:accent2>
+        <a:srgbClr val="c0504d"/>
+      </a:accent2>
+      <a:accent3>
+        <a:srgbClr val="9bbb59"/>
+      </a:accent3>
+      <a:accent4>
+        <a:srgbClr val="8064a2"/>
+      </a:accent4>
+      <a:accent5>
+        <a:srgbClr val="4bacc6"/>
+      </a:accent5>
+      <a:accent6>
+        <a:srgbClr val="f79646"/>
+      </a:accent6>
+      <a:hlink>
+        <a:srgbClr val="0000ff"/>
+      </a:hlink>
+      <a:folHlink>
+        <a:srgbClr val="800080"/>
+      </a:folHlink>
+    </a:clrScheme>
+    <a:fontScheme name="Office">
+      <a:majorFont>
+        <a:latin typeface="Arial"/>
+        <a:ea typeface="DejaVu Sans"/>
+        <a:cs typeface="DejaVu Sans"/>
+      </a:majorFont>
+      <a:minorFont>
+        <a:latin typeface="Arial"/>
+        <a:ea typeface="DejaVu Sans"/>
+        <a:cs typeface="DejaVu Sans"/>
+      </a:minorFont>
+    </a:fontScheme>
+    <a:fmtScheme name="Office">
+      <a:fillStyleLst>
+        <a:solidFill>
+          <a:schemeClr val="phClr"/>
+        </a:solidFill>
+        <a:gradFill rotWithShape="1">
+          <a:gsLst>
+            <a:gs pos="0">
+              <a:schemeClr val="phClr">
+                <a:tint val="50000"/>
+                <a:satMod val="300000"/>
+              </a:schemeClr>
+            </a:gs>
+            <a:gs pos="35000">
+              <a:schemeClr val="phClr">
+                <a:tint val="37000"/>
+                <a:satMod val="300000"/>
+              </a:schemeClr>
+            </a:gs>
+            <a:gs pos="100000">
+              <a:schemeClr val="phClr">
+                <a:tint val="15000"/>
+                <a:satMod val="350000"/>
+              </a:schemeClr>
+            </a:gs>
+          </a:gsLst>
+          <a:lin ang="16200000" scaled="1"/>
+        </a:gradFill>
+        <a:gradFill rotWithShape="1">
+          <a:gsLst>
+            <a:gs pos="0">
+              <a:schemeClr val="phClr">
+                <a:shade val="51000"/>
+                <a:satMod val="130000"/>
+              </a:schemeClr>
+            </a:gs>
+            <a:gs pos="80000">
+              <a:schemeClr val="phClr">
+                <a:shade val="93000"/>
+                <a:satMod val="130000"/>
+              </a:schemeClr>
+            </a:gs>
+            <a:gs pos="100000">
+              <a:schemeClr val="phClr">
+                <a:shade val="94000"/>
+                <a:satMod val="135000"/>
+              </a:schemeClr>
+            </a:gs>
+          </a:gsLst>
+          <a:lin ang="16200000" scaled="0"/>
+        </a:gradFill>
+      </a:fillStyleLst>
+      <a:lnStyleLst>
+        <a:ln w="9525" cap="flat" cmpd="sng" algn="ctr">
+          <a:solidFill>
+            <a:schemeClr val="phClr">
+              <a:shade val="95000"/>
+              <a:satMod val="105000"/>
+            </a:schemeClr>
+          </a:solidFill>
+          <a:prstDash val="solid"/>
+          <a:miter/>
+        </a:ln>
+        <a:ln w="25400" cap="flat" cmpd="sng" algn="ctr">
+          <a:solidFill>
+            <a:schemeClr val="phClr"/>
+          </a:solidFill>
+          <a:prstDash val="solid"/>
+          <a:miter/>
+        </a:ln>
+        <a:ln w="38100" cap="flat" cmpd="sng" algn="ctr">
+          <a:solidFill>
+            <a:schemeClr val="phClr"/>
+          </a:solidFill>
+          <a:prstDash val="solid"/>
+          <a:miter/>
+        </a:ln>
+      </a:lnStyleLst>
+      <a:effectStyleLst>
+        <a:effectStyle>
+          <a:effectLst>
+            <a:outerShdw blurRad="40000" dist="20000" dir="5400000" rotWithShape="0">
+              <a:srgbClr val="000000">
+                <a:alpha val="38000"/>
+              </a:srgbClr>
+            </a:outerShdw>
+          </a:effectLst>
+        </a:effectStyle>
+        <a:effectStyle>
+          <a:effectLst>
+            <a:outerShdw blurRad="40000" dist="23000" dir="5400000" rotWithShape="0">
+              <a:srgbClr val="000000">
+                <a:alpha val="35000"/>
+              </a:srgbClr>
+            </a:outerShdw>
+          </a:effectLst>
+        </a:effectStyle>
+        <a:effectStyle>
+          <a:effectLst>
+            <a:outerShdw blurRad="40000" dist="23000" dir="5400000" rotWithShape="0">
+              <a:srgbClr val="000000">
+                <a:alpha val="35000"/>
+              </a:srgbClr>
+            </a:outerShdw>
+          </a:effectLst>
+          <a:scene3d>
+            <a:camera prst="orthographicFront">
+              <a:rot lat="0" lon="0" rev="0"/>
+            </a:camera>
+            <a:lightRig rig="threePt" dir="t">
+              <a:rot lat="0" lon="0" rev="1200000"/>
+            </a:lightRig>
+          </a:scene3d>
+          <a:sp3d>
+            <a:bevelT w="63500" h="25400"/>
+          </a:sp3d>
+        </a:effectStyle>
+      </a:effectStyleLst>
+      <a:bgFillStyleLst>
+        <a:solidFill>
+          <a:schemeClr val="phClr"/>
+        </a:solidFill>
+        <a:gradFill rotWithShape="1">
+          <a:gsLst>
+            <a:gs pos="0">
+              <a:schemeClr val="phClr">
+                <a:tint val="40000"/>
+                <a:satMod val="350000"/>
+              </a:schemeClr>
+            </a:gs>
+            <a:gs pos="40000">
+              <a:schemeClr val="phClr">
+                <a:tint val="45000"/>
+                <a:shade val="99000"/>
+                <a:satMod val="350000"/>
+              </a:schemeClr>
+            </a:gs>
+            <a:gs pos="100000">
+              <a:schemeClr val="phClr">
+                <a:shade val="20000"/>
+                <a:satMod val="255000"/>
+              </a:schemeClr>
+            </a:gs>
+          </a:gsLst>
+          <a:path path="circle">
+            <a:fillToRect l="50000" t="-80000" r="50000" b="180000"/>
+          </a:path>
+        </a:gradFill>
+        <a:gradFill rotWithShape="1">
+          <a:gsLst>
+            <a:gs pos="0">
+              <a:schemeClr val="phClr">
+                <a:tint val="80000"/>
+                <a:satMod val="300000"/>
+              </a:schemeClr>
+            </a:gs>
+            <a:gs pos="100000">
+              <a:schemeClr val="phClr">
+                <a:shade val="30000"/>
+                <a:satMod val="200000"/>
+              </a:schemeClr>
+            </a:gs>
+          </a:gsLst>
+          <a:path path="circle">
+            <a:fillToRect l="50000" t="50000" r="50000" b="50000"/>
+          </a:path>
+        </a:gradFill>
+      </a:bgFillStyleLst>
+    </a:fmtScheme>
+  </a:themeElements>
+</a:theme>
+</file>
+
+<file path=ppt/theme/theme11.xml><?xml version="1.0" encoding="utf-8"?>
 <a:theme xmlns:a="http://schemas.openxmlformats.org/drawingml/2006/main" name="Office Theme">
   <a:themeElements>
     <a:clrScheme name="Office">

</xml_diff>